<commit_message>
harmonize module numbering with wiki numbering
</commit_message>
<xml_diff>
--- a/lectures/cshl/2014/RNASeq_Module2_Tutorial.pptx
+++ b/lectures/cshl/2014/RNASeq_Module2_Tutorial.pptx
@@ -5,23 +5,25 @@
     <p:sldMasterId id="2147483648" r:id="rId1"/>
   </p:sldMasterIdLst>
   <p:notesMasterIdLst>
-    <p:notesMasterId r:id="rId13"/>
+    <p:notesMasterId r:id="rId15"/>
   </p:notesMasterIdLst>
   <p:handoutMasterIdLst>
-    <p:handoutMasterId r:id="rId14"/>
+    <p:handoutMasterId r:id="rId16"/>
   </p:handoutMasterIdLst>
   <p:sldIdLst>
     <p:sldId id="341" r:id="rId2"/>
     <p:sldId id="257" r:id="rId3"/>
     <p:sldId id="513" r:id="rId4"/>
     <p:sldId id="514" r:id="rId5"/>
-    <p:sldId id="515" r:id="rId6"/>
-    <p:sldId id="516" r:id="rId7"/>
-    <p:sldId id="517" r:id="rId8"/>
-    <p:sldId id="518" r:id="rId9"/>
-    <p:sldId id="519" r:id="rId10"/>
-    <p:sldId id="520" r:id="rId11"/>
-    <p:sldId id="512" r:id="rId12"/>
+    <p:sldId id="516" r:id="rId6"/>
+    <p:sldId id="517" r:id="rId7"/>
+    <p:sldId id="518" r:id="rId8"/>
+    <p:sldId id="519" r:id="rId9"/>
+    <p:sldId id="520" r:id="rId10"/>
+    <p:sldId id="521" r:id="rId11"/>
+    <p:sldId id="522" r:id="rId12"/>
+    <p:sldId id="523" r:id="rId13"/>
+    <p:sldId id="512" r:id="rId14"/>
   </p:sldIdLst>
   <p:sldSz cx="9144000" cy="6858000" type="screen4x3"/>
   <p:notesSz cx="7315200" cy="9601200"/>
@@ -251,12 +253,12 @@
             <a:pPr>
               <a:defRPr/>
             </a:pPr>
-            <a:fld id="{73395C5E-2FC9-C740-A901-10A5857E35C6}" type="datetime1">
+            <a:fld id="{A7319726-DA15-394A-BBAE-DDB36B7A1940}" type="datetime1">
               <a:rPr lang="en-US"/>
               <a:pPr>
                 <a:defRPr/>
               </a:pPr>
-              <a:t>11/15/14</a:t>
+              <a:t>11/16/14</a:t>
             </a:fld>
             <a:endParaRPr lang="en-US"/>
           </a:p>
@@ -338,7 +340,7 @@
             <a:pPr>
               <a:defRPr/>
             </a:pPr>
-            <a:fld id="{8F81CEAB-13B6-BE45-9948-E3D2D80A6422}" type="slidenum">
+            <a:fld id="{71A51B52-6060-0D4D-B246-CEC22E02B394}" type="slidenum">
               <a:rPr lang="en-US"/>
               <a:pPr>
                 <a:defRPr/>
@@ -352,7 +354,7 @@
     </p:spTree>
     <p:extLst>
       <p:ext uri="{BB962C8B-B14F-4D97-AF65-F5344CB8AC3E}">
-        <p14:creationId xmlns:p14="http://schemas.microsoft.com/office/powerpoint/2010/main" val="881769869"/>
+        <p14:creationId xmlns:p14="http://schemas.microsoft.com/office/powerpoint/2010/main" val="2140881397"/>
       </p:ext>
     </p:extLst>
   </p:cSld>
@@ -458,12 +460,12 @@
             <a:pPr>
               <a:defRPr/>
             </a:pPr>
-            <a:fld id="{1409FFA6-43EE-0749-8535-0BA227DA1C3D}" type="datetime1">
+            <a:fld id="{69763DA2-DBD9-0947-A322-D776C540C308}" type="datetime1">
               <a:rPr lang="en-US"/>
               <a:pPr>
                 <a:defRPr/>
               </a:pPr>
-              <a:t>11/15/14</a:t>
+              <a:t>11/16/14</a:t>
             </a:fld>
             <a:endParaRPr lang="en-US"/>
           </a:p>
@@ -647,7 +649,7 @@
             <a:pPr>
               <a:defRPr/>
             </a:pPr>
-            <a:fld id="{5E557AA8-D6B6-6740-A714-64CD6EB636CE}" type="slidenum">
+            <a:fld id="{13FC55B4-9C4C-F54A-A843-457F63E59D6C}" type="slidenum">
               <a:rPr lang="en-US"/>
               <a:pPr>
                 <a:defRPr/>
@@ -661,7 +663,7 @@
     </p:spTree>
     <p:extLst>
       <p:ext uri="{BB962C8B-B14F-4D97-AF65-F5344CB8AC3E}">
-        <p14:creationId xmlns:p14="http://schemas.microsoft.com/office/powerpoint/2010/main" val="3561342286"/>
+        <p14:creationId xmlns:p14="http://schemas.microsoft.com/office/powerpoint/2010/main" val="774397955"/>
       </p:ext>
     </p:extLst>
   </p:cSld>
@@ -952,7 +954,7 @@
           </a:lstStyle>
           <a:p>
             <a:pPr eaLnBrk="1" hangingPunct="1"/>
-            <a:fld id="{D924F94F-8486-FD4A-B1DC-4D561309089E}" type="slidenum">
+            <a:fld id="{0E51A8D5-9BC5-F14F-8C4D-C62295DED194}" type="slidenum">
               <a:rPr lang="en-US" sz="1300">
                 <a:latin typeface="Calibri" charset="0"/>
               </a:rPr>
@@ -1066,262 +1068,6 @@
       </p:grpSpPr>
       <p:sp>
         <p:nvSpPr>
-          <p:cNvPr id="16385" name="Rectangle 7"/>
-          <p:cNvSpPr>
-            <a:spLocks noGrp="1" noChangeArrowheads="1"/>
-          </p:cNvSpPr>
-          <p:nvPr>
-            <p:ph type="sldNum" sz="quarter" idx="5"/>
-          </p:nvPr>
-        </p:nvSpPr>
-        <p:spPr bwMode="auto">
-          <a:noFill/>
-          <a:extLst>
-            <a:ext uri="{909E8E84-426E-40dd-AFC4-6F175D3DCCD1}">
-              <a14:hiddenFill xmlns:a14="http://schemas.microsoft.com/office/drawing/2010/main">
-                <a:solidFill>
-                  <a:srgbClr val="FFFFFF"/>
-                </a:solidFill>
-              </a14:hiddenFill>
-            </a:ext>
-            <a:ext uri="{91240B29-F687-4f45-9708-019B960494DF}">
-              <a14:hiddenLine xmlns:a14="http://schemas.microsoft.com/office/drawing/2010/main" w="9525">
-                <a:solidFill>
-                  <a:srgbClr val="000000"/>
-                </a:solidFill>
-                <a:miter lim="800000"/>
-                <a:headEnd/>
-                <a:tailEnd/>
-              </a14:hiddenLine>
-            </a:ext>
-          </a:extLst>
-        </p:spPr>
-        <p:txBody>
-          <a:bodyPr/>
-          <a:lstStyle>
-            <a:lvl1pPr eaLnBrk="0" hangingPunct="0">
-              <a:defRPr sz="2400">
-                <a:solidFill>
-                  <a:schemeClr val="tx1"/>
-                </a:solidFill>
-                <a:latin typeface="Arial" charset="0"/>
-                <a:ea typeface="ＭＳ Ｐゴシック" charset="0"/>
-                <a:cs typeface="ＭＳ Ｐゴシック" charset="0"/>
-              </a:defRPr>
-            </a:lvl1pPr>
-            <a:lvl2pPr marL="742950" indent="-285750" eaLnBrk="0" hangingPunct="0">
-              <a:defRPr sz="2400">
-                <a:solidFill>
-                  <a:schemeClr val="tx1"/>
-                </a:solidFill>
-                <a:latin typeface="Arial" charset="0"/>
-                <a:ea typeface="ＭＳ Ｐゴシック" charset="0"/>
-              </a:defRPr>
-            </a:lvl2pPr>
-            <a:lvl3pPr marL="1143000" indent="-228600" eaLnBrk="0" hangingPunct="0">
-              <a:defRPr sz="2400">
-                <a:solidFill>
-                  <a:schemeClr val="tx1"/>
-                </a:solidFill>
-                <a:latin typeface="Arial" charset="0"/>
-                <a:ea typeface="ＭＳ Ｐゴシック" charset="0"/>
-              </a:defRPr>
-            </a:lvl3pPr>
-            <a:lvl4pPr marL="1600200" indent="-228600" eaLnBrk="0" hangingPunct="0">
-              <a:defRPr sz="2400">
-                <a:solidFill>
-                  <a:schemeClr val="tx1"/>
-                </a:solidFill>
-                <a:latin typeface="Arial" charset="0"/>
-                <a:ea typeface="ＭＳ Ｐゴシック" charset="0"/>
-              </a:defRPr>
-            </a:lvl4pPr>
-            <a:lvl5pPr marL="2057400" indent="-228600" eaLnBrk="0" hangingPunct="0">
-              <a:defRPr sz="2400">
-                <a:solidFill>
-                  <a:schemeClr val="tx1"/>
-                </a:solidFill>
-                <a:latin typeface="Arial" charset="0"/>
-                <a:ea typeface="ＭＳ Ｐゴシック" charset="0"/>
-              </a:defRPr>
-            </a:lvl5pPr>
-            <a:lvl6pPr marL="2514600" indent="-228600" eaLnBrk="0" fontAlgn="base" hangingPunct="0">
-              <a:spcBef>
-                <a:spcPct val="0"/>
-              </a:spcBef>
-              <a:spcAft>
-                <a:spcPct val="0"/>
-              </a:spcAft>
-              <a:defRPr sz="2400">
-                <a:solidFill>
-                  <a:schemeClr val="tx1"/>
-                </a:solidFill>
-                <a:latin typeface="Arial" charset="0"/>
-                <a:ea typeface="ＭＳ Ｐゴシック" charset="0"/>
-              </a:defRPr>
-            </a:lvl6pPr>
-            <a:lvl7pPr marL="2971800" indent="-228600" eaLnBrk="0" fontAlgn="base" hangingPunct="0">
-              <a:spcBef>
-                <a:spcPct val="0"/>
-              </a:spcBef>
-              <a:spcAft>
-                <a:spcPct val="0"/>
-              </a:spcAft>
-              <a:defRPr sz="2400">
-                <a:solidFill>
-                  <a:schemeClr val="tx1"/>
-                </a:solidFill>
-                <a:latin typeface="Arial" charset="0"/>
-                <a:ea typeface="ＭＳ Ｐゴシック" charset="0"/>
-              </a:defRPr>
-            </a:lvl7pPr>
-            <a:lvl8pPr marL="3429000" indent="-228600" eaLnBrk="0" fontAlgn="base" hangingPunct="0">
-              <a:spcBef>
-                <a:spcPct val="0"/>
-              </a:spcBef>
-              <a:spcAft>
-                <a:spcPct val="0"/>
-              </a:spcAft>
-              <a:defRPr sz="2400">
-                <a:solidFill>
-                  <a:schemeClr val="tx1"/>
-                </a:solidFill>
-                <a:latin typeface="Arial" charset="0"/>
-                <a:ea typeface="ＭＳ Ｐゴシック" charset="0"/>
-              </a:defRPr>
-            </a:lvl8pPr>
-            <a:lvl9pPr marL="3886200" indent="-228600" eaLnBrk="0" fontAlgn="base" hangingPunct="0">
-              <a:spcBef>
-                <a:spcPct val="0"/>
-              </a:spcBef>
-              <a:spcAft>
-                <a:spcPct val="0"/>
-              </a:spcAft>
-              <a:defRPr sz="2400">
-                <a:solidFill>
-                  <a:schemeClr val="tx1"/>
-                </a:solidFill>
-                <a:latin typeface="Arial" charset="0"/>
-                <a:ea typeface="ＭＳ Ｐゴシック" charset="0"/>
-              </a:defRPr>
-            </a:lvl9pPr>
-          </a:lstStyle>
-          <a:p>
-            <a:pPr eaLnBrk="1" hangingPunct="1"/>
-            <a:fld id="{1F39B608-01F2-F045-96A3-C8EFC3ACD74C}" type="slidenum">
-              <a:rPr lang="en-US" sz="1300">
-                <a:latin typeface="Calibri" charset="0"/>
-              </a:rPr>
-              <a:pPr eaLnBrk="1" hangingPunct="1"/>
-              <a:t>5</a:t>
-            </a:fld>
-            <a:endParaRPr lang="en-US" sz="1300">
-              <a:latin typeface="Calibri" charset="0"/>
-            </a:endParaRPr>
-          </a:p>
-        </p:txBody>
-      </p:sp>
-      <p:sp>
-        <p:nvSpPr>
-          <p:cNvPr id="16386" name="Rectangle 2"/>
-          <p:cNvSpPr>
-            <a:spLocks noGrp="1" noRot="1" noChangeAspect="1" noChangeArrowheads="1" noTextEdit="1"/>
-          </p:cNvSpPr>
-          <p:nvPr>
-            <p:ph type="sldImg"/>
-          </p:nvPr>
-        </p:nvSpPr>
-        <p:spPr bwMode="auto">
-          <a:solidFill>
-            <a:srgbClr val="FFFFFF"/>
-          </a:solidFill>
-          <a:ln>
-            <a:solidFill>
-              <a:srgbClr val="000000"/>
-            </a:solidFill>
-            <a:miter lim="800000"/>
-            <a:headEnd/>
-            <a:tailEnd/>
-          </a:ln>
-          <a:extLst>
-            <a:ext uri="{FAA26D3D-D897-4be2-8F04-BA451C77F1D7}">
-              <ma14:placeholderFlag xmlns:ma14="http://schemas.microsoft.com/office/mac/drawingml/2011/main" val="1"/>
-            </a:ext>
-          </a:extLst>
-        </p:spPr>
-      </p:sp>
-      <p:sp>
-        <p:nvSpPr>
-          <p:cNvPr id="16387" name="Rectangle 3"/>
-          <p:cNvSpPr>
-            <a:spLocks noGrp="1" noChangeArrowheads="1"/>
-          </p:cNvSpPr>
-          <p:nvPr>
-            <p:ph type="body" idx="1"/>
-          </p:nvPr>
-        </p:nvSpPr>
-        <p:spPr bwMode="auto">
-          <a:solidFill>
-            <a:srgbClr val="FFFFFF"/>
-          </a:solidFill>
-          <a:ln>
-            <a:solidFill>
-              <a:srgbClr val="000000"/>
-            </a:solidFill>
-            <a:miter lim="800000"/>
-            <a:headEnd/>
-            <a:tailEnd/>
-          </a:ln>
-          <a:extLst>
-            <a:ext uri="{FAA26D3D-D897-4be2-8F04-BA451C77F1D7}">
-              <ma14:placeholderFlag xmlns:ma14="http://schemas.microsoft.com/office/mac/drawingml/2011/main" val="1"/>
-            </a:ext>
-          </a:extLst>
-        </p:spPr>
-        <p:txBody>
-          <a:bodyPr wrap="square" numCol="1" anchor="t" anchorCtr="0" compatLnSpc="1">
-            <a:prstTxWarp prst="textNoShape">
-              <a:avLst/>
-            </a:prstTxWarp>
-          </a:bodyPr>
-          <a:lstStyle/>
-          <a:p>
-            <a:pPr eaLnBrk="1" hangingPunct="1"/>
-            <a:endParaRPr lang="en-US">
-              <a:latin typeface="Calibri" charset="0"/>
-              <a:ea typeface="ＭＳ Ｐゴシック" charset="0"/>
-              <a:cs typeface="ＭＳ Ｐゴシック" charset="0"/>
-            </a:endParaRPr>
-          </a:p>
-        </p:txBody>
-      </p:sp>
-    </p:spTree>
-  </p:cSld>
-  <p:clrMapOvr>
-    <a:masterClrMapping/>
-  </p:clrMapOvr>
-</p:notes>
-</file>
-
-<file path=ppt/notesSlides/notesSlide3.xml><?xml version="1.0" encoding="utf-8"?>
-<p:notes xmlns:a="http://schemas.openxmlformats.org/drawingml/2006/main" xmlns:r="http://schemas.openxmlformats.org/officeDocument/2006/relationships" xmlns:p="http://schemas.openxmlformats.org/presentationml/2006/main">
-  <p:cSld>
-    <p:spTree>
-      <p:nvGrpSpPr>
-        <p:cNvPr id="1" name=""/>
-        <p:cNvGrpSpPr/>
-        <p:nvPr/>
-      </p:nvGrpSpPr>
-      <p:grpSpPr>
-        <a:xfrm>
-          <a:off x="0" y="0"/>
-          <a:ext cx="0" cy="0"/>
-          <a:chOff x="0" y="0"/>
-          <a:chExt cx="0" cy="0"/>
-        </a:xfrm>
-      </p:grpSpPr>
-      <p:sp>
-        <p:nvSpPr>
           <p:cNvPr id="18433" name="Rectangle 7"/>
           <p:cNvSpPr>
             <a:spLocks noGrp="1" noChangeArrowheads="1"/>
@@ -1464,7 +1210,7 @@
           </a:lstStyle>
           <a:p>
             <a:pPr eaLnBrk="1" hangingPunct="1"/>
-            <a:fld id="{A707C12B-C7F8-A148-90F7-B89CE4A5E032}" type="slidenum">
+            <a:fld id="{F6271809-7141-684F-B699-A869FCFB5E99}" type="slidenum">
               <a:rPr lang="en-US" sz="1300">
                 <a:latin typeface="Calibri" charset="0"/>
               </a:rPr>
@@ -1559,7 +1305,7 @@
 </p:notes>
 </file>
 
-<file path=ppt/notesSlides/notesSlide4.xml><?xml version="1.0" encoding="utf-8"?>
+<file path=ppt/notesSlides/notesSlide3.xml><?xml version="1.0" encoding="utf-8"?>
 <p:notes xmlns:a="http://schemas.openxmlformats.org/drawingml/2006/main" xmlns:r="http://schemas.openxmlformats.org/officeDocument/2006/relationships" xmlns:p="http://schemas.openxmlformats.org/presentationml/2006/main">
   <p:cSld>
     <p:spTree>
@@ -1720,7 +1466,7 @@
           </a:lstStyle>
           <a:p>
             <a:pPr eaLnBrk="1" hangingPunct="1"/>
-            <a:fld id="{67CE1E5D-C0B3-4744-88D8-D81E5041DD69}" type="slidenum">
+            <a:fld id="{BC82D777-595C-F74F-893D-79AFE190A7AE}" type="slidenum">
               <a:rPr lang="en-US" sz="1300">
                 <a:latin typeface="Calibri" charset="0"/>
               </a:rPr>
@@ -1815,7 +1561,7 @@
 </p:notes>
 </file>
 
-<file path=ppt/notesSlides/notesSlide5.xml><?xml version="1.0" encoding="utf-8"?>
+<file path=ppt/notesSlides/notesSlide4.xml><?xml version="1.0" encoding="utf-8"?>
 <p:notes xmlns:a="http://schemas.openxmlformats.org/drawingml/2006/main" xmlns:r="http://schemas.openxmlformats.org/officeDocument/2006/relationships" xmlns:p="http://schemas.openxmlformats.org/presentationml/2006/main">
   <p:cSld>
     <p:spTree>
@@ -1834,7 +1580,7 @@
       </p:grpSpPr>
       <p:sp>
         <p:nvSpPr>
-          <p:cNvPr id="23553" name="Rectangle 7"/>
+          <p:cNvPr id="22529" name="Rectangle 7"/>
           <p:cNvSpPr>
             <a:spLocks noGrp="1" noChangeArrowheads="1"/>
           </p:cNvSpPr>
@@ -1976,12 +1722,12 @@
           </a:lstStyle>
           <a:p>
             <a:pPr eaLnBrk="1" hangingPunct="1"/>
-            <a:fld id="{184844F5-9029-0D45-8E07-E6B77CE66171}" type="slidenum">
+            <a:fld id="{299452F0-E2F8-AE41-801D-2B3846BDF3AE}" type="slidenum">
               <a:rPr lang="en-US" sz="1300">
                 <a:latin typeface="Calibri" charset="0"/>
               </a:rPr>
               <a:pPr eaLnBrk="1" hangingPunct="1"/>
-              <a:t>9</a:t>
+              <a:t>8</a:t>
             </a:fld>
             <a:endParaRPr lang="en-US" sz="1300">
               <a:latin typeface="Calibri" charset="0"/>
@@ -1991,7 +1737,7 @@
       </p:sp>
       <p:sp>
         <p:nvSpPr>
-          <p:cNvPr id="23554" name="Rectangle 2"/>
+          <p:cNvPr id="22530" name="Rectangle 2"/>
           <p:cNvSpPr>
             <a:spLocks noGrp="1" noRot="1" noChangeAspect="1" noChangeArrowheads="1" noTextEdit="1"/>
           </p:cNvSpPr>
@@ -2020,7 +1766,7 @@
       </p:sp>
       <p:sp>
         <p:nvSpPr>
-          <p:cNvPr id="23555" name="Rectangle 3"/>
+          <p:cNvPr id="22531" name="Rectangle 3"/>
           <p:cNvSpPr>
             <a:spLocks noGrp="1" noChangeArrowheads="1"/>
           </p:cNvSpPr>
@@ -2060,6 +1806,560 @@
               <a:ea typeface="ＭＳ Ｐゴシック" charset="0"/>
               <a:cs typeface="ＭＳ Ｐゴシック" charset="0"/>
             </a:endParaRPr>
+          </a:p>
+        </p:txBody>
+      </p:sp>
+    </p:spTree>
+  </p:cSld>
+  <p:clrMapOvr>
+    <a:masterClrMapping/>
+  </p:clrMapOvr>
+</p:notes>
+</file>
+
+<file path=ppt/notesSlides/notesSlide5.xml><?xml version="1.0" encoding="utf-8"?>
+<p:notes xmlns:a="http://schemas.openxmlformats.org/drawingml/2006/main" xmlns:r="http://schemas.openxmlformats.org/officeDocument/2006/relationships" xmlns:p="http://schemas.openxmlformats.org/presentationml/2006/main">
+  <p:cSld>
+    <p:spTree>
+      <p:nvGrpSpPr>
+        <p:cNvPr id="1" name=""/>
+        <p:cNvGrpSpPr/>
+        <p:nvPr/>
+      </p:nvGrpSpPr>
+      <p:grpSpPr>
+        <a:xfrm>
+          <a:off x="0" y="0"/>
+          <a:ext cx="0" cy="0"/>
+          <a:chOff x="0" y="0"/>
+          <a:chExt cx="0" cy="0"/>
+        </a:xfrm>
+      </p:grpSpPr>
+      <p:sp>
+        <p:nvSpPr>
+          <p:cNvPr id="25601" name="Rectangle 7"/>
+          <p:cNvSpPr>
+            <a:spLocks noGrp="1" noChangeArrowheads="1"/>
+          </p:cNvSpPr>
+          <p:nvPr>
+            <p:ph type="sldNum" sz="quarter" idx="5"/>
+          </p:nvPr>
+        </p:nvSpPr>
+        <p:spPr bwMode="auto">
+          <a:noFill/>
+          <a:extLst>
+            <a:ext uri="{909E8E84-426E-40dd-AFC4-6F175D3DCCD1}">
+              <a14:hiddenFill xmlns:a14="http://schemas.microsoft.com/office/drawing/2010/main">
+                <a:solidFill>
+                  <a:srgbClr val="FFFFFF"/>
+                </a:solidFill>
+              </a14:hiddenFill>
+            </a:ext>
+            <a:ext uri="{91240B29-F687-4f45-9708-019B960494DF}">
+              <a14:hiddenLine xmlns:a14="http://schemas.microsoft.com/office/drawing/2010/main" w="9525">
+                <a:solidFill>
+                  <a:srgbClr val="000000"/>
+                </a:solidFill>
+                <a:miter lim="800000"/>
+                <a:headEnd/>
+                <a:tailEnd/>
+              </a14:hiddenLine>
+            </a:ext>
+          </a:extLst>
+        </p:spPr>
+        <p:txBody>
+          <a:bodyPr/>
+          <a:lstStyle>
+            <a:lvl1pPr eaLnBrk="0" hangingPunct="0">
+              <a:defRPr sz="2400">
+                <a:solidFill>
+                  <a:schemeClr val="tx1"/>
+                </a:solidFill>
+                <a:latin typeface="Arial" charset="0"/>
+                <a:ea typeface="ＭＳ Ｐゴシック" charset="0"/>
+                <a:cs typeface="ＭＳ Ｐゴシック" charset="0"/>
+              </a:defRPr>
+            </a:lvl1pPr>
+            <a:lvl2pPr marL="742950" indent="-285750" eaLnBrk="0" hangingPunct="0">
+              <a:defRPr sz="2400">
+                <a:solidFill>
+                  <a:schemeClr val="tx1"/>
+                </a:solidFill>
+                <a:latin typeface="Arial" charset="0"/>
+                <a:ea typeface="ＭＳ Ｐゴシック" charset="0"/>
+              </a:defRPr>
+            </a:lvl2pPr>
+            <a:lvl3pPr marL="1143000" indent="-228600" eaLnBrk="0" hangingPunct="0">
+              <a:defRPr sz="2400">
+                <a:solidFill>
+                  <a:schemeClr val="tx1"/>
+                </a:solidFill>
+                <a:latin typeface="Arial" charset="0"/>
+                <a:ea typeface="ＭＳ Ｐゴシック" charset="0"/>
+              </a:defRPr>
+            </a:lvl3pPr>
+            <a:lvl4pPr marL="1600200" indent="-228600" eaLnBrk="0" hangingPunct="0">
+              <a:defRPr sz="2400">
+                <a:solidFill>
+                  <a:schemeClr val="tx1"/>
+                </a:solidFill>
+                <a:latin typeface="Arial" charset="0"/>
+                <a:ea typeface="ＭＳ Ｐゴシック" charset="0"/>
+              </a:defRPr>
+            </a:lvl4pPr>
+            <a:lvl5pPr marL="2057400" indent="-228600" eaLnBrk="0" hangingPunct="0">
+              <a:defRPr sz="2400">
+                <a:solidFill>
+                  <a:schemeClr val="tx1"/>
+                </a:solidFill>
+                <a:latin typeface="Arial" charset="0"/>
+                <a:ea typeface="ＭＳ Ｐゴシック" charset="0"/>
+              </a:defRPr>
+            </a:lvl5pPr>
+            <a:lvl6pPr marL="2514600" indent="-228600" eaLnBrk="0" fontAlgn="base" hangingPunct="0">
+              <a:spcBef>
+                <a:spcPct val="0"/>
+              </a:spcBef>
+              <a:spcAft>
+                <a:spcPct val="0"/>
+              </a:spcAft>
+              <a:defRPr sz="2400">
+                <a:solidFill>
+                  <a:schemeClr val="tx1"/>
+                </a:solidFill>
+                <a:latin typeface="Arial" charset="0"/>
+                <a:ea typeface="ＭＳ Ｐゴシック" charset="0"/>
+              </a:defRPr>
+            </a:lvl6pPr>
+            <a:lvl7pPr marL="2971800" indent="-228600" eaLnBrk="0" fontAlgn="base" hangingPunct="0">
+              <a:spcBef>
+                <a:spcPct val="0"/>
+              </a:spcBef>
+              <a:spcAft>
+                <a:spcPct val="0"/>
+              </a:spcAft>
+              <a:defRPr sz="2400">
+                <a:solidFill>
+                  <a:schemeClr val="tx1"/>
+                </a:solidFill>
+                <a:latin typeface="Arial" charset="0"/>
+                <a:ea typeface="ＭＳ Ｐゴシック" charset="0"/>
+              </a:defRPr>
+            </a:lvl7pPr>
+            <a:lvl8pPr marL="3429000" indent="-228600" eaLnBrk="0" fontAlgn="base" hangingPunct="0">
+              <a:spcBef>
+                <a:spcPct val="0"/>
+              </a:spcBef>
+              <a:spcAft>
+                <a:spcPct val="0"/>
+              </a:spcAft>
+              <a:defRPr sz="2400">
+                <a:solidFill>
+                  <a:schemeClr val="tx1"/>
+                </a:solidFill>
+                <a:latin typeface="Arial" charset="0"/>
+                <a:ea typeface="ＭＳ Ｐゴシック" charset="0"/>
+              </a:defRPr>
+            </a:lvl8pPr>
+            <a:lvl9pPr marL="3886200" indent="-228600" eaLnBrk="0" fontAlgn="base" hangingPunct="0">
+              <a:spcBef>
+                <a:spcPct val="0"/>
+              </a:spcBef>
+              <a:spcAft>
+                <a:spcPct val="0"/>
+              </a:spcAft>
+              <a:defRPr sz="2400">
+                <a:solidFill>
+                  <a:schemeClr val="tx1"/>
+                </a:solidFill>
+                <a:latin typeface="Arial" charset="0"/>
+                <a:ea typeface="ＭＳ Ｐゴシック" charset="0"/>
+              </a:defRPr>
+            </a:lvl9pPr>
+          </a:lstStyle>
+          <a:p>
+            <a:pPr eaLnBrk="1" hangingPunct="1"/>
+            <a:fld id="{E9960B3B-B614-C646-AC49-D0908ED8BDDD}" type="slidenum">
+              <a:rPr lang="en-US" sz="1300">
+                <a:latin typeface="Calibri" charset="0"/>
+              </a:rPr>
+              <a:pPr eaLnBrk="1" hangingPunct="1"/>
+              <a:t>10</a:t>
+            </a:fld>
+            <a:endParaRPr lang="en-US" sz="1300">
+              <a:latin typeface="Calibri" charset="0"/>
+            </a:endParaRPr>
+          </a:p>
+        </p:txBody>
+      </p:sp>
+      <p:sp>
+        <p:nvSpPr>
+          <p:cNvPr id="25602" name="Rectangle 2"/>
+          <p:cNvSpPr>
+            <a:spLocks noGrp="1" noRot="1" noChangeAspect="1" noChangeArrowheads="1" noTextEdit="1"/>
+          </p:cNvSpPr>
+          <p:nvPr>
+            <p:ph type="sldImg"/>
+          </p:nvPr>
+        </p:nvSpPr>
+        <p:spPr bwMode="auto">
+          <a:solidFill>
+            <a:srgbClr val="FFFFFF"/>
+          </a:solidFill>
+          <a:ln>
+            <a:solidFill>
+              <a:srgbClr val="000000"/>
+            </a:solidFill>
+            <a:miter lim="800000"/>
+            <a:headEnd/>
+            <a:tailEnd/>
+          </a:ln>
+          <a:extLst>
+            <a:ext uri="{FAA26D3D-D897-4be2-8F04-BA451C77F1D7}">
+              <ma14:placeholderFlag xmlns:ma14="http://schemas.microsoft.com/office/mac/drawingml/2011/main" val="1"/>
+            </a:ext>
+          </a:extLst>
+        </p:spPr>
+      </p:sp>
+      <p:sp>
+        <p:nvSpPr>
+          <p:cNvPr id="25603" name="Rectangle 3"/>
+          <p:cNvSpPr>
+            <a:spLocks noGrp="1" noChangeArrowheads="1"/>
+          </p:cNvSpPr>
+          <p:nvPr>
+            <p:ph type="body" idx="1"/>
+          </p:nvPr>
+        </p:nvSpPr>
+        <p:spPr bwMode="auto">
+          <a:solidFill>
+            <a:srgbClr val="FFFFFF"/>
+          </a:solidFill>
+          <a:ln>
+            <a:solidFill>
+              <a:srgbClr val="000000"/>
+            </a:solidFill>
+            <a:miter lim="800000"/>
+            <a:headEnd/>
+            <a:tailEnd/>
+          </a:ln>
+          <a:extLst>
+            <a:ext uri="{FAA26D3D-D897-4be2-8F04-BA451C77F1D7}">
+              <ma14:placeholderFlag xmlns:ma14="http://schemas.microsoft.com/office/mac/drawingml/2011/main" val="1"/>
+            </a:ext>
+          </a:extLst>
+        </p:spPr>
+        <p:txBody>
+          <a:bodyPr wrap="square" numCol="1" anchor="t" anchorCtr="0" compatLnSpc="1">
+            <a:prstTxWarp prst="textNoShape">
+              <a:avLst/>
+            </a:prstTxWarp>
+          </a:bodyPr>
+          <a:lstStyle/>
+          <a:p>
+            <a:pPr eaLnBrk="1" hangingPunct="1"/>
+            <a:endParaRPr lang="en-US">
+              <a:latin typeface="Calibri" charset="0"/>
+              <a:ea typeface="ＭＳ Ｐゴシック" charset="0"/>
+              <a:cs typeface="ＭＳ Ｐゴシック" charset="0"/>
+            </a:endParaRPr>
+          </a:p>
+        </p:txBody>
+      </p:sp>
+    </p:spTree>
+  </p:cSld>
+  <p:clrMapOvr>
+    <a:masterClrMapping/>
+  </p:clrMapOvr>
+</p:notes>
+</file>
+
+<file path=ppt/notesSlides/notesSlide6.xml><?xml version="1.0" encoding="utf-8"?>
+<p:notes xmlns:a="http://schemas.openxmlformats.org/drawingml/2006/main" xmlns:r="http://schemas.openxmlformats.org/officeDocument/2006/relationships" xmlns:p="http://schemas.openxmlformats.org/presentationml/2006/main">
+  <p:cSld>
+    <p:spTree>
+      <p:nvGrpSpPr>
+        <p:cNvPr id="1" name=""/>
+        <p:cNvGrpSpPr/>
+        <p:nvPr/>
+      </p:nvGrpSpPr>
+      <p:grpSpPr>
+        <a:xfrm>
+          <a:off x="0" y="0"/>
+          <a:ext cx="0" cy="0"/>
+          <a:chOff x="0" y="0"/>
+          <a:chExt cx="0" cy="0"/>
+        </a:xfrm>
+      </p:grpSpPr>
+      <p:sp>
+        <p:nvSpPr>
+          <p:cNvPr id="27649" name="Rectangle 7"/>
+          <p:cNvSpPr>
+            <a:spLocks noGrp="1" noChangeArrowheads="1"/>
+          </p:cNvSpPr>
+          <p:nvPr>
+            <p:ph type="sldNum" sz="quarter" idx="5"/>
+          </p:nvPr>
+        </p:nvSpPr>
+        <p:spPr bwMode="auto">
+          <a:noFill/>
+          <a:extLst>
+            <a:ext uri="{909E8E84-426E-40dd-AFC4-6F175D3DCCD1}">
+              <a14:hiddenFill xmlns:a14="http://schemas.microsoft.com/office/drawing/2010/main">
+                <a:solidFill>
+                  <a:srgbClr val="FFFFFF"/>
+                </a:solidFill>
+              </a14:hiddenFill>
+            </a:ext>
+            <a:ext uri="{91240B29-F687-4f45-9708-019B960494DF}">
+              <a14:hiddenLine xmlns:a14="http://schemas.microsoft.com/office/drawing/2010/main" w="9525">
+                <a:solidFill>
+                  <a:srgbClr val="000000"/>
+                </a:solidFill>
+                <a:miter lim="800000"/>
+                <a:headEnd/>
+                <a:tailEnd/>
+              </a14:hiddenLine>
+            </a:ext>
+          </a:extLst>
+        </p:spPr>
+        <p:txBody>
+          <a:bodyPr/>
+          <a:lstStyle>
+            <a:lvl1pPr eaLnBrk="0" hangingPunct="0">
+              <a:defRPr sz="2400">
+                <a:solidFill>
+                  <a:schemeClr val="tx1"/>
+                </a:solidFill>
+                <a:latin typeface="Arial" charset="0"/>
+                <a:ea typeface="ＭＳ Ｐゴシック" charset="0"/>
+                <a:cs typeface="ＭＳ Ｐゴシック" charset="0"/>
+              </a:defRPr>
+            </a:lvl1pPr>
+            <a:lvl2pPr marL="742950" indent="-285750" eaLnBrk="0" hangingPunct="0">
+              <a:defRPr sz="2400">
+                <a:solidFill>
+                  <a:schemeClr val="tx1"/>
+                </a:solidFill>
+                <a:latin typeface="Arial" charset="0"/>
+                <a:ea typeface="ＭＳ Ｐゴシック" charset="0"/>
+              </a:defRPr>
+            </a:lvl2pPr>
+            <a:lvl3pPr marL="1143000" indent="-228600" eaLnBrk="0" hangingPunct="0">
+              <a:defRPr sz="2400">
+                <a:solidFill>
+                  <a:schemeClr val="tx1"/>
+                </a:solidFill>
+                <a:latin typeface="Arial" charset="0"/>
+                <a:ea typeface="ＭＳ Ｐゴシック" charset="0"/>
+              </a:defRPr>
+            </a:lvl3pPr>
+            <a:lvl4pPr marL="1600200" indent="-228600" eaLnBrk="0" hangingPunct="0">
+              <a:defRPr sz="2400">
+                <a:solidFill>
+                  <a:schemeClr val="tx1"/>
+                </a:solidFill>
+                <a:latin typeface="Arial" charset="0"/>
+                <a:ea typeface="ＭＳ Ｐゴシック" charset="0"/>
+              </a:defRPr>
+            </a:lvl4pPr>
+            <a:lvl5pPr marL="2057400" indent="-228600" eaLnBrk="0" hangingPunct="0">
+              <a:defRPr sz="2400">
+                <a:solidFill>
+                  <a:schemeClr val="tx1"/>
+                </a:solidFill>
+                <a:latin typeface="Arial" charset="0"/>
+                <a:ea typeface="ＭＳ Ｐゴシック" charset="0"/>
+              </a:defRPr>
+            </a:lvl5pPr>
+            <a:lvl6pPr marL="2514600" indent="-228600" eaLnBrk="0" fontAlgn="base" hangingPunct="0">
+              <a:spcBef>
+                <a:spcPct val="0"/>
+              </a:spcBef>
+              <a:spcAft>
+                <a:spcPct val="0"/>
+              </a:spcAft>
+              <a:defRPr sz="2400">
+                <a:solidFill>
+                  <a:schemeClr val="tx1"/>
+                </a:solidFill>
+                <a:latin typeface="Arial" charset="0"/>
+                <a:ea typeface="ＭＳ Ｐゴシック" charset="0"/>
+              </a:defRPr>
+            </a:lvl6pPr>
+            <a:lvl7pPr marL="2971800" indent="-228600" eaLnBrk="0" fontAlgn="base" hangingPunct="0">
+              <a:spcBef>
+                <a:spcPct val="0"/>
+              </a:spcBef>
+              <a:spcAft>
+                <a:spcPct val="0"/>
+              </a:spcAft>
+              <a:defRPr sz="2400">
+                <a:solidFill>
+                  <a:schemeClr val="tx1"/>
+                </a:solidFill>
+                <a:latin typeface="Arial" charset="0"/>
+                <a:ea typeface="ＭＳ Ｐゴシック" charset="0"/>
+              </a:defRPr>
+            </a:lvl7pPr>
+            <a:lvl8pPr marL="3429000" indent="-228600" eaLnBrk="0" fontAlgn="base" hangingPunct="0">
+              <a:spcBef>
+                <a:spcPct val="0"/>
+              </a:spcBef>
+              <a:spcAft>
+                <a:spcPct val="0"/>
+              </a:spcAft>
+              <a:defRPr sz="2400">
+                <a:solidFill>
+                  <a:schemeClr val="tx1"/>
+                </a:solidFill>
+                <a:latin typeface="Arial" charset="0"/>
+                <a:ea typeface="ＭＳ Ｐゴシック" charset="0"/>
+              </a:defRPr>
+            </a:lvl8pPr>
+            <a:lvl9pPr marL="3886200" indent="-228600" eaLnBrk="0" fontAlgn="base" hangingPunct="0">
+              <a:spcBef>
+                <a:spcPct val="0"/>
+              </a:spcBef>
+              <a:spcAft>
+                <a:spcPct val="0"/>
+              </a:spcAft>
+              <a:defRPr sz="2400">
+                <a:solidFill>
+                  <a:schemeClr val="tx1"/>
+                </a:solidFill>
+                <a:latin typeface="Arial" charset="0"/>
+                <a:ea typeface="ＭＳ Ｐゴシック" charset="0"/>
+              </a:defRPr>
+            </a:lvl9pPr>
+          </a:lstStyle>
+          <a:p>
+            <a:pPr eaLnBrk="1" hangingPunct="1"/>
+            <a:fld id="{DDAE9BEF-A86A-D646-A9E3-125FD642139E}" type="slidenum">
+              <a:rPr lang="en-US" sz="1300">
+                <a:latin typeface="Calibri" charset="0"/>
+              </a:rPr>
+              <a:pPr eaLnBrk="1" hangingPunct="1"/>
+              <a:t>11</a:t>
+            </a:fld>
+            <a:endParaRPr lang="en-US" sz="1300">
+              <a:latin typeface="Calibri" charset="0"/>
+            </a:endParaRPr>
+          </a:p>
+        </p:txBody>
+      </p:sp>
+      <p:sp>
+        <p:nvSpPr>
+          <p:cNvPr id="27650" name="Rectangle 2"/>
+          <p:cNvSpPr>
+            <a:spLocks noGrp="1" noRot="1" noChangeAspect="1" noChangeArrowheads="1" noTextEdit="1"/>
+          </p:cNvSpPr>
+          <p:nvPr>
+            <p:ph type="sldImg"/>
+          </p:nvPr>
+        </p:nvSpPr>
+        <p:spPr bwMode="auto">
+          <a:solidFill>
+            <a:srgbClr val="FFFFFF"/>
+          </a:solidFill>
+          <a:ln>
+            <a:solidFill>
+              <a:srgbClr val="000000"/>
+            </a:solidFill>
+            <a:miter lim="800000"/>
+            <a:headEnd/>
+            <a:tailEnd/>
+          </a:ln>
+          <a:extLst>
+            <a:ext uri="{FAA26D3D-D897-4be2-8F04-BA451C77F1D7}">
+              <ma14:placeholderFlag xmlns:ma14="http://schemas.microsoft.com/office/mac/drawingml/2011/main" val="1"/>
+            </a:ext>
+          </a:extLst>
+        </p:spPr>
+      </p:sp>
+      <p:sp>
+        <p:nvSpPr>
+          <p:cNvPr id="27651" name="Rectangle 3"/>
+          <p:cNvSpPr>
+            <a:spLocks noGrp="1" noChangeArrowheads="1"/>
+          </p:cNvSpPr>
+          <p:nvPr>
+            <p:ph type="body" idx="1"/>
+          </p:nvPr>
+        </p:nvSpPr>
+        <p:spPr bwMode="auto">
+          <a:solidFill>
+            <a:srgbClr val="FFFFFF"/>
+          </a:solidFill>
+          <a:ln>
+            <a:solidFill>
+              <a:srgbClr val="000000"/>
+            </a:solidFill>
+            <a:miter lim="800000"/>
+            <a:headEnd/>
+            <a:tailEnd/>
+          </a:ln>
+        </p:spPr>
+        <p:txBody>
+          <a:bodyPr wrap="square" numCol="1" anchor="t" anchorCtr="0" compatLnSpc="1">
+            <a:prstTxWarp prst="textNoShape">
+              <a:avLst/>
+            </a:prstTxWarp>
+          </a:bodyPr>
+          <a:lstStyle/>
+          <a:p>
+            <a:pPr eaLnBrk="1" hangingPunct="1"/>
+            <a:r>
+              <a:rPr lang="en-US">
+                <a:latin typeface="Calibri" charset="0"/>
+                <a:ea typeface="ＭＳ Ｐゴシック" charset="0"/>
+                <a:cs typeface="ＭＳ Ｐゴシック" charset="0"/>
+              </a:rPr>
+              <a:t>#Each library is marked as either cDNA-1 or cDNA-2 and either lib1 or lib2</a:t>
+            </a:r>
+          </a:p>
+          <a:p>
+            <a:pPr eaLnBrk="1" hangingPunct="1"/>
+            <a:r>
+              <a:rPr lang="en-US">
+                <a:latin typeface="Calibri" charset="0"/>
+                <a:ea typeface="ＭＳ Ｐゴシック" charset="0"/>
+                <a:cs typeface="ＭＳ Ｐゴシック" charset="0"/>
+              </a:rPr>
+              <a:t>#cDNA-1 = total RNA (total)</a:t>
+            </a:r>
+          </a:p>
+          <a:p>
+            <a:pPr eaLnBrk="1" hangingPunct="1"/>
+            <a:r>
+              <a:rPr lang="en-US">
+                <a:latin typeface="Calibri" charset="0"/>
+                <a:ea typeface="ＭＳ Ｐゴシック" charset="0"/>
+                <a:cs typeface="ＭＳ Ｐゴシック" charset="0"/>
+              </a:rPr>
+              <a:t>#cDNA-2 = polyA selected RNA (polyA)</a:t>
+            </a:r>
+          </a:p>
+          <a:p>
+            <a:pPr eaLnBrk="1" hangingPunct="1"/>
+            <a:r>
+              <a:rPr lang="en-US">
+                <a:latin typeface="Calibri" charset="0"/>
+                <a:ea typeface="ＭＳ Ｐゴシック" charset="0"/>
+                <a:cs typeface="ＭＳ Ｐゴシック" charset="0"/>
+              </a:rPr>
+              <a:t>#lib1 = standard RNAseq (nocap)</a:t>
+            </a:r>
+          </a:p>
+          <a:p>
+            <a:pPr eaLnBrk="1" hangingPunct="1"/>
+            <a:r>
+              <a:rPr lang="en-US">
+                <a:latin typeface="Calibri" charset="0"/>
+                <a:ea typeface="ＭＳ Ｐゴシック" charset="0"/>
+                <a:cs typeface="ＭＳ Ｐゴシック" charset="0"/>
+              </a:rPr>
+              <a:t>#lib2 = cDNA capture RNAseq where library was enriched using probes targeting the exome (cap).</a:t>
+            </a:r>
           </a:p>
         </p:txBody>
       </p:sp>
@@ -2200,7 +2500,7 @@
     </p:spTree>
     <p:extLst>
       <p:ext uri="{BB962C8B-B14F-4D97-AF65-F5344CB8AC3E}">
-        <p14:creationId xmlns:p14="http://schemas.microsoft.com/office/powerpoint/2010/main" val="1678810967"/>
+        <p14:creationId xmlns:p14="http://schemas.microsoft.com/office/powerpoint/2010/main" val="3562473508"/>
       </p:ext>
     </p:extLst>
   </p:cSld>
@@ -2697,7 +2997,7 @@
     </p:spTree>
     <p:extLst>
       <p:ext uri="{BB962C8B-B14F-4D97-AF65-F5344CB8AC3E}">
-        <p14:creationId xmlns:p14="http://schemas.microsoft.com/office/powerpoint/2010/main" val="1219821176"/>
+        <p14:creationId xmlns:p14="http://schemas.microsoft.com/office/powerpoint/2010/main" val="804014372"/>
       </p:ext>
     </p:extLst>
   </p:cSld>
@@ -3106,7 +3406,7 @@
     </p:spTree>
     <p:extLst>
       <p:ext uri="{BB962C8B-B14F-4D97-AF65-F5344CB8AC3E}">
-        <p14:creationId xmlns:p14="http://schemas.microsoft.com/office/powerpoint/2010/main" val="22528860"/>
+        <p14:creationId xmlns:p14="http://schemas.microsoft.com/office/powerpoint/2010/main" val="1831664366"/>
       </p:ext>
     </p:extLst>
   </p:cSld>
@@ -3691,7 +3991,7 @@
     </p:spTree>
     <p:extLst>
       <p:ext uri="{BB962C8B-B14F-4D97-AF65-F5344CB8AC3E}">
-        <p14:creationId xmlns:p14="http://schemas.microsoft.com/office/powerpoint/2010/main" val="1085592759"/>
+        <p14:creationId xmlns:p14="http://schemas.microsoft.com/office/powerpoint/2010/main" val="4284089045"/>
       </p:ext>
     </p:extLst>
   </p:cSld>
@@ -4153,7 +4453,7 @@
     </p:spTree>
     <p:extLst>
       <p:ext uri="{BB962C8B-B14F-4D97-AF65-F5344CB8AC3E}">
-        <p14:creationId xmlns:p14="http://schemas.microsoft.com/office/powerpoint/2010/main" val="2213001308"/>
+        <p14:creationId xmlns:p14="http://schemas.microsoft.com/office/powerpoint/2010/main" val="3413699255"/>
       </p:ext>
     </p:extLst>
   </p:cSld>
@@ -4374,12 +4674,12 @@
             <a:pPr>
               <a:defRPr/>
             </a:pPr>
-            <a:fld id="{B575DCB9-CCFA-024B-8781-22736FE723FD}" type="datetime1">
+            <a:fld id="{7BB09580-D687-F145-BE28-6720E431DB8C}" type="datetime1">
               <a:rPr lang="en-US"/>
               <a:pPr>
                 <a:defRPr/>
               </a:pPr>
-              <a:t>11/15/14</a:t>
+              <a:t>11/16/14</a:t>
             </a:fld>
             <a:endParaRPr lang="en-US"/>
           </a:p>
@@ -4467,7 +4767,7 @@
             <a:pPr>
               <a:defRPr/>
             </a:pPr>
-            <a:fld id="{DC090146-E435-DE46-844D-F5BC5EBEFB92}" type="slidenum">
+            <a:fld id="{F29C0FFA-F9EC-A64D-81A3-B0249F87EB56}" type="slidenum">
               <a:rPr lang="en-US"/>
               <a:pPr>
                 <a:defRPr/>
@@ -4482,11 +4782,11 @@
   </p:cSld>
   <p:clrMap bg1="lt1" tx1="dk1" bg2="lt2" tx2="dk2" accent1="accent1" accent2="accent2" accent3="accent3" accent4="accent4" accent5="accent5" accent6="accent6" hlink="hlink" folHlink="folHlink"/>
   <p:sldLayoutIdLst>
-    <p:sldLayoutId id="2147483804" r:id="rId1"/>
-    <p:sldLayoutId id="2147483805" r:id="rId2"/>
-    <p:sldLayoutId id="2147483806" r:id="rId3"/>
-    <p:sldLayoutId id="2147483807" r:id="rId4"/>
-    <p:sldLayoutId id="2147483808" r:id="rId5"/>
+    <p:sldLayoutId id="2147483784" r:id="rId1"/>
+    <p:sldLayoutId id="2147483785" r:id="rId2"/>
+    <p:sldLayoutId id="2147483786" r:id="rId3"/>
+    <p:sldLayoutId id="2147483787" r:id="rId4"/>
+    <p:sldLayoutId id="2147483788" r:id="rId5"/>
   </p:sldLayoutIdLst>
   <p:txStyles>
     <p:titleStyle>
@@ -5135,9 +5435,9 @@
       </p:grpSpPr>
       <p:sp>
         <p:nvSpPr>
-          <p:cNvPr id="24577" name="Title 1"/>
+          <p:cNvPr id="24577" name="Rectangle 2"/>
           <p:cNvSpPr>
-            <a:spLocks noGrp="1"/>
+            <a:spLocks noGrp="1" noChangeArrowheads="1"/>
           </p:cNvSpPr>
           <p:nvPr>
             <p:ph type="title"/>
@@ -5153,61 +5453,430 @@
           <a:bodyPr/>
           <a:lstStyle/>
           <a:p>
-            <a:r>
-              <a:rPr lang="en-US" altLang="ko-KR">
+            <a:pPr eaLnBrk="1" hangingPunct="1"/>
+            <a:r>
+              <a:rPr lang="en-US" altLang="ko-KR" dirty="0" smtClean="0">
                 <a:latin typeface="Calibri" charset="0"/>
                 <a:ea typeface="ＭＳ Ｐゴシック" charset="0"/>
                 <a:cs typeface="ＭＳ Ｐゴシック" charset="0"/>
               </a:rPr>
-              <a:t>8. Post-alignment QC (samstat)</a:t>
-            </a:r>
-            <a:endParaRPr lang="en-US">
+              <a:t>2-v. Obtain </a:t>
+            </a:r>
+            <a:r>
+              <a:rPr lang="en-US" altLang="ko-KR" dirty="0">
+                <a:latin typeface="Calibri" charset="0"/>
+                <a:ea typeface="ＭＳ Ｐゴシック" charset="0"/>
+                <a:cs typeface="ＭＳ Ｐゴシック" charset="0"/>
+              </a:rPr>
+              <a:t>RNA-seq data</a:t>
+            </a:r>
+          </a:p>
+        </p:txBody>
+      </p:sp>
+      <p:sp>
+        <p:nvSpPr>
+          <p:cNvPr id="24578" name="Content Placeholder 6"/>
+          <p:cNvSpPr>
+            <a:spLocks noGrp="1"/>
+          </p:cNvSpPr>
+          <p:nvPr>
+            <p:ph idx="1"/>
+          </p:nvPr>
+        </p:nvSpPr>
+        <p:spPr>
+          <a:xfrm>
+            <a:off x="152400" y="1268413"/>
+            <a:ext cx="8839200" cy="4979987"/>
+          </a:xfrm>
+        </p:spPr>
+        <p:txBody>
+          <a:bodyPr/>
+          <a:lstStyle/>
+          <a:p>
+            <a:pPr>
+              <a:lnSpc>
+                <a:spcPct val="80000"/>
+              </a:lnSpc>
+            </a:pPr>
+            <a:r>
+              <a:rPr lang="en-US" sz="2600" dirty="0">
+                <a:latin typeface="Calibri" charset="0"/>
+                <a:ea typeface="ＭＳ Ｐゴシック" charset="0"/>
+              </a:rPr>
+              <a:t>For purposes of the tutorial, the test data has been pre-filtered</a:t>
+            </a:r>
+          </a:p>
+          <a:p>
+            <a:pPr lvl="1">
+              <a:lnSpc>
+                <a:spcPct val="80000"/>
+              </a:lnSpc>
+            </a:pPr>
+            <a:r>
+              <a:rPr lang="en-US" sz="2200" dirty="0">
+                <a:latin typeface="Calibri" charset="0"/>
+                <a:ea typeface="ＭＳ Ｐゴシック" charset="0"/>
+              </a:rPr>
+              <a:t>Identified reads that appear to match transcripts on a single chromosome</a:t>
+            </a:r>
+          </a:p>
+          <a:p>
+            <a:pPr>
+              <a:lnSpc>
+                <a:spcPct val="80000"/>
+              </a:lnSpc>
+            </a:pPr>
+            <a:r>
+              <a:rPr lang="en-US" sz="2600" dirty="0">
+                <a:latin typeface="Calibri" charset="0"/>
+                <a:ea typeface="ＭＳ Ｐゴシック" charset="0"/>
+              </a:rPr>
+              <a:t>The test data corresponds to two </a:t>
+            </a:r>
+            <a:r>
+              <a:rPr lang="en-US" sz="2600" dirty="0" smtClean="0">
+                <a:latin typeface="Calibri" charset="0"/>
+                <a:ea typeface="ＭＳ Ｐゴシック" charset="0"/>
+              </a:rPr>
+              <a:t>RNA sources</a:t>
+            </a:r>
+            <a:endParaRPr lang="en-US" sz="2600" dirty="0">
               <a:latin typeface="Calibri" charset="0"/>
               <a:ea typeface="ＭＳ Ｐゴシック" charset="0"/>
             </a:endParaRPr>
           </a:p>
+          <a:p>
+            <a:pPr lvl="1">
+              <a:lnSpc>
+                <a:spcPct val="80000"/>
+              </a:lnSpc>
+            </a:pPr>
+            <a:r>
+              <a:rPr lang="en-US" sz="2200" dirty="0" smtClean="0">
+                <a:latin typeface="Calibri" charset="0"/>
+                <a:ea typeface="ＭＳ Ｐゴシック" charset="0"/>
+              </a:rPr>
+              <a:t>The Universal Human Reference (UHR) and Human Brain Reference (HBR)</a:t>
+            </a:r>
+          </a:p>
+          <a:p>
+            <a:pPr lvl="1">
+              <a:lnSpc>
+                <a:spcPct val="80000"/>
+              </a:lnSpc>
+            </a:pPr>
+            <a:r>
+              <a:rPr lang="en-US" sz="2200" dirty="0" smtClean="0">
+                <a:latin typeface="Calibri" charset="0"/>
+                <a:ea typeface="ＭＳ Ｐゴシック" charset="0"/>
+              </a:rPr>
+              <a:t>Each sample also included one of two ERCC RNA “spike-in” mixes (Mix1 or Mix2)</a:t>
+            </a:r>
+            <a:endParaRPr lang="en-US" sz="2200" dirty="0">
+              <a:latin typeface="Calibri" charset="0"/>
+              <a:ea typeface="ＭＳ Ｐゴシック" charset="0"/>
+            </a:endParaRPr>
+          </a:p>
+          <a:p>
+            <a:pPr lvl="1">
+              <a:lnSpc>
+                <a:spcPct val="80000"/>
+              </a:lnSpc>
+            </a:pPr>
+            <a:r>
+              <a:rPr lang="en-US" sz="2200" dirty="0">
+                <a:latin typeface="Calibri" charset="0"/>
+                <a:ea typeface="ＭＳ Ｐゴシック" charset="0"/>
+              </a:rPr>
+              <a:t>Each RNA was </a:t>
+            </a:r>
+            <a:r>
+              <a:rPr lang="en-US" sz="2200" dirty="0" smtClean="0">
+                <a:latin typeface="Calibri" charset="0"/>
+                <a:ea typeface="ＭＳ Ｐゴシック" charset="0"/>
+              </a:rPr>
+              <a:t>source was sequenced in triplicate to </a:t>
+            </a:r>
+            <a:r>
+              <a:rPr lang="en-US" sz="2200" dirty="0">
+                <a:latin typeface="Calibri" charset="0"/>
+                <a:ea typeface="ＭＳ Ｐゴシック" charset="0"/>
+              </a:rPr>
+              <a:t>create </a:t>
+            </a:r>
+            <a:r>
+              <a:rPr lang="en-US" sz="2200" dirty="0" smtClean="0">
+                <a:latin typeface="Calibri" charset="0"/>
+                <a:ea typeface="ＭＳ Ｐゴシック" charset="0"/>
+              </a:rPr>
+              <a:t>six </a:t>
+            </a:r>
+            <a:r>
+              <a:rPr lang="en-US" sz="2200" dirty="0">
+                <a:latin typeface="Calibri" charset="0"/>
+                <a:ea typeface="ＭＳ Ｐゴシック" charset="0"/>
+              </a:rPr>
+              <a:t>independent Illumina sequence libraries (</a:t>
+            </a:r>
+            <a:r>
+              <a:rPr lang="en-US" sz="2200" b="1" dirty="0" smtClean="0">
+                <a:latin typeface="Calibri" charset="0"/>
+                <a:ea typeface="ＭＳ Ｐゴシック" charset="0"/>
+              </a:rPr>
+              <a:t>‘UHR_Rep1_Mix1’</a:t>
+            </a:r>
+            <a:r>
+              <a:rPr lang="en-US" sz="2200" b="1" dirty="0">
+                <a:latin typeface="Calibri" charset="0"/>
+                <a:ea typeface="ＭＳ Ｐゴシック" charset="0"/>
+              </a:rPr>
+              <a:t>, </a:t>
+            </a:r>
+            <a:r>
+              <a:rPr lang="en-US" sz="2200" b="1" dirty="0" smtClean="0">
+                <a:latin typeface="Calibri" charset="0"/>
+                <a:ea typeface="ＭＳ Ｐゴシック" charset="0"/>
+              </a:rPr>
+              <a:t>‘</a:t>
+            </a:r>
+            <a:r>
+              <a:rPr lang="en-US" sz="2200" b="1" dirty="0">
+                <a:latin typeface="Calibri" charset="0"/>
+                <a:ea typeface="ＭＳ Ｐゴシック" charset="0"/>
+              </a:rPr>
+              <a:t>UHR_Rep2_Mix1’, </a:t>
+            </a:r>
+            <a:r>
+              <a:rPr lang="en-US" sz="2200" b="1" dirty="0" smtClean="0">
+                <a:latin typeface="Calibri" charset="0"/>
+                <a:ea typeface="ＭＳ Ｐゴシック" charset="0"/>
+              </a:rPr>
+              <a:t>‘</a:t>
+            </a:r>
+            <a:r>
+              <a:rPr lang="en-US" sz="2200" b="1" dirty="0">
+                <a:latin typeface="Calibri" charset="0"/>
+                <a:ea typeface="ＭＳ Ｐゴシック" charset="0"/>
+              </a:rPr>
+              <a:t>UHR_Rep3_Mix1’, </a:t>
+            </a:r>
+            <a:r>
+              <a:rPr lang="en-US" sz="2200" b="1" dirty="0" smtClean="0">
+                <a:latin typeface="Calibri" charset="0"/>
+                <a:ea typeface="ＭＳ Ｐゴシック" charset="0"/>
+              </a:rPr>
+              <a:t>‘HBR_Rep1_Mix2’, ’</a:t>
+            </a:r>
+            <a:r>
+              <a:rPr lang="en-US" sz="2200" b="1" dirty="0">
+                <a:latin typeface="Calibri" charset="0"/>
+                <a:ea typeface="ＭＳ Ｐゴシック" charset="0"/>
+              </a:rPr>
+              <a:t>HBR_Rep2_Mix2’</a:t>
+            </a:r>
+            <a:r>
+              <a:rPr lang="en-US" sz="2200" b="1" dirty="0" smtClean="0">
+                <a:latin typeface="Calibri" charset="0"/>
+                <a:ea typeface="ＭＳ Ｐゴシック" charset="0"/>
+              </a:rPr>
+              <a:t>, and ’</a:t>
+            </a:r>
+            <a:r>
+              <a:rPr lang="en-US" sz="2200" b="1" dirty="0">
+                <a:latin typeface="Calibri" charset="0"/>
+                <a:ea typeface="ＭＳ Ｐゴシック" charset="0"/>
+              </a:rPr>
+              <a:t>HBR_Rep3_Mix2’</a:t>
+            </a:r>
+            <a:r>
+              <a:rPr lang="en-US" altLang="ja-JP" sz="2200" dirty="0" smtClean="0">
+                <a:latin typeface="Calibri" charset="0"/>
+                <a:ea typeface="ＭＳ Ｐゴシック" charset="0"/>
+              </a:rPr>
+              <a:t>)</a:t>
+            </a:r>
+            <a:endParaRPr lang="en-US" altLang="ja-JP" sz="2200" dirty="0">
+              <a:latin typeface="Calibri" charset="0"/>
+              <a:ea typeface="ＭＳ Ｐゴシック" charset="0"/>
+            </a:endParaRPr>
+          </a:p>
+          <a:p>
+            <a:pPr>
+              <a:lnSpc>
+                <a:spcPct val="80000"/>
+              </a:lnSpc>
+            </a:pPr>
+            <a:r>
+              <a:rPr lang="en-US" sz="2600" dirty="0">
+                <a:latin typeface="Calibri" charset="0"/>
+                <a:ea typeface="ＭＳ Ｐゴシック" charset="0"/>
+              </a:rPr>
+              <a:t>The input data is provided in </a:t>
+            </a:r>
+            <a:r>
+              <a:rPr lang="ja-JP" altLang="en-US" sz="2600" dirty="0">
+                <a:latin typeface="Calibri" charset="0"/>
+                <a:ea typeface="ＭＳ Ｐゴシック" charset="0"/>
+              </a:rPr>
+              <a:t>‘</a:t>
+            </a:r>
+            <a:r>
+              <a:rPr lang="en-US" altLang="ja-JP" sz="2600" dirty="0" err="1">
+                <a:latin typeface="Calibri" charset="0"/>
+                <a:ea typeface="ＭＳ Ｐゴシック" charset="0"/>
+              </a:rPr>
+              <a:t>fastq</a:t>
+            </a:r>
+            <a:r>
+              <a:rPr lang="ja-JP" altLang="en-US" sz="2600" dirty="0">
+                <a:latin typeface="Calibri" charset="0"/>
+                <a:ea typeface="ＭＳ Ｐゴシック" charset="0"/>
+              </a:rPr>
+              <a:t>’</a:t>
+            </a:r>
+            <a:r>
+              <a:rPr lang="en-US" altLang="ja-JP" sz="2600" dirty="0">
+                <a:latin typeface="Calibri" charset="0"/>
+                <a:ea typeface="ＭＳ Ｐゴシック" charset="0"/>
+              </a:rPr>
+              <a:t> format:</a:t>
+            </a:r>
+          </a:p>
+          <a:p>
+            <a:pPr lvl="1">
+              <a:lnSpc>
+                <a:spcPct val="80000"/>
+              </a:lnSpc>
+            </a:pPr>
+            <a:r>
+              <a:rPr lang="en-US" sz="2200" dirty="0">
+                <a:latin typeface="Calibri" charset="0"/>
+                <a:ea typeface="ＭＳ Ｐゴシック" charset="0"/>
+                <a:hlinkClick r:id="rId3"/>
+              </a:rPr>
+              <a:t>http://en.wikipedia.org/wiki/</a:t>
+            </a:r>
+            <a:r>
+              <a:rPr lang="en-US" sz="2200" dirty="0" smtClean="0">
+                <a:latin typeface="Calibri" charset="0"/>
+                <a:ea typeface="ＭＳ Ｐゴシック" charset="0"/>
+                <a:hlinkClick r:id="rId3"/>
+              </a:rPr>
+              <a:t>FASTQ_format</a:t>
+            </a:r>
+            <a:endParaRPr lang="en-US" sz="2200" dirty="0" smtClean="0">
+              <a:latin typeface="Calibri" charset="0"/>
+              <a:ea typeface="ＭＳ Ｐゴシック" charset="0"/>
+            </a:endParaRPr>
+          </a:p>
+          <a:p>
+            <a:pPr>
+              <a:lnSpc>
+                <a:spcPct val="80000"/>
+              </a:lnSpc>
+              <a:buFont typeface="Arial" charset="0"/>
+              <a:buNone/>
+            </a:pPr>
+            <a:endParaRPr lang="en-US" sz="2600" dirty="0" smtClean="0">
+              <a:latin typeface="Calibri" charset="0"/>
+              <a:ea typeface="ＭＳ Ｐゴシック" charset="0"/>
+            </a:endParaRPr>
+          </a:p>
+          <a:p>
+            <a:pPr>
+              <a:lnSpc>
+                <a:spcPct val="80000"/>
+              </a:lnSpc>
+              <a:buFont typeface="Arial" charset="0"/>
+              <a:buNone/>
+            </a:pPr>
+            <a:r>
+              <a:rPr lang="en-US" sz="1100" dirty="0" smtClean="0">
+                <a:latin typeface="Andale Mono" charset="0"/>
+                <a:ea typeface="ＭＳ Ｐゴシック" charset="0"/>
+                <a:cs typeface="Andale Mono" charset="0"/>
+              </a:rPr>
+              <a:t>@</a:t>
+            </a:r>
+            <a:r>
+              <a:rPr lang="en-US" sz="1100" dirty="0">
+                <a:latin typeface="Andale Mono" charset="0"/>
+                <a:ea typeface="ＭＳ Ｐゴシック" charset="0"/>
+                <a:cs typeface="Andale Mono" charset="0"/>
+              </a:rPr>
+              <a:t>HWUSI-EAS677_108093760:3:61:12270:3114/1</a:t>
+            </a:r>
+          </a:p>
+          <a:p>
+            <a:pPr>
+              <a:lnSpc>
+                <a:spcPct val="80000"/>
+              </a:lnSpc>
+              <a:buFont typeface="Arial" charset="0"/>
+              <a:buNone/>
+            </a:pPr>
+            <a:r>
+              <a:rPr lang="en-US" sz="1100" dirty="0">
+                <a:latin typeface="Andale Mono" charset="0"/>
+                <a:ea typeface="ＭＳ Ｐゴシック" charset="0"/>
+                <a:cs typeface="Andale Mono" charset="0"/>
+              </a:rPr>
+              <a:t>ATTTTTTTTCAAAAATGTATCTATATTAATTCCTGAGAATTGGAATGAAAATCCTCAGTACAAAAGGCCAAAACATGAAA</a:t>
+            </a:r>
+          </a:p>
+          <a:p>
+            <a:pPr>
+              <a:lnSpc>
+                <a:spcPct val="80000"/>
+              </a:lnSpc>
+              <a:buFont typeface="Arial" charset="0"/>
+              <a:buNone/>
+            </a:pPr>
+            <a:r>
+              <a:rPr lang="en-US" sz="1100" dirty="0">
+                <a:latin typeface="Andale Mono" charset="0"/>
+                <a:ea typeface="ＭＳ Ｐゴシック" charset="0"/>
+                <a:cs typeface="Andale Mono" charset="0"/>
+              </a:rPr>
+              <a:t>+</a:t>
+            </a:r>
+          </a:p>
+          <a:p>
+            <a:pPr>
+              <a:lnSpc>
+                <a:spcPct val="80000"/>
+              </a:lnSpc>
+              <a:buFont typeface="Arial" charset="0"/>
+              <a:buNone/>
+            </a:pPr>
+            <a:r>
+              <a:rPr lang="en-US" sz="1100" dirty="0">
+                <a:latin typeface="Andale Mono" charset="0"/>
+                <a:ea typeface="ＭＳ Ｐゴシック" charset="0"/>
+                <a:cs typeface="Andale Mono" charset="0"/>
+              </a:rPr>
+              <a:t>IIIIIIIIIIIIIIIIIIIIIIIIIIIIIIIIIIIIIIIIIIIIIIIIIIIIIIIIIIIIIIIIIIFIIIHIIIIIHHHI</a:t>
+            </a:r>
+          </a:p>
         </p:txBody>
       </p:sp>
-      <p:pic>
-        <p:nvPicPr>
-          <p:cNvPr id="24578" name="Content Placeholder 3" descr="Screen Shot 2013-06-01 at 11.22.28 PM.png"/>
-          <p:cNvPicPr>
-            <a:picLocks noGrp="1" noChangeAspect="1"/>
-          </p:cNvPicPr>
-          <p:nvPr>
-            <p:ph idx="1"/>
-          </p:nvPr>
-        </p:nvPicPr>
-        <p:blipFill>
-          <a:blip r:embed="rId2">
-            <a:extLst>
-              <a:ext uri="{28A0092B-C50C-407E-A947-70E740481C1C}">
-                <a14:useLocalDpi xmlns:a14="http://schemas.microsoft.com/office/drawing/2010/main" val="0"/>
-              </a:ext>
-            </a:extLst>
-          </a:blip>
-          <a:srcRect l="-11166" r="-11166"/>
-          <a:stretch>
-            <a:fillRect/>
-          </a:stretch>
-        </p:blipFill>
-        <p:spPr>
-          <a:xfrm>
-            <a:off x="152400" y="1341438"/>
-            <a:ext cx="8839200" cy="4724400"/>
-          </a:xfrm>
-        </p:spPr>
-      </p:pic>
     </p:spTree>
     <p:extLst>
       <p:ext uri="{BB962C8B-B14F-4D97-AF65-F5344CB8AC3E}">
-        <p14:creationId xmlns:p14="http://schemas.microsoft.com/office/powerpoint/2010/main" val="3027940297"/>
+        <p14:creationId xmlns:p14="http://schemas.microsoft.com/office/powerpoint/2010/main" val="1322993187"/>
       </p:ext>
     </p:extLst>
   </p:cSld>
   <p:clrMapOvr>
     <a:masterClrMapping/>
   </p:clrMapOvr>
+  <p:timing>
+    <p:tnLst>
+      <p:par>
+        <p:cTn xmlns:p14="http://schemas.microsoft.com/office/powerpoint/2010/main" id="1" dur="indefinite" restart="never" nodeType="tmRoot"/>
+      </p:par>
+    </p:tnLst>
+  </p:timing>
 </p:sld>
 </file>
 
@@ -5230,7 +5899,645 @@
       </p:grpSpPr>
       <p:sp>
         <p:nvSpPr>
-          <p:cNvPr id="11265" name="Content Placeholder 3"/>
+          <p:cNvPr id="26625" name="Rectangle 2"/>
+          <p:cNvSpPr>
+            <a:spLocks noGrp="1" noChangeArrowheads="1"/>
+          </p:cNvSpPr>
+          <p:nvPr>
+            <p:ph type="title"/>
+          </p:nvPr>
+        </p:nvSpPr>
+        <p:spPr>
+          <a:xfrm>
+            <a:off x="152400" y="44450"/>
+            <a:ext cx="8839200" cy="1143000"/>
+          </a:xfrm>
+        </p:spPr>
+        <p:txBody>
+          <a:bodyPr/>
+          <a:lstStyle/>
+          <a:p>
+            <a:pPr eaLnBrk="1" hangingPunct="1"/>
+            <a:r>
+              <a:rPr lang="en-US" altLang="ko-KR" dirty="0" smtClean="0">
+                <a:latin typeface="Calibri" charset="0"/>
+                <a:ea typeface="ＭＳ Ｐゴシック" charset="0"/>
+                <a:cs typeface="ＭＳ Ｐゴシック" charset="0"/>
+              </a:rPr>
+              <a:t>2-v</a:t>
+            </a:r>
+            <a:r>
+              <a:rPr lang="en-US" altLang="ko-KR" dirty="0" smtClean="0">
+                <a:latin typeface="Calibri" charset="0"/>
+                <a:ea typeface="ＭＳ Ｐゴシック" charset="0"/>
+                <a:cs typeface="ＭＳ Ｐゴシック" charset="0"/>
+              </a:rPr>
+              <a:t>. </a:t>
+            </a:r>
+            <a:r>
+              <a:rPr lang="en-US" altLang="ko-KR" dirty="0">
+                <a:latin typeface="Calibri" charset="0"/>
+                <a:ea typeface="ＭＳ Ｐゴシック" charset="0"/>
+                <a:cs typeface="ＭＳ Ｐゴシック" charset="0"/>
+              </a:rPr>
+              <a:t>Obtain RNA-seq data (cont’d)</a:t>
+            </a:r>
+          </a:p>
+        </p:txBody>
+      </p:sp>
+      <p:sp>
+        <p:nvSpPr>
+          <p:cNvPr id="22530" name="Content Placeholder 6"/>
+          <p:cNvSpPr>
+            <a:spLocks noGrp="1"/>
+          </p:cNvSpPr>
+          <p:nvPr>
+            <p:ph idx="1"/>
+          </p:nvPr>
+        </p:nvSpPr>
+        <p:spPr>
+          <a:xfrm>
+            <a:off x="152400" y="1268413"/>
+            <a:ext cx="8839200" cy="4979987"/>
+          </a:xfrm>
+        </p:spPr>
+        <p:txBody>
+          <a:bodyPr>
+            <a:normAutofit fontScale="92500" lnSpcReduction="20000"/>
+          </a:bodyPr>
+          <a:lstStyle/>
+          <a:p>
+            <a:pPr eaLnBrk="1" hangingPunct="1">
+              <a:defRPr/>
+            </a:pPr>
+            <a:r>
+              <a:rPr lang="en-US" sz="2400" dirty="0" smtClean="0">
+                <a:latin typeface="Calibri" charset="0"/>
+                <a:ea typeface="ＭＳ Ｐゴシック" charset="0"/>
+                <a:cs typeface="ＭＳ Ｐゴシック" charset="0"/>
+              </a:rPr>
+              <a:t>Universal Human Reference (UHR): </a:t>
+            </a:r>
+          </a:p>
+          <a:p>
+            <a:pPr lvl="1" eaLnBrk="1" hangingPunct="1">
+              <a:defRPr/>
+            </a:pPr>
+            <a:r>
+              <a:rPr lang="en-US" sz="2000" dirty="0" smtClean="0">
+                <a:latin typeface="Calibri" charset="0"/>
+                <a:ea typeface="ＭＳ Ｐゴシック" charset="0"/>
+                <a:cs typeface="ＭＳ Ｐゴシック" charset="0"/>
+              </a:rPr>
+              <a:t>A </a:t>
+            </a:r>
+            <a:r>
+              <a:rPr lang="en-US" sz="2000" dirty="0">
+                <a:latin typeface="Calibri" charset="0"/>
+                <a:ea typeface="ＭＳ Ｐゴシック" charset="0"/>
+                <a:cs typeface="ＭＳ Ｐゴシック" charset="0"/>
+              </a:rPr>
+              <a:t>pool of 10 human cell lines.  This sample was purchased from </a:t>
+            </a:r>
+            <a:r>
+              <a:rPr lang="en-US" sz="2000" dirty="0" err="1">
+                <a:latin typeface="Calibri" charset="0"/>
+                <a:ea typeface="ＭＳ Ｐゴシック" charset="0"/>
+                <a:cs typeface="ＭＳ Ｐゴシック" charset="0"/>
+              </a:rPr>
+              <a:t>Strategene</a:t>
+            </a:r>
+            <a:r>
+              <a:rPr lang="en-US" sz="2000" dirty="0">
+                <a:latin typeface="Calibri" charset="0"/>
+                <a:ea typeface="ＭＳ Ｐゴシック" charset="0"/>
+                <a:cs typeface="ＭＳ Ｐゴシック" charset="0"/>
+              </a:rPr>
+              <a:t> (Agilent Technologies</a:t>
+            </a:r>
+            <a:r>
+              <a:rPr lang="en-US" sz="2000" dirty="0" smtClean="0">
+                <a:latin typeface="Calibri" charset="0"/>
+                <a:ea typeface="ＭＳ Ｐゴシック" charset="0"/>
+                <a:cs typeface="ＭＳ Ｐゴシック" charset="0"/>
+              </a:rPr>
+              <a:t>)</a:t>
+            </a:r>
+          </a:p>
+          <a:p>
+            <a:pPr lvl="1" eaLnBrk="1" hangingPunct="1">
+              <a:defRPr/>
+            </a:pPr>
+            <a:r>
+              <a:rPr lang="en-US" sz="2000" dirty="0" smtClean="0">
+                <a:latin typeface="Calibri" charset="0"/>
+                <a:ea typeface="ＭＳ Ｐゴシック" charset="0"/>
+                <a:cs typeface="ＭＳ Ｐゴシック" charset="0"/>
+                <a:hlinkClick r:id="rId3"/>
+              </a:rPr>
+              <a:t>http</a:t>
+            </a:r>
+            <a:r>
+              <a:rPr lang="en-US" sz="2000" dirty="0">
+                <a:latin typeface="Calibri" charset="0"/>
+                <a:ea typeface="ＭＳ Ｐゴシック" charset="0"/>
+                <a:cs typeface="ＭＳ Ｐゴシック" charset="0"/>
+                <a:hlinkClick r:id="rId3"/>
+              </a:rPr>
+              <a:t>://www.genomics.agilent.com/en/References-Controls/Universal-Reference-RNAs/?cid=AG-PT-172&amp;tabId=AG-PR-</a:t>
+            </a:r>
+            <a:r>
+              <a:rPr lang="en-US" sz="2000" dirty="0" smtClean="0">
+                <a:latin typeface="Calibri" charset="0"/>
+                <a:ea typeface="ＭＳ Ｐゴシック" charset="0"/>
+                <a:cs typeface="ＭＳ Ｐゴシック" charset="0"/>
+                <a:hlinkClick r:id="rId3"/>
+              </a:rPr>
+              <a:t>1217</a:t>
+            </a:r>
+            <a:endParaRPr lang="en-US" sz="2000" dirty="0" smtClean="0">
+              <a:latin typeface="Calibri" charset="0"/>
+              <a:ea typeface="ＭＳ Ｐゴシック" charset="0"/>
+              <a:cs typeface="ＭＳ Ｐゴシック" charset="0"/>
+            </a:endParaRPr>
+          </a:p>
+          <a:p>
+            <a:pPr eaLnBrk="1" hangingPunct="1">
+              <a:defRPr/>
+            </a:pPr>
+            <a:r>
+              <a:rPr lang="en-US" sz="2400" dirty="0" smtClean="0">
+                <a:latin typeface="Calibri" charset="0"/>
+                <a:ea typeface="ＭＳ Ｐゴシック" charset="0"/>
+                <a:cs typeface="ＭＳ Ｐゴシック" charset="0"/>
+              </a:rPr>
+              <a:t>Human Brain Reference (HBR):</a:t>
+            </a:r>
+          </a:p>
+          <a:p>
+            <a:pPr lvl="1" eaLnBrk="1" hangingPunct="1">
+              <a:defRPr/>
+            </a:pPr>
+            <a:r>
+              <a:rPr lang="en-US" sz="2000" dirty="0" smtClean="0">
+                <a:latin typeface="Calibri" charset="0"/>
+                <a:ea typeface="ＭＳ Ｐゴシック" charset="0"/>
+                <a:cs typeface="ＭＳ Ｐゴシック" charset="0"/>
+              </a:rPr>
+              <a:t>A </a:t>
+            </a:r>
+            <a:r>
+              <a:rPr lang="en-US" sz="2000" dirty="0">
+                <a:latin typeface="Calibri" charset="0"/>
+                <a:ea typeface="ＭＳ Ｐゴシック" charset="0"/>
+                <a:cs typeface="ＭＳ Ｐゴシック" charset="0"/>
+              </a:rPr>
+              <a:t>pool of brain tissue from multiple brain regions from multiple human donors.  This sample was purchased from </a:t>
+            </a:r>
+            <a:r>
+              <a:rPr lang="en-US" sz="2000" dirty="0" err="1">
+                <a:latin typeface="Calibri" charset="0"/>
+                <a:ea typeface="ＭＳ Ｐゴシック" charset="0"/>
+                <a:cs typeface="ＭＳ Ｐゴシック" charset="0"/>
+              </a:rPr>
+              <a:t>Ambion</a:t>
+            </a:r>
+            <a:r>
+              <a:rPr lang="en-US" sz="2000" dirty="0">
+                <a:latin typeface="Calibri" charset="0"/>
+                <a:ea typeface="ＭＳ Ｐゴシック" charset="0"/>
+                <a:cs typeface="ＭＳ Ｐゴシック" charset="0"/>
+              </a:rPr>
+              <a:t> (Life Technologies)</a:t>
+            </a:r>
+            <a:r>
+              <a:rPr lang="en-US" sz="2000" dirty="0" smtClean="0">
+                <a:latin typeface="Calibri" charset="0"/>
+                <a:ea typeface="ＭＳ Ｐゴシック" charset="0"/>
+                <a:cs typeface="ＭＳ Ｐゴシック" charset="0"/>
+              </a:rPr>
+              <a:t>.</a:t>
+            </a:r>
+          </a:p>
+          <a:p>
+            <a:pPr lvl="1" eaLnBrk="1" hangingPunct="1">
+              <a:defRPr/>
+            </a:pPr>
+            <a:r>
+              <a:rPr lang="en-US" sz="2000" dirty="0">
+                <a:hlinkClick r:id="rId4"/>
+              </a:rPr>
+              <a:t>http://www.lifetechnologies.com/order/catalog/product/</a:t>
+            </a:r>
+            <a:r>
+              <a:rPr lang="en-US" sz="2000" dirty="0" smtClean="0">
+                <a:hlinkClick r:id="rId4"/>
+              </a:rPr>
+              <a:t>AM6050</a:t>
+            </a:r>
+            <a:endParaRPr lang="en-US" sz="2000" dirty="0" smtClean="0"/>
+          </a:p>
+          <a:p>
+            <a:pPr eaLnBrk="1" hangingPunct="1">
+              <a:defRPr/>
+            </a:pPr>
+            <a:r>
+              <a:rPr lang="en-US" sz="2400" dirty="0" smtClean="0">
+                <a:latin typeface="Calibri" charset="0"/>
+                <a:ea typeface="ＭＳ Ｐゴシック" charset="0"/>
+                <a:cs typeface="ＭＳ Ｐゴシック" charset="0"/>
+              </a:rPr>
+              <a:t>External RNA Reference Consortium (ERCC):</a:t>
+            </a:r>
+          </a:p>
+          <a:p>
+            <a:pPr lvl="1" eaLnBrk="1" hangingPunct="1">
+              <a:defRPr/>
+            </a:pPr>
+            <a:r>
+              <a:rPr lang="en-US" sz="2000" dirty="0" smtClean="0">
+                <a:latin typeface="Calibri" charset="0"/>
+                <a:ea typeface="ＭＳ Ｐゴシック" charset="0"/>
+                <a:cs typeface="ＭＳ Ｐゴシック" charset="0"/>
+              </a:rPr>
+              <a:t>ERCC </a:t>
+            </a:r>
+            <a:r>
+              <a:rPr lang="en-US" sz="2000" dirty="0">
+                <a:latin typeface="Calibri" charset="0"/>
+                <a:ea typeface="ＭＳ Ｐゴシック" charset="0"/>
+                <a:cs typeface="ＭＳ Ｐゴシック" charset="0"/>
+              </a:rPr>
+              <a:t>reference RNA spike-ins purchased from </a:t>
+            </a:r>
+            <a:r>
+              <a:rPr lang="en-US" sz="2000" dirty="0" err="1">
+                <a:latin typeface="Calibri" charset="0"/>
+                <a:ea typeface="ＭＳ Ｐゴシック" charset="0"/>
+                <a:cs typeface="ＭＳ Ｐゴシック" charset="0"/>
+              </a:rPr>
+              <a:t>Ambion</a:t>
+            </a:r>
+            <a:r>
+              <a:rPr lang="en-US" sz="2000" dirty="0">
+                <a:latin typeface="Calibri" charset="0"/>
+                <a:ea typeface="ＭＳ Ｐゴシック" charset="0"/>
+                <a:cs typeface="ＭＳ Ｐゴシック" charset="0"/>
+              </a:rPr>
+              <a:t> (Life Technologies)</a:t>
+            </a:r>
+            <a:r>
+              <a:rPr lang="en-US" sz="2000" dirty="0" smtClean="0">
+                <a:latin typeface="Calibri" charset="0"/>
+                <a:ea typeface="ＭＳ Ｐゴシック" charset="0"/>
+                <a:cs typeface="ＭＳ Ｐゴシック" charset="0"/>
+              </a:rPr>
+              <a:t>.</a:t>
+            </a:r>
+          </a:p>
+          <a:p>
+            <a:pPr lvl="1" eaLnBrk="1" hangingPunct="1">
+              <a:defRPr/>
+            </a:pPr>
+            <a:r>
+              <a:rPr lang="en-US" sz="2400" dirty="0" smtClean="0">
+                <a:latin typeface="Calibri" charset="0"/>
+                <a:ea typeface="ＭＳ Ｐゴシック" charset="0"/>
+                <a:cs typeface="ＭＳ Ｐゴシック" charset="0"/>
+                <a:hlinkClick r:id="rId5"/>
+              </a:rPr>
+              <a:t>http</a:t>
+            </a:r>
+            <a:r>
+              <a:rPr lang="en-US" sz="2400" dirty="0">
+                <a:latin typeface="Calibri" charset="0"/>
+                <a:ea typeface="ＭＳ Ｐゴシック" charset="0"/>
+                <a:cs typeface="ＭＳ Ｐゴシック" charset="0"/>
+                <a:hlinkClick r:id="rId5"/>
+              </a:rPr>
+              <a:t>://www.lifetechnologies.com/order/catalog/product/</a:t>
+            </a:r>
+            <a:r>
+              <a:rPr lang="en-US" sz="2400" dirty="0" smtClean="0">
+                <a:latin typeface="Calibri" charset="0"/>
+                <a:ea typeface="ＭＳ Ｐゴシック" charset="0"/>
+                <a:cs typeface="ＭＳ Ｐゴシック" charset="0"/>
+                <a:hlinkClick r:id="rId5"/>
+              </a:rPr>
+              <a:t>4456739</a:t>
+            </a:r>
+            <a:endParaRPr lang="en-US" dirty="0">
+              <a:latin typeface="Calibri" charset="0"/>
+              <a:ea typeface="ＭＳ Ｐゴシック" charset="0"/>
+              <a:cs typeface="ＭＳ Ｐゴシック" charset="0"/>
+            </a:endParaRPr>
+          </a:p>
+          <a:p>
+            <a:pPr lvl="1" eaLnBrk="1" hangingPunct="1">
+              <a:defRPr/>
+            </a:pPr>
+            <a:r>
+              <a:rPr lang="en-US" dirty="0">
+                <a:latin typeface="Calibri" charset="0"/>
+                <a:ea typeface="ＭＳ Ｐゴシック" charset="0"/>
+                <a:cs typeface="ＭＳ Ｐゴシック" charset="0"/>
+              </a:rPr>
+              <a:t>The UHR samples used ERCC Mix1</a:t>
+            </a:r>
+            <a:r>
+              <a:rPr lang="en-US" dirty="0" smtClean="0">
+                <a:latin typeface="Calibri" charset="0"/>
+                <a:ea typeface="ＭＳ Ｐゴシック" charset="0"/>
+                <a:cs typeface="ＭＳ Ｐゴシック" charset="0"/>
+              </a:rPr>
+              <a:t>. </a:t>
+            </a:r>
+            <a:r>
+              <a:rPr lang="en-US" sz="2400" dirty="0" smtClean="0">
+                <a:latin typeface="Calibri" charset="0"/>
+                <a:ea typeface="ＭＳ Ｐゴシック" charset="0"/>
+                <a:cs typeface="ＭＳ Ｐゴシック" charset="0"/>
+              </a:rPr>
+              <a:t>The </a:t>
+            </a:r>
+            <a:r>
+              <a:rPr lang="en-US" sz="2400" dirty="0">
+                <a:latin typeface="Calibri" charset="0"/>
+                <a:ea typeface="ＭＳ Ｐゴシック" charset="0"/>
+                <a:cs typeface="ＭＳ Ｐゴシック" charset="0"/>
+              </a:rPr>
+              <a:t>HBR </a:t>
+            </a:r>
+            <a:r>
+              <a:rPr lang="en-US" sz="2400" dirty="0" smtClean="0">
+                <a:latin typeface="Calibri" charset="0"/>
+                <a:ea typeface="ＭＳ Ｐゴシック" charset="0"/>
+                <a:cs typeface="ＭＳ Ｐゴシック" charset="0"/>
+              </a:rPr>
+              <a:t>samples used </a:t>
+            </a:r>
+            <a:r>
+              <a:rPr lang="en-US" sz="2400" dirty="0">
+                <a:latin typeface="Calibri" charset="0"/>
+                <a:ea typeface="ＭＳ Ｐゴシック" charset="0"/>
+                <a:cs typeface="ＭＳ Ｐゴシック" charset="0"/>
+              </a:rPr>
+              <a:t>ERCC Mix2</a:t>
+            </a:r>
+            <a:r>
+              <a:rPr lang="en-US" sz="2400" dirty="0" smtClean="0">
+                <a:latin typeface="Calibri" charset="0"/>
+                <a:ea typeface="ＭＳ Ｐゴシック" charset="0"/>
+                <a:cs typeface="ＭＳ Ｐゴシック" charset="0"/>
+              </a:rPr>
+              <a:t>.</a:t>
+            </a:r>
+          </a:p>
+          <a:p>
+            <a:pPr eaLnBrk="1" hangingPunct="1">
+              <a:defRPr/>
+            </a:pPr>
+            <a:endParaRPr lang="en-US" sz="2400" dirty="0" smtClean="0">
+              <a:latin typeface="Calibri" charset="0"/>
+              <a:ea typeface="ＭＳ Ｐゴシック" charset="0"/>
+              <a:cs typeface="ＭＳ Ｐゴシック" charset="0"/>
+            </a:endParaRPr>
+          </a:p>
+          <a:p>
+            <a:pPr eaLnBrk="1" hangingPunct="1">
+              <a:defRPr/>
+            </a:pPr>
+            <a:r>
+              <a:rPr lang="en-US" sz="2400" dirty="0" smtClean="0">
+                <a:latin typeface="Calibri" charset="0"/>
+                <a:ea typeface="ＭＳ Ｐゴシック" charset="0"/>
+                <a:cs typeface="ＭＳ Ｐゴシック" charset="0"/>
+              </a:rPr>
+              <a:t>In </a:t>
+            </a:r>
+            <a:r>
+              <a:rPr lang="en-US" sz="2400" dirty="0">
+                <a:latin typeface="Calibri" charset="0"/>
+                <a:ea typeface="ＭＳ Ｐゴシック" charset="0"/>
+                <a:cs typeface="ＭＳ Ｐゴシック" charset="0"/>
+              </a:rPr>
+              <a:t>this tutorial we will </a:t>
+            </a:r>
+            <a:r>
+              <a:rPr lang="en-US" sz="2400" dirty="0" smtClean="0">
+                <a:latin typeface="Calibri" charset="0"/>
+                <a:ea typeface="ＭＳ Ｐゴシック" charset="0"/>
+                <a:cs typeface="ＭＳ Ｐゴシック" charset="0"/>
+              </a:rPr>
+              <a:t>compare </a:t>
+            </a:r>
+            <a:r>
+              <a:rPr lang="en-US" sz="2400" dirty="0">
+                <a:latin typeface="Calibri" charset="0"/>
+                <a:ea typeface="ＭＳ Ｐゴシック" charset="0"/>
+                <a:cs typeface="ＭＳ Ｐゴシック" charset="0"/>
+              </a:rPr>
+              <a:t>the </a:t>
+            </a:r>
+            <a:r>
+              <a:rPr lang="en-US" sz="2400" dirty="0" smtClean="0">
+                <a:latin typeface="Calibri" charset="0"/>
+                <a:ea typeface="ＭＳ Ｐゴシック" charset="0"/>
+                <a:cs typeface="ＭＳ Ｐゴシック" charset="0"/>
+              </a:rPr>
+              <a:t>three UHR </a:t>
+            </a:r>
+            <a:r>
+              <a:rPr lang="en-US" sz="2400" dirty="0">
+                <a:latin typeface="Calibri" charset="0"/>
+                <a:ea typeface="ＭＳ Ｐゴシック" charset="0"/>
+                <a:cs typeface="ＭＳ Ｐゴシック" charset="0"/>
+              </a:rPr>
+              <a:t>libraries </a:t>
+            </a:r>
+            <a:r>
+              <a:rPr lang="en-US" sz="2400" dirty="0" err="1" smtClean="0">
+                <a:latin typeface="Calibri" charset="0"/>
+                <a:ea typeface="ＭＳ Ｐゴシック" charset="0"/>
+                <a:cs typeface="ＭＳ Ｐゴシック" charset="0"/>
+              </a:rPr>
+              <a:t>vs</a:t>
+            </a:r>
+            <a:r>
+              <a:rPr lang="en-US" sz="2400" dirty="0" smtClean="0">
+                <a:latin typeface="Calibri" charset="0"/>
+                <a:ea typeface="ＭＳ Ｐゴシック" charset="0"/>
+                <a:cs typeface="ＭＳ Ｐゴシック" charset="0"/>
+              </a:rPr>
+              <a:t> three HBR libraries (6 </a:t>
+            </a:r>
+            <a:r>
+              <a:rPr lang="en-US" sz="2400" dirty="0">
+                <a:latin typeface="Calibri" charset="0"/>
+                <a:ea typeface="ＭＳ Ｐゴシック" charset="0"/>
+                <a:cs typeface="ＭＳ Ｐゴシック" charset="0"/>
+              </a:rPr>
+              <a:t>samples in total</a:t>
+            </a:r>
+            <a:r>
+              <a:rPr lang="en-US" sz="2400" dirty="0" smtClean="0">
+                <a:latin typeface="Calibri" charset="0"/>
+                <a:ea typeface="ＭＳ Ｐゴシック" charset="0"/>
+                <a:cs typeface="ＭＳ Ｐゴシック" charset="0"/>
+              </a:rPr>
+              <a:t>)</a:t>
+            </a:r>
+          </a:p>
+        </p:txBody>
+      </p:sp>
+    </p:spTree>
+    <p:extLst>
+      <p:ext uri="{BB962C8B-B14F-4D97-AF65-F5344CB8AC3E}">
+        <p14:creationId xmlns:p14="http://schemas.microsoft.com/office/powerpoint/2010/main" val="2706529870"/>
+      </p:ext>
+    </p:extLst>
+  </p:cSld>
+  <p:clrMapOvr>
+    <a:masterClrMapping/>
+  </p:clrMapOvr>
+  <p:timing>
+    <p:tnLst>
+      <p:par>
+        <p:cTn xmlns:p14="http://schemas.microsoft.com/office/powerpoint/2010/main" id="1" dur="indefinite" restart="never" nodeType="tmRoot"/>
+      </p:par>
+    </p:tnLst>
+  </p:timing>
+</p:sld>
+</file>
+
+<file path=ppt/slides/slide12.xml><?xml version="1.0" encoding="utf-8"?>
+<p:sld xmlns:a="http://schemas.openxmlformats.org/drawingml/2006/main" xmlns:r="http://schemas.openxmlformats.org/officeDocument/2006/relationships" xmlns:p="http://schemas.openxmlformats.org/presentationml/2006/main">
+  <p:cSld>
+    <p:spTree>
+      <p:nvGrpSpPr>
+        <p:cNvPr id="1" name=""/>
+        <p:cNvGrpSpPr/>
+        <p:nvPr/>
+      </p:nvGrpSpPr>
+      <p:grpSpPr>
+        <a:xfrm>
+          <a:off x="0" y="0"/>
+          <a:ext cx="0" cy="0"/>
+          <a:chOff x="0" y="0"/>
+          <a:chExt cx="0" cy="0"/>
+        </a:xfrm>
+      </p:grpSpPr>
+      <p:sp>
+        <p:nvSpPr>
+          <p:cNvPr id="28673" name="Title 1"/>
+          <p:cNvSpPr>
+            <a:spLocks noGrp="1"/>
+          </p:cNvSpPr>
+          <p:nvPr>
+            <p:ph type="title"/>
+          </p:nvPr>
+        </p:nvSpPr>
+        <p:spPr>
+          <a:xfrm>
+            <a:off x="152400" y="53752"/>
+            <a:ext cx="8839200" cy="1143000"/>
+          </a:xfrm>
+        </p:spPr>
+        <p:txBody>
+          <a:bodyPr/>
+          <a:lstStyle/>
+          <a:p>
+            <a:r>
+              <a:rPr lang="en-US" dirty="0" smtClean="0">
+                <a:latin typeface="Calibri" charset="0"/>
+                <a:ea typeface="ＭＳ Ｐゴシック" charset="0"/>
+              </a:rPr>
+              <a:t>2-vi. Pre</a:t>
+            </a:r>
+            <a:r>
+              <a:rPr lang="en-US" dirty="0">
+                <a:latin typeface="Calibri" charset="0"/>
+                <a:ea typeface="ＭＳ Ｐゴシック" charset="0"/>
+              </a:rPr>
+              <a:t>-Alignment QC with </a:t>
+            </a:r>
+            <a:r>
+              <a:rPr lang="en-US" dirty="0" err="1">
+                <a:latin typeface="Calibri" charset="0"/>
+                <a:ea typeface="ＭＳ Ｐゴシック" charset="0"/>
+              </a:rPr>
+              <a:t>FastQC</a:t>
+            </a:r>
+            <a:endParaRPr lang="en-US" dirty="0">
+              <a:latin typeface="Calibri" charset="0"/>
+              <a:ea typeface="ＭＳ Ｐゴシック" charset="0"/>
+            </a:endParaRPr>
+          </a:p>
+        </p:txBody>
+      </p:sp>
+      <p:pic>
+        <p:nvPicPr>
+          <p:cNvPr id="28674" name="Content Placeholder 3" descr="Screen Shot 2013-06-01 at 9.58.30 PM.png"/>
+          <p:cNvPicPr>
+            <a:picLocks noGrp="1" noChangeAspect="1"/>
+          </p:cNvPicPr>
+          <p:nvPr>
+            <p:ph idx="1"/>
+          </p:nvPr>
+        </p:nvPicPr>
+        <p:blipFill>
+          <a:blip r:embed="rId2">
+            <a:extLst>
+              <a:ext uri="{28A0092B-C50C-407E-A947-70E740481C1C}">
+                <a14:useLocalDpi xmlns:a14="http://schemas.microsoft.com/office/drawing/2010/main" val="0"/>
+              </a:ext>
+            </a:extLst>
+          </a:blip>
+          <a:srcRect l="-20132" t="293" r="-20132"/>
+          <a:stretch>
+            <a:fillRect/>
+          </a:stretch>
+        </p:blipFill>
+        <p:spPr>
+          <a:xfrm>
+            <a:off x="152400" y="1412875"/>
+            <a:ext cx="8839200" cy="4710113"/>
+          </a:xfrm>
+        </p:spPr>
+      </p:pic>
+    </p:spTree>
+    <p:extLst>
+      <p:ext uri="{BB962C8B-B14F-4D97-AF65-F5344CB8AC3E}">
+        <p14:creationId xmlns:p14="http://schemas.microsoft.com/office/powerpoint/2010/main" val="332810397"/>
+      </p:ext>
+    </p:extLst>
+  </p:cSld>
+  <p:clrMapOvr>
+    <a:masterClrMapping/>
+  </p:clrMapOvr>
+</p:sld>
+</file>
+
+<file path=ppt/slides/slide13.xml><?xml version="1.0" encoding="utf-8"?>
+<p:sld xmlns:a="http://schemas.openxmlformats.org/drawingml/2006/main" xmlns:r="http://schemas.openxmlformats.org/officeDocument/2006/relationships" xmlns:p="http://schemas.openxmlformats.org/presentationml/2006/main">
+  <p:cSld>
+    <p:spTree>
+      <p:nvGrpSpPr>
+        <p:cNvPr id="1" name=""/>
+        <p:cNvGrpSpPr/>
+        <p:nvPr/>
+      </p:nvGrpSpPr>
+      <p:grpSpPr>
+        <a:xfrm>
+          <a:off x="0" y="0"/>
+          <a:ext cx="0" cy="0"/>
+          <a:chOff x="0" y="0"/>
+          <a:chExt cx="0" cy="0"/>
+        </a:xfrm>
+      </p:grpSpPr>
+      <p:sp>
+        <p:nvSpPr>
+          <p:cNvPr id="13313" name="Content Placeholder 3"/>
           <p:cNvSpPr>
             <a:spLocks noGrp="1"/>
           </p:cNvSpPr>
@@ -5253,12 +6560,16 @@
               <a:buNone/>
             </a:pPr>
             <a:r>
-              <a:rPr lang="en-US" sz="4400">
+              <a:rPr lang="en-US" sz="4400" dirty="0" smtClean="0">
                 <a:latin typeface="Calibri" charset="0"/>
                 <a:ea typeface="ＭＳ Ｐゴシック" charset="0"/>
               </a:rPr>
               <a:t>Break</a:t>
             </a:r>
+            <a:endParaRPr lang="en-US" sz="4400" dirty="0">
+              <a:latin typeface="Calibri" charset="0"/>
+              <a:ea typeface="ＭＳ Ｐゴシック" charset="0"/>
+            </a:endParaRPr>
           </a:p>
         </p:txBody>
       </p:sp>
@@ -5603,6 +6914,16 @@
           <a:p>
             <a:pPr algn="r" eaLnBrk="1" hangingPunct="1"/>
             <a:r>
+              <a:rPr lang="en-US" sz="2000" dirty="0">
+                <a:solidFill>
+                  <a:schemeClr val="bg1"/>
+                </a:solidFill>
+                <a:latin typeface="Calibri" charset="0"/>
+                <a:cs typeface="Segoe UI" charset="0"/>
+              </a:rPr>
+              <a:t>Module </a:t>
+            </a:r>
+            <a:r>
               <a:rPr lang="en-US" sz="2000" dirty="0" smtClean="0">
                 <a:solidFill>
                   <a:schemeClr val="bg1"/>
@@ -5610,9 +6931,38 @@
                 <a:latin typeface="Calibri" charset="0"/>
                 <a:cs typeface="Segoe UI" charset="0"/>
               </a:rPr>
-              <a:t>Module 2</a:t>
+              <a:t>2</a:t>
+            </a:r>
+            <a:r>
+              <a:rPr lang="en-US" sz="2000" dirty="0">
+                <a:solidFill>
+                  <a:schemeClr val="bg1"/>
+                </a:solidFill>
+                <a:latin typeface="Calibri" charset="0"/>
+                <a:cs typeface="Segoe UI" charset="0"/>
+              </a:rPr>
+              <a:t/>
             </a:r>
             <a:br>
+              <a:rPr lang="en-US" sz="2000" dirty="0">
+                <a:solidFill>
+                  <a:schemeClr val="bg1"/>
+                </a:solidFill>
+                <a:latin typeface="Calibri" charset="0"/>
+                <a:cs typeface="Segoe UI" charset="0"/>
+              </a:rPr>
+            </a:br>
+            <a:r>
+              <a:rPr lang="en-US" sz="2000" dirty="0">
+                <a:solidFill>
+                  <a:schemeClr val="bg1"/>
+                </a:solidFill>
+                <a:latin typeface="Calibri" charset="0"/>
+                <a:cs typeface="Segoe UI" charset="0"/>
+              </a:rPr>
+              <a:t>Introduction to RNA sequencing </a:t>
+            </a:r>
+            <a:r>
               <a:rPr lang="en-US" sz="2000" dirty="0" smtClean="0">
                 <a:solidFill>
                   <a:schemeClr val="bg1"/>
@@ -5620,36 +6970,7 @@
                 <a:latin typeface="Calibri" charset="0"/>
                 <a:cs typeface="Segoe UI" charset="0"/>
               </a:rPr>
-            </a:br>
-            <a:r>
-              <a:rPr lang="en-US" sz="2000" dirty="0" smtClean="0">
-                <a:solidFill>
-                  <a:schemeClr val="bg1"/>
-                </a:solidFill>
-                <a:latin typeface="Calibri" charset="0"/>
-                <a:cs typeface="Segoe UI" charset="0"/>
-              </a:rPr>
-              <a:t>RNA-</a:t>
-            </a:r>
-            <a:r>
-              <a:rPr lang="en-US" sz="2000" dirty="0" err="1" smtClean="0">
-                <a:solidFill>
-                  <a:schemeClr val="bg1"/>
-                </a:solidFill>
-                <a:latin typeface="Calibri" charset="0"/>
-                <a:cs typeface="Segoe UI" charset="0"/>
-              </a:rPr>
-              <a:t>seq</a:t>
-            </a:r>
-            <a:r>
-              <a:rPr lang="en-US" sz="2000" dirty="0" smtClean="0">
-                <a:solidFill>
-                  <a:schemeClr val="bg1"/>
-                </a:solidFill>
-                <a:latin typeface="Calibri" charset="0"/>
-                <a:cs typeface="Segoe UI" charset="0"/>
-              </a:rPr>
-              <a:t> alignment and visualization (tutorial)</a:t>
+              <a:t>(tutorial)</a:t>
             </a:r>
             <a:endParaRPr lang="en-US" sz="1800" b="1" dirty="0">
               <a:solidFill>
@@ -5812,8 +7133,8 @@
         </p:nvSpPr>
         <p:spPr>
           <a:xfrm>
-            <a:off x="152400" y="44450"/>
-            <a:ext cx="8839200" cy="1143000"/>
+            <a:off x="152400" y="-26988"/>
+            <a:ext cx="8839200" cy="1143001"/>
           </a:xfrm>
         </p:spPr>
         <p:txBody>
@@ -5822,13 +7143,26 @@
           <a:p>
             <a:pPr eaLnBrk="1" hangingPunct="1"/>
             <a:r>
-              <a:rPr lang="en-US" altLang="ko-KR">
+              <a:rPr lang="en-US" altLang="ko-KR" dirty="0">
                 <a:latin typeface="Calibri" charset="0"/>
                 <a:ea typeface="ＭＳ Ｐゴシック" charset="0"/>
                 <a:cs typeface="ＭＳ Ｐゴシック" charset="0"/>
               </a:rPr>
-              <a:t>Learning Objectives of Tutorial</a:t>
-            </a:r>
+              <a:t>Learning Objectives of Tutorial </a:t>
+            </a:r>
+            <a:r>
+              <a:rPr lang="en-US" altLang="ko-KR" dirty="0" smtClean="0">
+                <a:latin typeface="Calibri" charset="0"/>
+                <a:ea typeface="ＭＳ Ｐゴシック" charset="0"/>
+                <a:cs typeface="ＭＳ Ｐゴシック" charset="0"/>
+              </a:rPr>
+              <a:t>2</a:t>
+            </a:r>
+            <a:endParaRPr lang="en-US" altLang="ko-KR" dirty="0">
+              <a:latin typeface="Calibri" charset="0"/>
+              <a:ea typeface="ＭＳ Ｐゴシック" charset="0"/>
+              <a:cs typeface="ＭＳ Ｐゴシック" charset="0"/>
+            </a:endParaRPr>
           </a:p>
         </p:txBody>
       </p:sp>
@@ -5844,26 +7178,20 @@
         </p:nvSpPr>
         <p:spPr>
           <a:xfrm>
-            <a:off x="179388" y="981075"/>
-            <a:ext cx="8856662" cy="5184775"/>
+            <a:off x="179388" y="1185863"/>
+            <a:ext cx="8839200" cy="4906962"/>
           </a:xfrm>
         </p:spPr>
         <p:txBody>
           <a:bodyPr/>
           <a:lstStyle/>
           <a:p>
-            <a:endParaRPr lang="en-US">
-              <a:latin typeface="Calibri" charset="0"/>
-              <a:ea typeface="ＭＳ Ｐゴシック" charset="0"/>
-            </a:endParaRPr>
-          </a:p>
-          <a:p>
             <a:r>
               <a:rPr lang="en-US">
                 <a:latin typeface="Calibri" charset="0"/>
                 <a:ea typeface="ＭＳ Ｐゴシック" charset="0"/>
               </a:rPr>
-              <a:t>Run Bowtie2/TopHat2 (or STAR) with parameters suitable for gene expression analysis</a:t>
+              <a:t>Install commonly used RNA-seq tools (Samtools, Bowtie, Tophat, STAR, Cufflinks, R, CummeRbund, FastQC, picard-tools, SamStat)</a:t>
             </a:r>
           </a:p>
           <a:p>
@@ -5872,7 +7200,7 @@
                 <a:latin typeface="Calibri" charset="0"/>
                 <a:ea typeface="ＭＳ Ｐゴシック" charset="0"/>
               </a:rPr>
-              <a:t>Use samtools to demonstrate the features of the SAM/BAM format and basic manipulation of these alignment files (view, sort, index, filter)</a:t>
+              <a:t>Obtain a reference genome</a:t>
             </a:r>
           </a:p>
           <a:p>
@@ -5881,16 +7209,17 @@
                 <a:latin typeface="Calibri" charset="0"/>
                 <a:ea typeface="ＭＳ Ｐゴシック" charset="0"/>
               </a:rPr>
-              <a:t>Use IGV to visualize RNA-seq alignments, view a variant position, etc.</a:t>
-            </a:r>
-          </a:p>
-          <a:p>
+              <a:t>Obtain gene/transcript annotations</a:t>
+            </a:r>
+          </a:p>
+          <a:p>
+            <a:pPr lvl="1"/>
             <a:r>
               <a:rPr lang="en-US">
                 <a:latin typeface="Calibri" charset="0"/>
                 <a:ea typeface="ＭＳ Ｐゴシック" charset="0"/>
               </a:rPr>
-              <a:t>Determine BAM-read counts at a variant position</a:t>
+              <a:t>Understand GTF file format</a:t>
             </a:r>
           </a:p>
           <a:p>
@@ -5899,7 +7228,26 @@
                 <a:latin typeface="Calibri" charset="0"/>
                 <a:ea typeface="ＭＳ Ｐゴシック" charset="0"/>
               </a:rPr>
-              <a:t>Use samtools flagstat, samstat, FastQC to assess quality of alignments</a:t>
+              <a:t>Index reference genome files for use with aligners</a:t>
+            </a:r>
+          </a:p>
+          <a:p>
+            <a:r>
+              <a:rPr lang="en-US">
+                <a:latin typeface="Calibri" charset="0"/>
+                <a:ea typeface="ＭＳ Ｐゴシック" charset="0"/>
+              </a:rPr>
+              <a:t>Obtain and explore raw sequence data</a:t>
+            </a:r>
+          </a:p>
+          <a:p>
+            <a:pPr lvl="1"/>
+            <a:r>
+              <a:rPr lang="en-US">
+                <a:latin typeface="Calibri" charset="0"/>
+                <a:ea typeface="ＭＳ Ｐゴシック" charset="0"/>
+              </a:rPr>
+              <a:t>Understand fasta/fastq format</a:t>
             </a:r>
           </a:p>
         </p:txBody>
@@ -5907,7 +7255,7 @@
     </p:spTree>
     <p:extLst>
       <p:ext uri="{BB962C8B-B14F-4D97-AF65-F5344CB8AC3E}">
-        <p14:creationId xmlns:p14="http://schemas.microsoft.com/office/powerpoint/2010/main" val="285921979"/>
+        <p14:creationId xmlns:p14="http://schemas.microsoft.com/office/powerpoint/2010/main" val="614158551"/>
       </p:ext>
     </p:extLst>
   </p:cSld>
@@ -5962,18 +7310,18 @@
           <a:lstStyle/>
           <a:p>
             <a:r>
-              <a:rPr lang="en-US">
-                <a:latin typeface="Calibri" charset="0"/>
-                <a:ea typeface="ＭＳ Ｐゴシック" charset="0"/>
-              </a:rPr>
-              <a:t>Tutorial files</a:t>
+              <a:rPr lang="en-US" sz="3600">
+                <a:latin typeface="Calibri" charset="0"/>
+                <a:ea typeface="ＭＳ Ｐゴシック" charset="0"/>
+              </a:rPr>
+              <a:t>The most common problems encountered while working on the tutorials</a:t>
             </a:r>
           </a:p>
         </p:txBody>
       </p:sp>
       <p:sp>
         <p:nvSpPr>
-          <p:cNvPr id="14338" name="Content Placeholder 2"/>
+          <p:cNvPr id="3" name="Content Placeholder 2"/>
           <p:cNvSpPr>
             <a:spLocks noGrp="1"/>
           </p:cNvSpPr>
@@ -5983,111 +7331,193 @@
         </p:nvSpPr>
         <p:spPr>
           <a:xfrm>
-            <a:off x="152400" y="1196975"/>
-            <a:ext cx="8839200" cy="4968875"/>
+            <a:off x="152400" y="1441450"/>
+            <a:ext cx="8839200" cy="4724400"/>
           </a:xfrm>
         </p:spPr>
         <p:txBody>
-          <a:bodyPr/>
+          <a:bodyPr>
+            <a:normAutofit fontScale="70000" lnSpcReduction="20000"/>
+          </a:bodyPr>
           <a:lstStyle/>
           <a:p>
-            <a:r>
-              <a:rPr lang="en-US">
-                <a:latin typeface="Calibri" charset="0"/>
-                <a:ea typeface="ＭＳ Ｐゴシック" charset="0"/>
-              </a:rPr>
-              <a:t>One part</a:t>
-            </a:r>
-          </a:p>
-          <a:p>
-            <a:pPr lvl="1"/>
-            <a:r>
-              <a:rPr lang="en-US" b="1">
-                <a:latin typeface="Calibri" charset="0"/>
-                <a:ea typeface="ＭＳ Ｐゴシック" charset="0"/>
-              </a:rPr>
-              <a:t>Tutorial_Module2_Linux.txt</a:t>
-            </a:r>
-          </a:p>
-          <a:p>
-            <a:pPr lvl="2"/>
-            <a:r>
-              <a:rPr lang="en-US">
-                <a:latin typeface="Calibri" charset="0"/>
-                <a:ea typeface="ＭＳ Ｐゴシック" charset="0"/>
-              </a:rPr>
-              <a:t>Use Bowtie2/Tophat2 to align reads to the genome</a:t>
-            </a:r>
-          </a:p>
-          <a:p>
-            <a:pPr lvl="2"/>
-            <a:r>
-              <a:rPr lang="en-US">
-                <a:latin typeface="Calibri" charset="0"/>
-                <a:ea typeface="ＭＳ Ｐゴシック" charset="0"/>
-              </a:rPr>
-              <a:t>Compare performance of STAR aligner</a:t>
-            </a:r>
-          </a:p>
-          <a:p>
-            <a:pPr lvl="2"/>
-            <a:r>
-              <a:rPr lang="en-US">
-                <a:latin typeface="Calibri" charset="0"/>
-                <a:ea typeface="ＭＳ Ｐゴシック" charset="0"/>
-              </a:rPr>
-              <a:t>Examine features of SAM/BAM files</a:t>
-            </a:r>
-          </a:p>
-          <a:p>
-            <a:pPr lvl="2"/>
-            <a:r>
-              <a:rPr lang="en-US">
-                <a:latin typeface="Calibri" charset="0"/>
-                <a:ea typeface="ＭＳ Ｐゴシック" charset="0"/>
-              </a:rPr>
-              <a:t>Prepare files for loading in IGV</a:t>
-            </a:r>
-          </a:p>
-          <a:p>
-            <a:pPr lvl="2"/>
-            <a:r>
-              <a:rPr lang="en-US">
-                <a:latin typeface="Calibri" charset="0"/>
-                <a:ea typeface="ＭＳ Ｐゴシック" charset="0"/>
-              </a:rPr>
-              <a:t>Perform bam-read-count</a:t>
-            </a:r>
-          </a:p>
-          <a:p>
-            <a:pPr lvl="2"/>
-            <a:r>
-              <a:rPr lang="en-US">
-                <a:latin typeface="Calibri" charset="0"/>
-                <a:ea typeface="ＭＳ Ｐゴシック" charset="0"/>
-              </a:rPr>
-              <a:t>Create QC reports using samtools, FastQC, samstat</a:t>
-            </a:r>
+            <a:pPr marL="342900" lvl="1" indent="-342900">
+              <a:buFont typeface="Arial" charset="0"/>
+              <a:buChar char="•"/>
+              <a:defRPr/>
+            </a:pPr>
+            <a:r>
+              <a:rPr lang="en-US" sz="2800" dirty="0" smtClean="0"/>
+              <a:t>Type </a:t>
+            </a:r>
+            <a:r>
+              <a:rPr lang="en-US" sz="2800" dirty="0"/>
+              <a:t>short commands carefully if you </a:t>
+            </a:r>
+            <a:r>
+              <a:rPr lang="en-US" sz="2800" dirty="0" smtClean="0"/>
+              <a:t>like, </a:t>
+            </a:r>
+            <a:r>
+              <a:rPr lang="en-US" sz="2800" dirty="0"/>
+              <a:t>but in order to get through all the steps smoothly, </a:t>
+            </a:r>
+            <a:r>
+              <a:rPr lang="en-US" sz="2800" dirty="0" smtClean="0"/>
+              <a:t>it is safer </a:t>
+            </a:r>
+            <a:r>
+              <a:rPr lang="en-US" sz="2800" dirty="0"/>
+              <a:t>to copy and paste from the tutorial </a:t>
+            </a:r>
+            <a:r>
+              <a:rPr lang="en-US" sz="2800" dirty="0" smtClean="0"/>
+              <a:t>files</a:t>
+            </a:r>
+          </a:p>
+          <a:p>
+            <a:pPr>
+              <a:defRPr/>
+            </a:pPr>
+            <a:r>
+              <a:rPr lang="en-US" dirty="0" smtClean="0"/>
+              <a:t>Copy/Paste errors</a:t>
+            </a:r>
+          </a:p>
+          <a:p>
+            <a:pPr lvl="1">
+              <a:defRPr/>
+            </a:pPr>
+            <a:r>
+              <a:rPr lang="en-US" dirty="0" smtClean="0"/>
+              <a:t>Learn the short cuts for copying/pasting on your system and use them (e.g. &lt;command&gt;&lt;c&gt; &amp; &lt;command&gt;&lt;v&gt; on Mac)</a:t>
+            </a:r>
+          </a:p>
+          <a:p>
+            <a:pPr lvl="1">
+              <a:defRPr/>
+            </a:pPr>
+            <a:r>
+              <a:rPr lang="en-US" dirty="0" smtClean="0"/>
+              <a:t>Make sure you copy the entire command.  Watch out for commands that span across multiple lines</a:t>
+            </a:r>
+          </a:p>
+          <a:p>
+            <a:pPr>
+              <a:defRPr/>
+            </a:pPr>
+            <a:r>
+              <a:rPr lang="en-US" dirty="0" smtClean="0"/>
+              <a:t>Being in the wrong directory at the wrong time</a:t>
+            </a:r>
+          </a:p>
+          <a:p>
+            <a:pPr lvl="1">
+              <a:defRPr/>
+            </a:pPr>
+            <a:r>
+              <a:rPr lang="en-US" dirty="0" smtClean="0"/>
+              <a:t>The simplest way to avoid this is only change directories as instructed</a:t>
+            </a:r>
+          </a:p>
+          <a:p>
+            <a:pPr lvl="1">
+              <a:defRPr/>
+            </a:pPr>
+            <a:r>
+              <a:rPr lang="en-US" dirty="0" smtClean="0"/>
+              <a:t>If you do change directories to look around, make sure you go back before continuing with commands</a:t>
+            </a:r>
+          </a:p>
+          <a:p>
+            <a:pPr>
+              <a:defRPr/>
+            </a:pPr>
+            <a:r>
+              <a:rPr lang="en-US" dirty="0" smtClean="0"/>
+              <a:t>Not having the $RNA_HOME environment variable set</a:t>
+            </a:r>
+          </a:p>
+          <a:p>
+            <a:pPr lvl="1">
+              <a:defRPr/>
+            </a:pPr>
+            <a:r>
+              <a:rPr lang="en-US" dirty="0" smtClean="0"/>
+              <a:t>Make sure you check this when logging in:</a:t>
+            </a:r>
+          </a:p>
+          <a:p>
+            <a:pPr lvl="2">
+              <a:defRPr/>
+            </a:pPr>
+            <a:r>
+              <a:rPr lang="en-US" dirty="0"/>
+              <a:t>e</a:t>
+            </a:r>
+            <a:r>
+              <a:rPr lang="en-US" dirty="0" smtClean="0"/>
+              <a:t>cho $RNA_HOME</a:t>
+            </a:r>
+            <a:endParaRPr lang="en-US" dirty="0"/>
+          </a:p>
+          <a:p>
+            <a:pPr lvl="1">
+              <a:defRPr/>
+            </a:pPr>
+            <a:r>
+              <a:rPr lang="en-US" dirty="0" smtClean="0"/>
+              <a:t>If it is not defined do this:</a:t>
+            </a:r>
+          </a:p>
+          <a:p>
+            <a:pPr lvl="2">
+              <a:defRPr/>
+            </a:pPr>
+            <a:r>
+              <a:rPr lang="en-US" dirty="0" smtClean="0"/>
+              <a:t>export </a:t>
+            </a:r>
+            <a:r>
+              <a:rPr lang="en-US" dirty="0"/>
+              <a:t>RNA_HOME=~/workspace/</a:t>
+            </a:r>
+            <a:r>
+              <a:rPr lang="en-US" dirty="0" err="1" smtClean="0"/>
+              <a:t>rnaseq</a:t>
+            </a:r>
+            <a:endParaRPr lang="en-US" dirty="0" smtClean="0"/>
+          </a:p>
+          <a:p>
+            <a:pPr lvl="1">
+              <a:defRPr/>
+            </a:pPr>
+            <a:r>
+              <a:rPr lang="en-US" dirty="0" smtClean="0"/>
+              <a:t>Then add this to you .</a:t>
+            </a:r>
+            <a:r>
+              <a:rPr lang="en-US" dirty="0" err="1" smtClean="0"/>
+              <a:t>bashrc</a:t>
+            </a:r>
+            <a:r>
+              <a:rPr lang="en-US" dirty="0" smtClean="0"/>
+              <a:t> file so that you don’t have to worry about it again</a:t>
+            </a:r>
+            <a:endParaRPr lang="en-US" dirty="0"/>
           </a:p>
         </p:txBody>
       </p:sp>
     </p:spTree>
     <p:extLst>
       <p:ext uri="{BB962C8B-B14F-4D97-AF65-F5344CB8AC3E}">
-        <p14:creationId xmlns:p14="http://schemas.microsoft.com/office/powerpoint/2010/main" val="3827389115"/>
+        <p14:creationId xmlns:p14="http://schemas.microsoft.com/office/powerpoint/2010/main" val="4043984734"/>
       </p:ext>
     </p:extLst>
   </p:cSld>
   <p:clrMapOvr>
     <a:masterClrMapping/>
   </p:clrMapOvr>
-  <p:timing>
-    <p:tnLst>
-      <p:par>
-        <p:cTn xmlns:p14="http://schemas.microsoft.com/office/powerpoint/2010/main" id="1" dur="indefinite" restart="never" nodeType="tmRoot"/>
-      </p:par>
-    </p:tnLst>
-  </p:timing>
 </p:sld>
 </file>
 
@@ -6110,9 +7540,9 @@
       </p:grpSpPr>
       <p:sp>
         <p:nvSpPr>
-          <p:cNvPr id="15361" name="Rectangle 2"/>
+          <p:cNvPr id="16385" name="Title 1"/>
           <p:cNvSpPr>
-            <a:spLocks noGrp="1" noChangeArrowheads="1"/>
+            <a:spLocks noGrp="1"/>
           </p:cNvSpPr>
           <p:nvPr>
             <p:ph type="title"/>
@@ -6120,29 +7550,27 @@
         </p:nvSpPr>
         <p:spPr>
           <a:xfrm>
-            <a:off x="152400" y="44450"/>
-            <a:ext cx="8839200" cy="1143000"/>
+            <a:off x="152400" y="-26988"/>
+            <a:ext cx="8839200" cy="1143001"/>
           </a:xfrm>
         </p:spPr>
         <p:txBody>
           <a:bodyPr/>
           <a:lstStyle/>
           <a:p>
-            <a:pPr eaLnBrk="1" hangingPunct="1"/>
-            <a:r>
-              <a:rPr lang="en-US" altLang="ko-KR">
-                <a:latin typeface="Calibri" charset="0"/>
-                <a:ea typeface="ＭＳ Ｐゴシック" charset="0"/>
-                <a:cs typeface="ＭＳ Ｐゴシック" charset="0"/>
-              </a:rPr>
-              <a:t>6. Align reads with tophat</a:t>
+            <a:r>
+              <a:rPr lang="en-US">
+                <a:latin typeface="Calibri" charset="0"/>
+                <a:ea typeface="ＭＳ Ｐゴシック" charset="0"/>
+              </a:rPr>
+              <a:t>Introduction</a:t>
             </a:r>
           </a:p>
         </p:txBody>
       </p:sp>
       <p:sp>
         <p:nvSpPr>
-          <p:cNvPr id="15362" name="Content Placeholder 6"/>
+          <p:cNvPr id="16386" name="Content Placeholder 2"/>
           <p:cNvSpPr>
             <a:spLocks noGrp="1"/>
           </p:cNvSpPr>
@@ -6152,8 +7580,8 @@
         </p:nvSpPr>
         <p:spPr>
           <a:xfrm>
-            <a:off x="152400" y="1268413"/>
-            <a:ext cx="8839200" cy="4979987"/>
+            <a:off x="152400" y="1341438"/>
+            <a:ext cx="8839200" cy="4983162"/>
           </a:xfrm>
         </p:spPr>
         <p:txBody>
@@ -6170,7 +7598,91 @@
                 <a:latin typeface="Calibri" charset="0"/>
                 <a:ea typeface="ＭＳ Ｐゴシック" charset="0"/>
               </a:rPr>
-              <a:t>Align all reads in the 8 libraries of the test data</a:t>
+              <a:t>This presentation provides a brief description of tutorial steps</a:t>
+            </a:r>
+          </a:p>
+          <a:p>
+            <a:pPr>
+              <a:lnSpc>
+                <a:spcPct val="80000"/>
+              </a:lnSpc>
+            </a:pPr>
+            <a:r>
+              <a:rPr lang="en-US" sz="2600">
+                <a:latin typeface="Calibri" charset="0"/>
+                <a:ea typeface="ＭＳ Ｐゴシック" charset="0"/>
+              </a:rPr>
+              <a:t>The tutorial file contains more complete instructions</a:t>
+            </a:r>
+          </a:p>
+          <a:p>
+            <a:pPr>
+              <a:lnSpc>
+                <a:spcPct val="80000"/>
+              </a:lnSpc>
+            </a:pPr>
+            <a:r>
+              <a:rPr lang="en-US" sz="2600">
+                <a:latin typeface="Calibri" charset="0"/>
+                <a:ea typeface="ＭＳ Ｐゴシック" charset="0"/>
+              </a:rPr>
+              <a:t>Lines in the tutorial file beginning with </a:t>
+            </a:r>
+            <a:r>
+              <a:rPr lang="ja-JP" altLang="en-US" sz="2600">
+                <a:latin typeface="Calibri" charset="0"/>
+                <a:ea typeface="ＭＳ Ｐゴシック" charset="0"/>
+              </a:rPr>
+              <a:t>“</a:t>
+            </a:r>
+            <a:r>
+              <a:rPr lang="en-US" altLang="ja-JP" sz="2600">
+                <a:latin typeface="Calibri" charset="0"/>
+                <a:ea typeface="ＭＳ Ｐゴシック" charset="0"/>
+              </a:rPr>
+              <a:t>#</a:t>
+            </a:r>
+            <a:r>
+              <a:rPr lang="ja-JP" altLang="en-US" sz="2600">
+                <a:latin typeface="Calibri" charset="0"/>
+                <a:ea typeface="ＭＳ Ｐゴシック" charset="0"/>
+              </a:rPr>
+              <a:t>”</a:t>
+            </a:r>
+            <a:r>
+              <a:rPr lang="en-US" altLang="ja-JP" sz="2600">
+                <a:latin typeface="Calibri" charset="0"/>
+                <a:ea typeface="ＭＳ Ｐゴシック" charset="0"/>
+              </a:rPr>
+              <a:t> are comments</a:t>
+            </a:r>
+          </a:p>
+          <a:p>
+            <a:pPr>
+              <a:lnSpc>
+                <a:spcPct val="80000"/>
+              </a:lnSpc>
+            </a:pPr>
+            <a:r>
+              <a:rPr lang="en-US" sz="2600">
+                <a:latin typeface="Calibri" charset="0"/>
+                <a:ea typeface="ＭＳ Ｐゴシック" charset="0"/>
+              </a:rPr>
+              <a:t>All other lines are commands that will be pasted and executed from a linux terminal or R tutorial</a:t>
+            </a:r>
+          </a:p>
+          <a:p>
+            <a:pPr>
+              <a:lnSpc>
+                <a:spcPct val="80000"/>
+              </a:lnSpc>
+            </a:pPr>
+            <a:r>
+              <a:rPr lang="en-US" sz="2600">
+                <a:latin typeface="Calibri" charset="0"/>
+                <a:ea typeface="ＭＳ Ｐゴシック" charset="0"/>
+              </a:rPr>
+              <a:t>Each command is annotated with comments except that basic familiarity with linux is assumed</a:t>
             </a:r>
           </a:p>
           <a:p>
@@ -6184,7 +7696,105 @@
                 <a:latin typeface="Calibri" charset="0"/>
                 <a:ea typeface="ＭＳ Ｐゴシック" charset="0"/>
               </a:rPr>
-              <a:t>8 libraries with two files each (one for each read1 and read2 of the paired-end reads)</a:t>
+              <a:t>e.g.  You should know that </a:t>
+            </a:r>
+            <a:r>
+              <a:rPr lang="ja-JP" altLang="en-US" sz="2200">
+                <a:latin typeface="Calibri" charset="0"/>
+                <a:ea typeface="ＭＳ Ｐゴシック" charset="0"/>
+              </a:rPr>
+              <a:t>‘</a:t>
+            </a:r>
+            <a:r>
+              <a:rPr lang="en-US" altLang="ja-JP" sz="2200">
+                <a:latin typeface="Calibri" charset="0"/>
+                <a:ea typeface="ＭＳ Ｐゴシック" charset="0"/>
+              </a:rPr>
+              <a:t>mkdir</a:t>
+            </a:r>
+            <a:r>
+              <a:rPr lang="ja-JP" altLang="en-US" sz="2200">
+                <a:latin typeface="Calibri" charset="0"/>
+                <a:ea typeface="ＭＳ Ｐゴシック" charset="0"/>
+              </a:rPr>
+              <a:t>’</a:t>
+            </a:r>
+            <a:r>
+              <a:rPr lang="en-US" altLang="ja-JP" sz="2200">
+                <a:latin typeface="Calibri" charset="0"/>
+                <a:ea typeface="ＭＳ Ｐゴシック" charset="0"/>
+              </a:rPr>
+              <a:t> means to </a:t>
+            </a:r>
+            <a:r>
+              <a:rPr lang="ja-JP" altLang="en-US" sz="2200">
+                <a:latin typeface="Calibri" charset="0"/>
+                <a:ea typeface="ＭＳ Ｐゴシック" charset="0"/>
+              </a:rPr>
+              <a:t>‘</a:t>
+            </a:r>
+            <a:r>
+              <a:rPr lang="en-US" altLang="ja-JP" sz="2200">
+                <a:latin typeface="Calibri" charset="0"/>
+                <a:ea typeface="ＭＳ Ｐゴシック" charset="0"/>
+              </a:rPr>
+              <a:t>make a directory, </a:t>
+            </a:r>
+            <a:r>
+              <a:rPr lang="ja-JP" altLang="en-US" sz="2200">
+                <a:latin typeface="Calibri" charset="0"/>
+                <a:ea typeface="ＭＳ Ｐゴシック" charset="0"/>
+              </a:rPr>
+              <a:t>‘</a:t>
+            </a:r>
+            <a:r>
+              <a:rPr lang="en-US" altLang="ja-JP" sz="2200">
+                <a:latin typeface="Calibri" charset="0"/>
+                <a:ea typeface="ＭＳ Ｐゴシック" charset="0"/>
+              </a:rPr>
+              <a:t>cd</a:t>
+            </a:r>
+            <a:r>
+              <a:rPr lang="ja-JP" altLang="en-US" sz="2200">
+                <a:latin typeface="Calibri" charset="0"/>
+                <a:ea typeface="ＭＳ Ｐゴシック" charset="0"/>
+              </a:rPr>
+              <a:t>’</a:t>
+            </a:r>
+            <a:r>
+              <a:rPr lang="en-US" altLang="ja-JP" sz="2200">
+                <a:latin typeface="Calibri" charset="0"/>
+                <a:ea typeface="ＭＳ Ｐゴシック" charset="0"/>
+              </a:rPr>
+              <a:t> means to </a:t>
+            </a:r>
+            <a:r>
+              <a:rPr lang="ja-JP" altLang="en-US" sz="2200">
+                <a:latin typeface="Calibri" charset="0"/>
+                <a:ea typeface="ＭＳ Ｐゴシック" charset="0"/>
+              </a:rPr>
+              <a:t>‘</a:t>
+            </a:r>
+            <a:r>
+              <a:rPr lang="en-US" altLang="ja-JP" sz="2200">
+                <a:latin typeface="Calibri" charset="0"/>
+                <a:ea typeface="ＭＳ Ｐゴシック" charset="0"/>
+              </a:rPr>
+              <a:t>change directory</a:t>
+            </a:r>
+            <a:r>
+              <a:rPr lang="ja-JP" altLang="en-US" sz="2200">
+                <a:latin typeface="Calibri" charset="0"/>
+                <a:ea typeface="ＭＳ Ｐゴシック" charset="0"/>
+              </a:rPr>
+              <a:t>’</a:t>
+            </a:r>
+            <a:r>
+              <a:rPr lang="en-US" altLang="ja-JP" sz="2200">
+                <a:latin typeface="Calibri" charset="0"/>
+                <a:ea typeface="ＭＳ Ｐゴシック" charset="0"/>
+              </a:rPr>
+              <a:t>, etc.</a:t>
             </a:r>
           </a:p>
           <a:p>
@@ -6198,7 +7808,7 @@
                 <a:latin typeface="Calibri" charset="0"/>
                 <a:ea typeface="ＭＳ Ｐゴシック" charset="0"/>
               </a:rPr>
-              <a:t>Use tophat for the alignment</a:t>
+              <a:t>Some reference materials for linux can be found here:</a:t>
             </a:r>
           </a:p>
           <a:p>
@@ -6208,11 +7818,19 @@
               </a:lnSpc>
             </a:pPr>
             <a:r>
-              <a:rPr lang="en-US" sz="2200">
-                <a:latin typeface="Calibri" charset="0"/>
-                <a:ea typeface="ＭＳ Ｐゴシック" charset="0"/>
-              </a:rPr>
-              <a:t>Supply the gene GTF file obtained in step 3 </a:t>
+              <a:rPr lang="en-US" sz="2200" i="1">
+                <a:latin typeface="Calibri" charset="0"/>
+                <a:ea typeface="ＭＳ Ｐゴシック" charset="0"/>
+                <a:hlinkClick r:id="rId2"/>
+              </a:rPr>
+              <a:t>http://files.fosswire.com/2007/08/fwunixref.pdf</a:t>
+            </a:r>
+            <a:r>
+              <a:rPr lang="en-US" sz="2200" i="1">
+                <a:latin typeface="Calibri" charset="0"/>
+                <a:ea typeface="ＭＳ Ｐゴシック" charset="0"/>
+              </a:rPr>
+              <a:t> </a:t>
             </a:r>
           </a:p>
           <a:p>
@@ -6222,12 +7840,17 @@
               </a:lnSpc>
             </a:pPr>
             <a:r>
-              <a:rPr lang="en-US" sz="2200">
-                <a:latin typeface="Calibri" charset="0"/>
-                <a:ea typeface="ＭＳ Ｐゴシック" charset="0"/>
-              </a:rPr>
-              <a:t>Supply the bowtie indexed genome obtained in step 4</a:t>
-            </a:r>
+              <a:rPr lang="en-US" sz="2200" i="1">
+                <a:latin typeface="Calibri" charset="0"/>
+                <a:ea typeface="ＭＳ Ｐゴシック" charset="0"/>
+                <a:hlinkClick r:id="rId3"/>
+              </a:rPr>
+              <a:t>http://vic.gedris.org/Manual-ShellIntro/1.2/ShellIntro.pdf</a:t>
+            </a:r>
+            <a:endParaRPr lang="en-US" sz="2200" i="1">
+              <a:latin typeface="Calibri" charset="0"/>
+              <a:ea typeface="ＭＳ Ｐゴシック" charset="0"/>
+            </a:endParaRPr>
           </a:p>
           <a:p>
             <a:pPr lvl="1">
@@ -6236,96 +7859,19 @@
               </a:lnSpc>
             </a:pPr>
             <a:r>
-              <a:rPr lang="en-US" sz="2200">
-                <a:latin typeface="Calibri" charset="0"/>
-                <a:ea typeface="ＭＳ Ｐゴシック" charset="0"/>
-              </a:rPr>
-              <a:t>The </a:t>
-            </a:r>
-            <a:r>
-              <a:rPr lang="ja-JP" altLang="en-US" sz="2200">
-                <a:latin typeface="Calibri" charset="0"/>
-                <a:ea typeface="ＭＳ Ｐゴシック" charset="0"/>
-              </a:rPr>
-              <a:t>‘</a:t>
-            </a:r>
-            <a:r>
-              <a:rPr lang="en-US" altLang="ja-JP" sz="2200">
-                <a:latin typeface="Calibri" charset="0"/>
-                <a:ea typeface="ＭＳ Ｐゴシック" charset="0"/>
-              </a:rPr>
-              <a:t>-G</a:t>
-            </a:r>
-            <a:r>
-              <a:rPr lang="ja-JP" altLang="en-US" sz="2200">
-                <a:latin typeface="Calibri" charset="0"/>
-                <a:ea typeface="ＭＳ Ｐゴシック" charset="0"/>
-              </a:rPr>
-              <a:t>’</a:t>
-            </a:r>
-            <a:r>
-              <a:rPr lang="en-US" altLang="ja-JP" sz="2200">
-                <a:latin typeface="Calibri" charset="0"/>
-                <a:ea typeface="ＭＳ Ｐゴシック" charset="0"/>
-              </a:rPr>
-              <a:t> option tells tophat to look for the exon-exon junctions of known transcripts.  It will still look for novel exon-exon junctions as well</a:t>
-            </a:r>
-          </a:p>
-          <a:p>
-            <a:pPr>
-              <a:lnSpc>
-                <a:spcPct val="80000"/>
-              </a:lnSpc>
-            </a:pPr>
-            <a:r>
-              <a:rPr lang="en-US" sz="2600">
-                <a:latin typeface="Calibri" charset="0"/>
-                <a:ea typeface="ＭＳ Ｐゴシック" charset="0"/>
-              </a:rPr>
-              <a:t>Since there are 8 libraries in the test data set, 8 alignment commands are run</a:t>
-            </a:r>
-          </a:p>
-          <a:p>
-            <a:pPr>
-              <a:lnSpc>
-                <a:spcPct val="80000"/>
-              </a:lnSpc>
-            </a:pPr>
-            <a:r>
-              <a:rPr lang="en-US" sz="2600">
-                <a:latin typeface="Calibri" charset="0"/>
-                <a:ea typeface="ＭＳ Ｐゴシック" charset="0"/>
-              </a:rPr>
-              <a:t>On a test system, each of these alignments took ~1.5 minutes using 8 CPUs</a:t>
-            </a:r>
-          </a:p>
-          <a:p>
-            <a:pPr>
-              <a:lnSpc>
-                <a:spcPct val="80000"/>
-              </a:lnSpc>
-            </a:pPr>
-            <a:r>
-              <a:rPr lang="en-US" sz="2600">
-                <a:latin typeface="Calibri" charset="0"/>
-                <a:ea typeface="ＭＳ Ｐゴシック" charset="0"/>
-              </a:rPr>
-              <a:t>Each alignment job outputs a SAM/BAM file</a:t>
-            </a:r>
-          </a:p>
-          <a:p>
-            <a:pPr lvl="1">
-              <a:lnSpc>
-                <a:spcPct val="80000"/>
-              </a:lnSpc>
-            </a:pPr>
-            <a:r>
-              <a:rPr lang="en-US" sz="2200">
-                <a:latin typeface="Calibri" charset="0"/>
-                <a:ea typeface="ＭＳ Ｐゴシック" charset="0"/>
-                <a:hlinkClick r:id="rId3"/>
-              </a:rPr>
-              <a:t>http://samtools.sourceforge.net/SAM1.pdf</a:t>
+              <a:rPr lang="en-US" sz="2200" i="1">
+                <a:latin typeface="Calibri" charset="0"/>
+                <a:ea typeface="ＭＳ Ｐゴシック" charset="0"/>
+                <a:hlinkClick r:id="rId4"/>
+              </a:rPr>
+              <a:t>www.nettech.in/course/Basic%20Commands.pdf</a:t>
+            </a:r>
+            <a:r>
+              <a:rPr lang="en-US" sz="2200" i="1">
+                <a:latin typeface="Calibri" charset="0"/>
+                <a:ea typeface="ＭＳ Ｐゴシック" charset="0"/>
+              </a:rPr>
+              <a:t> </a:t>
             </a:r>
             <a:endParaRPr lang="en-US" sz="2200">
               <a:latin typeface="Calibri" charset="0"/>
@@ -6348,7 +7894,7 @@
     </p:spTree>
     <p:extLst>
       <p:ext uri="{BB962C8B-B14F-4D97-AF65-F5344CB8AC3E}">
-        <p14:creationId xmlns:p14="http://schemas.microsoft.com/office/powerpoint/2010/main" val="2602189266"/>
+        <p14:creationId xmlns:p14="http://schemas.microsoft.com/office/powerpoint/2010/main" val="2445311544"/>
       </p:ext>
     </p:extLst>
   </p:cSld>
@@ -6394,8 +7940,8 @@
         </p:nvSpPr>
         <p:spPr>
           <a:xfrm>
-            <a:off x="152400" y="44450"/>
-            <a:ext cx="8839200" cy="1143000"/>
+            <a:off x="152400" y="-26988"/>
+            <a:ext cx="8839200" cy="1143001"/>
           </a:xfrm>
         </p:spPr>
         <p:txBody>
@@ -6404,19 +7950,24 @@
           <a:p>
             <a:pPr eaLnBrk="1" hangingPunct="1"/>
             <a:r>
-              <a:rPr lang="en-US" altLang="ko-KR">
+              <a:rPr lang="en-US" altLang="ko-KR" dirty="0" smtClean="0">
                 <a:latin typeface="Calibri" charset="0"/>
                 <a:ea typeface="ＭＳ Ｐゴシック" charset="0"/>
                 <a:cs typeface="ＭＳ Ｐゴシック" charset="0"/>
               </a:rPr>
-              <a:t>6b. Align reads with STAR</a:t>
-            </a:r>
+              <a:t>2-i. Installation</a:t>
+            </a:r>
+            <a:endParaRPr lang="en-US" altLang="ko-KR" dirty="0">
+              <a:latin typeface="Calibri" charset="0"/>
+              <a:ea typeface="ＭＳ Ｐゴシック" charset="0"/>
+              <a:cs typeface="ＭＳ Ｐゴシック" charset="0"/>
+            </a:endParaRPr>
           </a:p>
         </p:txBody>
       </p:sp>
       <p:sp>
         <p:nvSpPr>
-          <p:cNvPr id="17410" name="Content Placeholder 6"/>
+          <p:cNvPr id="16386" name="Content Placeholder 6"/>
           <p:cNvSpPr>
             <a:spLocks noGrp="1"/>
           </p:cNvSpPr>
@@ -6431,20 +7982,23 @@
           </a:xfrm>
         </p:spPr>
         <p:txBody>
-          <a:bodyPr/>
+          <a:bodyPr>
+            <a:normAutofit fontScale="70000" lnSpcReduction="20000"/>
+          </a:bodyPr>
           <a:lstStyle/>
           <a:p>
             <a:pPr>
               <a:lnSpc>
                 <a:spcPct val="80000"/>
               </a:lnSpc>
-            </a:pPr>
-            <a:r>
-              <a:rPr lang="en-US" sz="2600">
-                <a:latin typeface="Calibri" charset="0"/>
-                <a:ea typeface="ＭＳ Ｐゴシック" charset="0"/>
-              </a:rPr>
-              <a:t>Again, align all reads in the 8 libraries of the test data, now with STAR</a:t>
+              <a:defRPr/>
+            </a:pPr>
+            <a:r>
+              <a:rPr lang="en-US" sz="2600" dirty="0">
+                <a:latin typeface="Calibri" charset="0"/>
+                <a:ea typeface="ＭＳ Ｐゴシック" charset="0"/>
+              </a:rPr>
+              <a:t>Installation instructions are provided for :</a:t>
             </a:r>
           </a:p>
           <a:p>
@@ -6452,99 +8006,137 @@
               <a:lnSpc>
                 <a:spcPct val="80000"/>
               </a:lnSpc>
-            </a:pPr>
-            <a:r>
-              <a:rPr lang="en-US" sz="2200">
-                <a:latin typeface="Calibri" charset="0"/>
-                <a:ea typeface="ＭＳ Ｐゴシック" charset="0"/>
-              </a:rPr>
-              <a:t>Supply the same gene GTF file obtained in step 3 </a:t>
-            </a:r>
+              <a:defRPr/>
+            </a:pPr>
+            <a:r>
+              <a:rPr lang="en-US" sz="2200" dirty="0" err="1">
+                <a:latin typeface="Calibri" charset="0"/>
+                <a:ea typeface="ＭＳ Ｐゴシック" charset="0"/>
+              </a:rPr>
+              <a:t>Samtools</a:t>
+            </a:r>
+            <a:endParaRPr lang="en-US" sz="2200" dirty="0">
+              <a:latin typeface="Calibri" charset="0"/>
+              <a:ea typeface="ＭＳ Ｐゴシック" charset="0"/>
+            </a:endParaRPr>
+          </a:p>
+          <a:p>
+            <a:pPr lvl="2">
+              <a:lnSpc>
+                <a:spcPct val="80000"/>
+              </a:lnSpc>
+              <a:defRPr/>
+            </a:pPr>
+            <a:r>
+              <a:rPr lang="en-US" sz="1900" dirty="0">
+                <a:latin typeface="Calibri" charset="0"/>
+                <a:ea typeface="ＭＳ Ｐゴシック" charset="0"/>
+                <a:hlinkClick r:id="rId3"/>
+              </a:rPr>
+              <a:t>http://samtools.sourceforge.net</a:t>
+            </a:r>
+            <a:r>
+              <a:rPr lang="en-US" sz="1900" dirty="0" smtClean="0">
+                <a:latin typeface="Calibri" charset="0"/>
+                <a:ea typeface="ＭＳ Ｐゴシック" charset="0"/>
+                <a:hlinkClick r:id="rId3"/>
+              </a:rPr>
+              <a:t>/</a:t>
+            </a:r>
+            <a:endParaRPr lang="en-US" sz="1900" dirty="0" smtClean="0">
+              <a:latin typeface="Calibri" charset="0"/>
+              <a:ea typeface="ＭＳ Ｐゴシック" charset="0"/>
+            </a:endParaRPr>
           </a:p>
           <a:p>
             <a:pPr lvl="1">
               <a:lnSpc>
                 <a:spcPct val="80000"/>
               </a:lnSpc>
-            </a:pPr>
-            <a:r>
-              <a:rPr lang="en-US" sz="2200">
-                <a:latin typeface="Calibri" charset="0"/>
-                <a:ea typeface="ＭＳ Ｐゴシック" charset="0"/>
-              </a:rPr>
-              <a:t>Supply the STAR indexed genome obtained in step 4</a:t>
-            </a:r>
+              <a:defRPr/>
+            </a:pPr>
+            <a:r>
+              <a:rPr lang="en-US" sz="2300" dirty="0" smtClean="0">
+                <a:latin typeface="Calibri" charset="0"/>
+                <a:ea typeface="ＭＳ Ｐゴシック" charset="0"/>
+              </a:rPr>
+              <a:t>Bam-</a:t>
+            </a:r>
+            <a:r>
+              <a:rPr lang="en-US" sz="2300" dirty="0" err="1" smtClean="0">
+                <a:latin typeface="Calibri" charset="0"/>
+                <a:ea typeface="ＭＳ Ｐゴシック" charset="0"/>
+              </a:rPr>
+              <a:t>readcount</a:t>
+            </a:r>
+            <a:endParaRPr lang="en-US" sz="2300" dirty="0" smtClean="0">
+              <a:latin typeface="Calibri" charset="0"/>
+              <a:ea typeface="ＭＳ Ｐゴシック" charset="0"/>
+            </a:endParaRPr>
+          </a:p>
+          <a:p>
+            <a:pPr lvl="2">
+              <a:lnSpc>
+                <a:spcPct val="80000"/>
+              </a:lnSpc>
+              <a:defRPr/>
+            </a:pPr>
+            <a:r>
+              <a:rPr lang="en-US" sz="1900" dirty="0">
+                <a:latin typeface="Calibri" charset="0"/>
+                <a:ea typeface="ＭＳ Ｐゴシック" charset="0"/>
+                <a:hlinkClick r:id="rId4"/>
+              </a:rPr>
+              <a:t>https://github.com/genome/bam-</a:t>
+            </a:r>
+            <a:r>
+              <a:rPr lang="en-US" sz="1900" dirty="0" smtClean="0">
+                <a:latin typeface="Calibri" charset="0"/>
+                <a:ea typeface="ＭＳ Ｐゴシック" charset="0"/>
+                <a:hlinkClick r:id="rId4"/>
+              </a:rPr>
+              <a:t>readcount</a:t>
+            </a:r>
+            <a:endParaRPr lang="en-US" sz="1900" dirty="0" smtClean="0">
+              <a:latin typeface="Calibri" charset="0"/>
+              <a:ea typeface="ＭＳ Ｐゴシック" charset="0"/>
+            </a:endParaRPr>
           </a:p>
           <a:p>
             <a:pPr lvl="1">
               <a:lnSpc>
                 <a:spcPct val="80000"/>
               </a:lnSpc>
-            </a:pPr>
-            <a:r>
-              <a:rPr lang="en-US" sz="2200">
-                <a:latin typeface="Calibri" charset="0"/>
-                <a:ea typeface="ＭＳ Ｐゴシック" charset="0"/>
-              </a:rPr>
-              <a:t>The </a:t>
-            </a:r>
-            <a:r>
-              <a:rPr lang="ja-JP" altLang="en-US" sz="2200">
-                <a:latin typeface="Calibri" charset="0"/>
-                <a:ea typeface="ＭＳ Ｐゴシック" charset="0"/>
-              </a:rPr>
-              <a:t>‘</a:t>
-            </a:r>
-            <a:r>
-              <a:rPr lang="en-US" altLang="ja-JP" sz="2200">
-                <a:latin typeface="Calibri" charset="0"/>
-                <a:ea typeface="ＭＳ Ｐゴシック" charset="0"/>
-              </a:rPr>
-              <a:t>-outSAMstrandField intronMotif</a:t>
-            </a:r>
-            <a:r>
-              <a:rPr lang="ja-JP" altLang="en-US" sz="2200">
-                <a:latin typeface="Calibri" charset="0"/>
-                <a:ea typeface="ＭＳ Ｐゴシック" charset="0"/>
-              </a:rPr>
-              <a:t>’</a:t>
-            </a:r>
-            <a:r>
-              <a:rPr lang="en-US" altLang="ja-JP" sz="2200">
-                <a:latin typeface="Calibri" charset="0"/>
-                <a:ea typeface="ＭＳ Ｐゴシック" charset="0"/>
-              </a:rPr>
-              <a:t>is needed so that STAR produces an alignment compatible with cufflinks</a:t>
-            </a:r>
-          </a:p>
-          <a:p>
-            <a:pPr>
+              <a:defRPr/>
+            </a:pPr>
+            <a:r>
+              <a:rPr lang="en-US" sz="2600" dirty="0" smtClean="0">
+                <a:latin typeface="Calibri" charset="0"/>
+                <a:ea typeface="ＭＳ Ｐゴシック" charset="0"/>
+              </a:rPr>
+              <a:t>Bowtie</a:t>
+            </a:r>
+            <a:endParaRPr lang="en-US" sz="2600" dirty="0">
+              <a:latin typeface="Calibri" charset="0"/>
+              <a:ea typeface="ＭＳ Ｐゴシック" charset="0"/>
+            </a:endParaRPr>
+          </a:p>
+          <a:p>
+            <a:pPr lvl="2">
               <a:lnSpc>
                 <a:spcPct val="80000"/>
               </a:lnSpc>
-            </a:pPr>
-            <a:r>
-              <a:rPr lang="en-US" sz="2600">
-                <a:latin typeface="Calibri" charset="0"/>
-                <a:ea typeface="ＭＳ Ｐゴシック" charset="0"/>
-              </a:rPr>
-              <a:t>How long did the alignment take compared to tophat?</a:t>
-            </a:r>
-          </a:p>
-          <a:p>
-            <a:pPr>
-              <a:lnSpc>
-                <a:spcPct val="80000"/>
-              </a:lnSpc>
-            </a:pPr>
-            <a:r>
-              <a:rPr lang="en-US" sz="2600">
-                <a:latin typeface="Calibri" charset="0"/>
-                <a:ea typeface="ＭＳ Ｐゴシック" charset="0"/>
-              </a:rPr>
-              <a:t>What additional steps are needed?</a:t>
-            </a:r>
-            <a:endParaRPr lang="en-US" sz="2200">
+              <a:defRPr/>
+            </a:pPr>
+            <a:r>
+              <a:rPr lang="en-US" sz="1900" dirty="0">
+                <a:latin typeface="Calibri" charset="0"/>
+                <a:ea typeface="ＭＳ Ｐゴシック" charset="0"/>
+                <a:hlinkClick r:id="rId5"/>
+              </a:rPr>
+              <a:t>http://bowtie-bio.sourceforge.net/</a:t>
+            </a:r>
+            <a:endParaRPr lang="en-US" sz="1900" dirty="0">
               <a:latin typeface="Calibri" charset="0"/>
               <a:ea typeface="ＭＳ Ｐゴシック" charset="0"/>
             </a:endParaRPr>
@@ -6554,8 +8146,487 @@
               <a:lnSpc>
                 <a:spcPct val="80000"/>
               </a:lnSpc>
-            </a:pPr>
-            <a:endParaRPr lang="en-US" sz="2200">
+              <a:defRPr/>
+            </a:pPr>
+            <a:r>
+              <a:rPr lang="en-US" sz="2200" dirty="0" err="1">
+                <a:latin typeface="Calibri" charset="0"/>
+                <a:ea typeface="ＭＳ Ｐゴシック" charset="0"/>
+              </a:rPr>
+              <a:t>Tophat</a:t>
+            </a:r>
+            <a:endParaRPr lang="en-US" sz="2200" dirty="0">
+              <a:latin typeface="Calibri" charset="0"/>
+              <a:ea typeface="ＭＳ Ｐゴシック" charset="0"/>
+            </a:endParaRPr>
+          </a:p>
+          <a:p>
+            <a:pPr lvl="2">
+              <a:lnSpc>
+                <a:spcPct val="80000"/>
+              </a:lnSpc>
+              <a:defRPr/>
+            </a:pPr>
+            <a:r>
+              <a:rPr lang="en-US" sz="1900" dirty="0">
+                <a:latin typeface="Calibri" charset="0"/>
+                <a:ea typeface="ＭＳ Ｐゴシック" charset="0"/>
+                <a:hlinkClick r:id="rId6"/>
+              </a:rPr>
+              <a:t>http://tophat.cbcb.umd.edu/</a:t>
+            </a:r>
+            <a:endParaRPr lang="en-US" sz="1900" dirty="0">
+              <a:latin typeface="Calibri" charset="0"/>
+              <a:ea typeface="ＭＳ Ｐゴシック" charset="0"/>
+            </a:endParaRPr>
+          </a:p>
+          <a:p>
+            <a:pPr lvl="1">
+              <a:lnSpc>
+                <a:spcPct val="80000"/>
+              </a:lnSpc>
+              <a:defRPr/>
+            </a:pPr>
+            <a:r>
+              <a:rPr lang="en-US" sz="2200" dirty="0" smtClean="0">
+                <a:latin typeface="Calibri" charset="0"/>
+                <a:ea typeface="ＭＳ Ｐゴシック" charset="0"/>
+              </a:rPr>
+              <a:t>STAR</a:t>
+            </a:r>
+          </a:p>
+          <a:p>
+            <a:pPr lvl="2">
+              <a:lnSpc>
+                <a:spcPct val="80000"/>
+              </a:lnSpc>
+              <a:defRPr/>
+            </a:pPr>
+            <a:r>
+              <a:rPr lang="en-US" sz="1800" dirty="0">
+                <a:latin typeface="Calibri" charset="0"/>
+                <a:ea typeface="ＭＳ Ｐゴシック" charset="0"/>
+                <a:hlinkClick r:id="rId7"/>
+              </a:rPr>
+              <a:t>http://code.google.com/p/rna-star</a:t>
+            </a:r>
+            <a:r>
+              <a:rPr lang="en-US" sz="1800" dirty="0" smtClean="0">
+                <a:latin typeface="Calibri" charset="0"/>
+                <a:ea typeface="ＭＳ Ｐゴシック" charset="0"/>
+                <a:hlinkClick r:id="rId7"/>
+              </a:rPr>
+              <a:t>/</a:t>
+            </a:r>
+            <a:endParaRPr lang="en-US" sz="1800" dirty="0">
+              <a:latin typeface="Calibri" charset="0"/>
+              <a:ea typeface="ＭＳ Ｐゴシック" charset="0"/>
+            </a:endParaRPr>
+          </a:p>
+          <a:p>
+            <a:pPr lvl="1">
+              <a:lnSpc>
+                <a:spcPct val="80000"/>
+              </a:lnSpc>
+              <a:defRPr/>
+            </a:pPr>
+            <a:r>
+              <a:rPr lang="en-US" sz="2200" dirty="0" smtClean="0">
+                <a:latin typeface="Calibri" charset="0"/>
+                <a:ea typeface="ＭＳ Ｐゴシック" charset="0"/>
+              </a:rPr>
+              <a:t>Cufflinks</a:t>
+            </a:r>
+            <a:endParaRPr lang="en-US" sz="2200" dirty="0">
+              <a:latin typeface="Calibri" charset="0"/>
+              <a:ea typeface="ＭＳ Ｐゴシック" charset="0"/>
+            </a:endParaRPr>
+          </a:p>
+          <a:p>
+            <a:pPr lvl="2">
+              <a:lnSpc>
+                <a:spcPct val="80000"/>
+              </a:lnSpc>
+              <a:defRPr/>
+            </a:pPr>
+            <a:r>
+              <a:rPr lang="en-US" sz="1900" dirty="0">
+                <a:latin typeface="Calibri" charset="0"/>
+                <a:ea typeface="ＭＳ Ｐゴシック" charset="0"/>
+                <a:hlinkClick r:id="rId6"/>
+              </a:rPr>
+              <a:t>http://tophat.cbcb.umd.edu</a:t>
+            </a:r>
+            <a:r>
+              <a:rPr lang="en-US" sz="1900" dirty="0" smtClean="0">
+                <a:latin typeface="Calibri" charset="0"/>
+                <a:ea typeface="ＭＳ Ｐゴシック" charset="0"/>
+                <a:hlinkClick r:id="rId6"/>
+              </a:rPr>
+              <a:t>/</a:t>
+            </a:r>
+            <a:endParaRPr lang="en-US" sz="1900" dirty="0" smtClean="0">
+              <a:latin typeface="Calibri" charset="0"/>
+              <a:ea typeface="ＭＳ Ｐゴシック" charset="0"/>
+            </a:endParaRPr>
+          </a:p>
+          <a:p>
+            <a:pPr lvl="1">
+              <a:lnSpc>
+                <a:spcPct val="80000"/>
+              </a:lnSpc>
+              <a:defRPr/>
+            </a:pPr>
+            <a:r>
+              <a:rPr lang="en-US" sz="2300" dirty="0" err="1" smtClean="0">
+                <a:latin typeface="Calibri" charset="0"/>
+                <a:ea typeface="ＭＳ Ｐゴシック" charset="0"/>
+              </a:rPr>
+              <a:t>Htseq</a:t>
+            </a:r>
+            <a:r>
+              <a:rPr lang="en-US" sz="2300" dirty="0" smtClean="0">
+                <a:latin typeface="Calibri" charset="0"/>
+                <a:ea typeface="ＭＳ Ｐゴシック" charset="0"/>
+              </a:rPr>
+              <a:t>-count</a:t>
+            </a:r>
+          </a:p>
+          <a:p>
+            <a:pPr lvl="2">
+              <a:lnSpc>
+                <a:spcPct val="80000"/>
+              </a:lnSpc>
+              <a:defRPr/>
+            </a:pPr>
+            <a:r>
+              <a:rPr lang="en-US" sz="1900" dirty="0">
+                <a:latin typeface="Calibri" charset="0"/>
+                <a:ea typeface="ＭＳ Ｐゴシック" charset="0"/>
+                <a:hlinkClick r:id="rId8"/>
+              </a:rPr>
+              <a:t>http://www-huber.embl.de/users/anders/HTSeq/doc/</a:t>
+            </a:r>
+            <a:r>
+              <a:rPr lang="en-US" sz="1900" dirty="0" smtClean="0">
+                <a:latin typeface="Calibri" charset="0"/>
+                <a:ea typeface="ＭＳ Ｐゴシック" charset="0"/>
+                <a:hlinkClick r:id="rId8"/>
+              </a:rPr>
+              <a:t>count.html</a:t>
+            </a:r>
+            <a:endParaRPr lang="en-US" sz="1900" dirty="0">
+              <a:latin typeface="Calibri" charset="0"/>
+              <a:ea typeface="ＭＳ Ｐゴシック" charset="0"/>
+            </a:endParaRPr>
+          </a:p>
+          <a:p>
+            <a:pPr lvl="1">
+              <a:lnSpc>
+                <a:spcPct val="80000"/>
+              </a:lnSpc>
+              <a:defRPr/>
+            </a:pPr>
+            <a:r>
+              <a:rPr lang="en-US" sz="2200" dirty="0" smtClean="0">
+                <a:latin typeface="Calibri" charset="0"/>
+                <a:ea typeface="ＭＳ Ｐゴシック" charset="0"/>
+              </a:rPr>
+              <a:t>R/</a:t>
+            </a:r>
+            <a:r>
+              <a:rPr lang="en-US" sz="2000" dirty="0" err="1" smtClean="0">
+                <a:latin typeface="Calibri" charset="0"/>
+                <a:ea typeface="ＭＳ Ｐゴシック" charset="0"/>
+              </a:rPr>
+              <a:t>Bioconductor</a:t>
+            </a:r>
+            <a:r>
+              <a:rPr lang="en-US" sz="2000" dirty="0">
+                <a:latin typeface="Calibri" charset="0"/>
+                <a:ea typeface="ＭＳ Ｐゴシック" charset="0"/>
+              </a:rPr>
+              <a:t>/</a:t>
+            </a:r>
+            <a:r>
+              <a:rPr lang="en-US" sz="2000" dirty="0" err="1" smtClean="0">
+                <a:latin typeface="Calibri" charset="0"/>
+                <a:ea typeface="ＭＳ Ｐゴシック" charset="0"/>
+              </a:rPr>
+              <a:t>CummeRbund</a:t>
+            </a:r>
+            <a:r>
+              <a:rPr lang="en-US" sz="2000" dirty="0" smtClean="0">
+                <a:latin typeface="Calibri" charset="0"/>
+                <a:ea typeface="ＭＳ Ｐゴシック" charset="0"/>
+              </a:rPr>
+              <a:t>/</a:t>
+            </a:r>
+            <a:r>
+              <a:rPr lang="en-US" sz="2000" dirty="0" err="1" smtClean="0">
+                <a:latin typeface="Calibri" charset="0"/>
+                <a:ea typeface="ＭＳ Ｐゴシック" charset="0"/>
+              </a:rPr>
+              <a:t>edgeR</a:t>
+            </a:r>
+            <a:endParaRPr lang="en-US" sz="2200" dirty="0">
+              <a:latin typeface="Calibri" charset="0"/>
+              <a:ea typeface="ＭＳ Ｐゴシック" charset="0"/>
+            </a:endParaRPr>
+          </a:p>
+          <a:p>
+            <a:pPr lvl="2">
+              <a:lnSpc>
+                <a:spcPct val="80000"/>
+              </a:lnSpc>
+              <a:defRPr/>
+            </a:pPr>
+            <a:r>
+              <a:rPr lang="en-US" sz="1900" dirty="0">
+                <a:latin typeface="Calibri" charset="0"/>
+                <a:ea typeface="ＭＳ Ｐゴシック" charset="0"/>
+                <a:hlinkClick r:id="rId9"/>
+              </a:rPr>
+              <a:t>http://cran.r-project.org</a:t>
+            </a:r>
+            <a:r>
+              <a:rPr lang="en-US" sz="1900" dirty="0" smtClean="0">
+                <a:latin typeface="Calibri" charset="0"/>
+                <a:ea typeface="ＭＳ Ｐゴシック" charset="0"/>
+                <a:hlinkClick r:id="rId9"/>
+              </a:rPr>
+              <a:t>/</a:t>
+            </a:r>
+            <a:endParaRPr lang="en-US" sz="1900" dirty="0" smtClean="0">
+              <a:latin typeface="Calibri" charset="0"/>
+              <a:ea typeface="ＭＳ Ｐゴシック" charset="0"/>
+            </a:endParaRPr>
+          </a:p>
+          <a:p>
+            <a:pPr lvl="2">
+              <a:lnSpc>
+                <a:spcPct val="80000"/>
+              </a:lnSpc>
+              <a:defRPr/>
+            </a:pPr>
+            <a:r>
+              <a:rPr lang="en-US" sz="1900" dirty="0" smtClean="0">
+                <a:latin typeface="Calibri" charset="0"/>
+                <a:ea typeface="ＭＳ Ｐゴシック" charset="0"/>
+                <a:hlinkClick r:id="rId10"/>
+              </a:rPr>
+              <a:t>http://www.bioconductor.org/</a:t>
+            </a:r>
+            <a:endParaRPr lang="en-US" sz="1900" dirty="0" smtClean="0">
+              <a:latin typeface="Calibri" charset="0"/>
+              <a:ea typeface="ＭＳ Ｐゴシック" charset="0"/>
+            </a:endParaRPr>
+          </a:p>
+          <a:p>
+            <a:pPr lvl="2">
+              <a:lnSpc>
+                <a:spcPct val="80000"/>
+              </a:lnSpc>
+              <a:defRPr/>
+            </a:pPr>
+            <a:r>
+              <a:rPr lang="en-US" sz="1900" dirty="0">
+                <a:latin typeface="Calibri" charset="0"/>
+                <a:ea typeface="ＭＳ Ｐゴシック" charset="0"/>
+                <a:hlinkClick r:id="rId11"/>
+              </a:rPr>
+              <a:t>http://compbio.mit.edu/cummeRbund</a:t>
+            </a:r>
+            <a:r>
+              <a:rPr lang="en-US" sz="1900" dirty="0" smtClean="0">
+                <a:latin typeface="Calibri" charset="0"/>
+                <a:ea typeface="ＭＳ Ｐゴシック" charset="0"/>
+                <a:hlinkClick r:id="rId11"/>
+              </a:rPr>
+              <a:t>/</a:t>
+            </a:r>
+            <a:endParaRPr lang="en-US" sz="1900" dirty="0">
+              <a:latin typeface="Calibri" charset="0"/>
+              <a:ea typeface="ＭＳ Ｐゴシック" charset="0"/>
+            </a:endParaRPr>
+          </a:p>
+          <a:p>
+            <a:pPr lvl="2">
+              <a:lnSpc>
+                <a:spcPct val="80000"/>
+              </a:lnSpc>
+              <a:defRPr/>
+            </a:pPr>
+            <a:r>
+              <a:rPr lang="en-US" sz="1900" dirty="0">
+                <a:latin typeface="Calibri" charset="0"/>
+                <a:ea typeface="ＭＳ Ｐゴシック" charset="0"/>
+                <a:hlinkClick r:id="rId12"/>
+              </a:rPr>
+              <a:t>http://www.bioconductor.org/packages/release/bioc/html/</a:t>
+            </a:r>
+            <a:r>
+              <a:rPr lang="en-US" sz="1900" dirty="0" smtClean="0">
+                <a:latin typeface="Calibri" charset="0"/>
+                <a:ea typeface="ＭＳ Ｐゴシック" charset="0"/>
+                <a:hlinkClick r:id="rId12"/>
+              </a:rPr>
+              <a:t>edgeR.html</a:t>
+            </a:r>
+            <a:endParaRPr lang="en-US" sz="1900" dirty="0" smtClean="0">
+              <a:latin typeface="Calibri" charset="0"/>
+              <a:ea typeface="ＭＳ Ｐゴシック" charset="0"/>
+            </a:endParaRPr>
+          </a:p>
+          <a:p>
+            <a:pPr lvl="1">
+              <a:lnSpc>
+                <a:spcPct val="80000"/>
+              </a:lnSpc>
+              <a:defRPr/>
+            </a:pPr>
+            <a:r>
+              <a:rPr lang="en-US" sz="2300" dirty="0" err="1" smtClean="0">
+                <a:latin typeface="Calibri" charset="0"/>
+                <a:ea typeface="ＭＳ Ｐゴシック" charset="0"/>
+              </a:rPr>
+              <a:t>Samstat</a:t>
+            </a:r>
+            <a:endParaRPr lang="en-US" sz="2300" dirty="0" smtClean="0">
+              <a:latin typeface="Calibri" charset="0"/>
+              <a:ea typeface="ＭＳ Ｐゴシック" charset="0"/>
+            </a:endParaRPr>
+          </a:p>
+          <a:p>
+            <a:pPr lvl="2">
+              <a:lnSpc>
+                <a:spcPct val="80000"/>
+              </a:lnSpc>
+              <a:defRPr/>
+            </a:pPr>
+            <a:r>
+              <a:rPr lang="en-US" sz="1900" dirty="0">
+                <a:latin typeface="Calibri" charset="0"/>
+                <a:ea typeface="ＭＳ Ｐゴシック" charset="0"/>
+                <a:hlinkClick r:id="rId13"/>
+              </a:rPr>
+              <a:t>http://samstat.sourceforge.net</a:t>
+            </a:r>
+            <a:r>
+              <a:rPr lang="en-US" sz="1900" dirty="0" smtClean="0">
+                <a:latin typeface="Calibri" charset="0"/>
+                <a:ea typeface="ＭＳ Ｐゴシック" charset="0"/>
+                <a:hlinkClick r:id="rId13"/>
+              </a:rPr>
+              <a:t>/</a:t>
+            </a:r>
+            <a:endParaRPr lang="en-US" sz="1900" dirty="0" smtClean="0">
+              <a:latin typeface="Calibri" charset="0"/>
+              <a:ea typeface="ＭＳ Ｐゴシック" charset="0"/>
+            </a:endParaRPr>
+          </a:p>
+          <a:p>
+            <a:pPr lvl="1">
+              <a:lnSpc>
+                <a:spcPct val="80000"/>
+              </a:lnSpc>
+              <a:defRPr/>
+            </a:pPr>
+            <a:r>
+              <a:rPr lang="en-US" sz="2300" dirty="0" err="1" smtClean="0">
+                <a:latin typeface="Calibri" charset="0"/>
+                <a:ea typeface="ＭＳ Ｐゴシック" charset="0"/>
+              </a:rPr>
+              <a:t>FastQC</a:t>
+            </a:r>
+            <a:endParaRPr lang="en-US" sz="2300" dirty="0" smtClean="0">
+              <a:latin typeface="Calibri" charset="0"/>
+              <a:ea typeface="ＭＳ Ｐゴシック" charset="0"/>
+            </a:endParaRPr>
+          </a:p>
+          <a:p>
+            <a:pPr lvl="2">
+              <a:lnSpc>
+                <a:spcPct val="80000"/>
+              </a:lnSpc>
+              <a:defRPr/>
+            </a:pPr>
+            <a:r>
+              <a:rPr lang="en-US" sz="1900" dirty="0">
+                <a:latin typeface="Calibri" charset="0"/>
+                <a:ea typeface="ＭＳ Ｐゴシック" charset="0"/>
+                <a:hlinkClick r:id="rId14"/>
+              </a:rPr>
+              <a:t>https://sites.google.com/a/brown.edu/bioinformatics-in-biomed/</a:t>
+            </a:r>
+            <a:r>
+              <a:rPr lang="en-US" sz="1900" dirty="0" smtClean="0">
+                <a:latin typeface="Calibri" charset="0"/>
+                <a:ea typeface="ＭＳ Ｐゴシック" charset="0"/>
+                <a:hlinkClick r:id="rId14"/>
+              </a:rPr>
+              <a:t>fastqc</a:t>
+            </a:r>
+            <a:endParaRPr lang="en-US" sz="1900" dirty="0" smtClean="0">
+              <a:latin typeface="Calibri" charset="0"/>
+              <a:ea typeface="ＭＳ Ｐゴシック" charset="0"/>
+            </a:endParaRPr>
+          </a:p>
+          <a:p>
+            <a:pPr lvl="1">
+              <a:lnSpc>
+                <a:spcPct val="80000"/>
+              </a:lnSpc>
+              <a:defRPr/>
+            </a:pPr>
+            <a:r>
+              <a:rPr lang="en-US" sz="2300" dirty="0" err="1" smtClean="0">
+                <a:latin typeface="Calibri" charset="0"/>
+                <a:ea typeface="ＭＳ Ｐゴシック" charset="0"/>
+              </a:rPr>
+              <a:t>PicardTools</a:t>
+            </a:r>
+            <a:endParaRPr lang="en-US" sz="2300" dirty="0" smtClean="0">
+              <a:latin typeface="Calibri" charset="0"/>
+              <a:ea typeface="ＭＳ Ｐゴシック" charset="0"/>
+            </a:endParaRPr>
+          </a:p>
+          <a:p>
+            <a:pPr lvl="2">
+              <a:lnSpc>
+                <a:spcPct val="80000"/>
+              </a:lnSpc>
+              <a:defRPr/>
+            </a:pPr>
+            <a:r>
+              <a:rPr lang="en-US" sz="1900" dirty="0">
+                <a:latin typeface="Calibri" charset="0"/>
+                <a:ea typeface="ＭＳ Ｐゴシック" charset="0"/>
+                <a:hlinkClick r:id="rId15"/>
+              </a:rPr>
+              <a:t>http://picard.sourceforge.net</a:t>
+            </a:r>
+            <a:r>
+              <a:rPr lang="en-US" sz="1900" dirty="0" smtClean="0">
+                <a:latin typeface="Calibri" charset="0"/>
+                <a:ea typeface="ＭＳ Ｐゴシック" charset="0"/>
+                <a:hlinkClick r:id="rId15"/>
+              </a:rPr>
+              <a:t>/</a:t>
+            </a:r>
+            <a:endParaRPr lang="en-US" sz="1900" dirty="0" smtClean="0">
+              <a:latin typeface="Calibri" charset="0"/>
+              <a:ea typeface="ＭＳ Ｐゴシック" charset="0"/>
+            </a:endParaRPr>
+          </a:p>
+          <a:p>
+            <a:pPr lvl="1">
+              <a:lnSpc>
+                <a:spcPct val="80000"/>
+              </a:lnSpc>
+              <a:defRPr/>
+            </a:pPr>
+            <a:endParaRPr lang="en-US" sz="2300" dirty="0" smtClean="0">
               <a:latin typeface="Calibri" charset="0"/>
               <a:ea typeface="ＭＳ Ｐゴシック" charset="0"/>
             </a:endParaRPr>
@@ -6565,7 +8636,7 @@
     </p:spTree>
     <p:extLst>
       <p:ext uri="{BB962C8B-B14F-4D97-AF65-F5344CB8AC3E}">
-        <p14:creationId xmlns:p14="http://schemas.microsoft.com/office/powerpoint/2010/main" val="1231978828"/>
+        <p14:creationId xmlns:p14="http://schemas.microsoft.com/office/powerpoint/2010/main" val="4244728721"/>
       </p:ext>
     </p:extLst>
   </p:cSld>
@@ -6611,8 +8682,8 @@
         </p:nvSpPr>
         <p:spPr>
           <a:xfrm>
-            <a:off x="152400" y="44450"/>
-            <a:ext cx="8839200" cy="1143000"/>
+            <a:off x="152400" y="-26988"/>
+            <a:ext cx="8839200" cy="1143001"/>
           </a:xfrm>
         </p:spPr>
         <p:txBody>
@@ -6621,12 +8692,20 @@
           <a:p>
             <a:pPr eaLnBrk="1" hangingPunct="1"/>
             <a:r>
-              <a:rPr lang="en-US" altLang="ko-KR">
+              <a:rPr lang="en-US" altLang="ko-KR" dirty="0" smtClean="0">
                 <a:latin typeface="Calibri" charset="0"/>
                 <a:ea typeface="ＭＳ Ｐゴシック" charset="0"/>
                 <a:cs typeface="ＭＳ Ｐゴシック" charset="0"/>
               </a:rPr>
-              <a:t>7. Post-alignment vizualization</a:t>
+              <a:t>2-ii. Obtain </a:t>
+            </a:r>
+            <a:r>
+              <a:rPr lang="en-US" altLang="ko-KR" dirty="0">
+                <a:latin typeface="Calibri" charset="0"/>
+                <a:ea typeface="ＭＳ Ｐゴシック" charset="0"/>
+                <a:cs typeface="ＭＳ Ｐゴシック" charset="0"/>
+              </a:rPr>
+              <a:t>reference genome</a:t>
             </a:r>
           </a:p>
         </p:txBody>
@@ -6644,147 +8723,82 @@
         <p:spPr>
           <a:xfrm>
             <a:off x="152400" y="1268413"/>
-            <a:ext cx="8839200" cy="4979987"/>
+            <a:ext cx="8839200" cy="4897437"/>
           </a:xfrm>
         </p:spPr>
         <p:txBody>
           <a:bodyPr/>
           <a:lstStyle/>
           <a:p>
-            <a:pPr>
-              <a:lnSpc>
-                <a:spcPct val="80000"/>
-              </a:lnSpc>
-            </a:pPr>
-            <a:r>
-              <a:rPr lang="en-US" sz="2600">
-                <a:latin typeface="Calibri" charset="0"/>
-                <a:ea typeface="ＭＳ Ｐゴシック" charset="0"/>
-              </a:rPr>
-              <a:t>Create indexed versions of bam files</a:t>
-            </a:r>
-          </a:p>
-          <a:p>
-            <a:pPr lvl="1">
-              <a:lnSpc>
-                <a:spcPct val="80000"/>
-              </a:lnSpc>
-            </a:pPr>
-            <a:r>
-              <a:rPr lang="en-US" sz="2200">
-                <a:latin typeface="Calibri" charset="0"/>
-                <a:ea typeface="ＭＳ Ｐゴシック" charset="0"/>
-              </a:rPr>
-              <a:t>These are needed by IGV for efficient loading of alignments</a:t>
-            </a:r>
-          </a:p>
-          <a:p>
-            <a:pPr>
-              <a:lnSpc>
-                <a:spcPct val="80000"/>
-              </a:lnSpc>
-            </a:pPr>
-            <a:r>
-              <a:rPr lang="en-US" sz="2600">
-                <a:latin typeface="Calibri" charset="0"/>
-                <a:ea typeface="ＭＳ Ｐゴシック" charset="0"/>
-              </a:rPr>
-              <a:t>Visualize spliced alignments</a:t>
-            </a:r>
-          </a:p>
-          <a:p>
-            <a:pPr lvl="1">
-              <a:lnSpc>
-                <a:spcPct val="80000"/>
-              </a:lnSpc>
-            </a:pPr>
-            <a:r>
-              <a:rPr lang="en-US" sz="2200">
-                <a:latin typeface="Calibri" charset="0"/>
-                <a:ea typeface="ＭＳ Ｐゴシック" charset="0"/>
-              </a:rPr>
-              <a:t>Identify exon-exon junction supporting reads</a:t>
-            </a:r>
-          </a:p>
-          <a:p>
-            <a:pPr lvl="1">
-              <a:lnSpc>
-                <a:spcPct val="80000"/>
-              </a:lnSpc>
-            </a:pPr>
-            <a:r>
-              <a:rPr lang="en-US" sz="2200">
-                <a:latin typeface="Calibri" charset="0"/>
-                <a:ea typeface="ＭＳ Ｐゴシック" charset="0"/>
-              </a:rPr>
-              <a:t> Identify differentially expressed genes</a:t>
-            </a:r>
-          </a:p>
-          <a:p>
-            <a:pPr lvl="1">
-              <a:lnSpc>
-                <a:spcPct val="80000"/>
-              </a:lnSpc>
-            </a:pPr>
-            <a:r>
-              <a:rPr lang="en-US" sz="2200">
-                <a:latin typeface="Calibri" charset="0"/>
-                <a:ea typeface="ＭＳ Ｐゴシック" charset="0"/>
-              </a:rPr>
-              <a:t>Compare tophat and STAR alignments</a:t>
-            </a:r>
-          </a:p>
-          <a:p>
-            <a:pPr>
-              <a:lnSpc>
-                <a:spcPct val="80000"/>
-              </a:lnSpc>
-            </a:pPr>
-            <a:r>
-              <a:rPr lang="en-US" sz="2600">
-                <a:latin typeface="Calibri" charset="0"/>
-                <a:ea typeface="ＭＳ Ｐゴシック" charset="0"/>
-              </a:rPr>
-              <a:t>Try to find variant positions</a:t>
-            </a:r>
-          </a:p>
-          <a:p>
-            <a:pPr>
-              <a:lnSpc>
-                <a:spcPct val="80000"/>
-              </a:lnSpc>
-            </a:pPr>
-            <a:endParaRPr lang="en-US" sz="2600">
+            <a:r>
+              <a:rPr lang="en-US">
+                <a:latin typeface="Calibri" charset="0"/>
+                <a:ea typeface="ＭＳ Ｐゴシック" charset="0"/>
+              </a:rPr>
+              <a:t>All reference files are obtained from the Illumina iGenomes project</a:t>
+            </a:r>
+          </a:p>
+          <a:p>
+            <a:pPr lvl="1"/>
+            <a:r>
+              <a:rPr lang="en-US">
+                <a:latin typeface="Calibri" charset="0"/>
+                <a:ea typeface="ＭＳ Ｐゴシック" charset="0"/>
+                <a:hlinkClick r:id="rId3"/>
+              </a:rPr>
+              <a:t>http://cufflinks.cbcb.umd.edu/igenomes.html</a:t>
+            </a:r>
+            <a:endParaRPr lang="en-US">
               <a:latin typeface="Calibri" charset="0"/>
               <a:ea typeface="ＭＳ Ｐゴシック" charset="0"/>
             </a:endParaRPr>
           </a:p>
           <a:p>
-            <a:pPr>
-              <a:lnSpc>
-                <a:spcPct val="80000"/>
-              </a:lnSpc>
-            </a:pPr>
-            <a:r>
-              <a:rPr lang="en-US" sz="2600">
-                <a:latin typeface="Calibri" charset="0"/>
-                <a:ea typeface="ＭＳ Ｐゴシック" charset="0"/>
-              </a:rPr>
-              <a:t>Create a pileup from bam file</a:t>
-            </a:r>
-          </a:p>
-          <a:p>
-            <a:pPr>
-              <a:lnSpc>
-                <a:spcPct val="80000"/>
-              </a:lnSpc>
-            </a:pPr>
-            <a:r>
-              <a:rPr lang="en-US" sz="2600">
-                <a:latin typeface="Calibri" charset="0"/>
-                <a:ea typeface="ＭＳ Ｐゴシック" charset="0"/>
-              </a:rPr>
-              <a:t>Determine read counts at a specific position</a:t>
+            <a:r>
+              <a:rPr lang="en-US">
+                <a:latin typeface="Calibri" charset="0"/>
+                <a:ea typeface="ＭＳ Ｐゴシック" charset="0"/>
+              </a:rPr>
+              <a:t>This step downloads reference human genome files from iGenomes</a:t>
+            </a:r>
+          </a:p>
+          <a:p>
+            <a:pPr lvl="1"/>
+            <a:r>
+              <a:rPr lang="en-US">
+                <a:latin typeface="Calibri" charset="0"/>
+                <a:ea typeface="ＭＳ Ｐゴシック" charset="0"/>
+              </a:rPr>
+              <a:t>The GRCh37 (hg19) build of the human genome is used</a:t>
+            </a:r>
+          </a:p>
+          <a:p>
+            <a:r>
+              <a:rPr lang="en-US">
+                <a:latin typeface="Calibri" charset="0"/>
+                <a:ea typeface="ＭＳ Ｐゴシック" charset="0"/>
+              </a:rPr>
+              <a:t>For the tutorial, a single chromosome is used</a:t>
+            </a:r>
+          </a:p>
+          <a:p>
+            <a:pPr lvl="1"/>
+            <a:r>
+              <a:rPr lang="en-US">
+                <a:latin typeface="Calibri" charset="0"/>
+                <a:ea typeface="ＭＳ Ｐゴシック" charset="0"/>
+              </a:rPr>
+              <a:t>The reason for this is to reduce run time for the tutorial</a:t>
+            </a:r>
+          </a:p>
+          <a:p>
+            <a:pPr lvl="1"/>
+            <a:r>
+              <a:rPr lang="en-US">
+                <a:latin typeface="Calibri" charset="0"/>
+                <a:ea typeface="ＭＳ Ｐゴシック" charset="0"/>
+              </a:rPr>
+              <a:t>Instructions for downloading all chromosomes are provided</a:t>
             </a:r>
           </a:p>
         </p:txBody>
@@ -6792,7 +8806,7 @@
     </p:spTree>
     <p:extLst>
       <p:ext uri="{BB962C8B-B14F-4D97-AF65-F5344CB8AC3E}">
-        <p14:creationId xmlns:p14="http://schemas.microsoft.com/office/powerpoint/2010/main" val="3784241753"/>
+        <p14:creationId xmlns:p14="http://schemas.microsoft.com/office/powerpoint/2010/main" val="1936973441"/>
       </p:ext>
     </p:extLst>
   </p:cSld>
@@ -6828,9 +8842,9 @@
       </p:grpSpPr>
       <p:sp>
         <p:nvSpPr>
-          <p:cNvPr id="21505" name="Title 1"/>
+          <p:cNvPr id="21505" name="Rectangle 2"/>
           <p:cNvSpPr>
-            <a:spLocks noGrp="1"/>
+            <a:spLocks noGrp="1" noChangeArrowheads="1"/>
           </p:cNvSpPr>
           <p:nvPr>
             <p:ph type="title"/>
@@ -6846,61 +8860,163 @@
           <a:bodyPr/>
           <a:lstStyle/>
           <a:p>
-            <a:r>
-              <a:rPr lang="en-US" altLang="ko-KR">
+            <a:pPr eaLnBrk="1" hangingPunct="1"/>
+            <a:r>
+              <a:rPr lang="en-US" altLang="ko-KR" sz="3600" dirty="0" smtClean="0">
                 <a:latin typeface="Calibri" charset="0"/>
                 <a:ea typeface="ＭＳ Ｐゴシック" charset="0"/>
                 <a:cs typeface="ＭＳ Ｐゴシック" charset="0"/>
               </a:rPr>
-              <a:t>7. Post-alignment vizualization (IGV)</a:t>
+              <a:t>2-iii. Obtain </a:t>
+            </a:r>
+            <a:r>
+              <a:rPr lang="en-US" altLang="ko-KR" sz="3600" dirty="0">
+                <a:latin typeface="Calibri" charset="0"/>
+                <a:ea typeface="ＭＳ Ｐゴシック" charset="0"/>
+                <a:cs typeface="ＭＳ Ｐゴシック" charset="0"/>
+              </a:rPr>
+              <a:t>known transcript annotations</a:t>
+            </a:r>
+          </a:p>
+        </p:txBody>
+      </p:sp>
+      <p:sp>
+        <p:nvSpPr>
+          <p:cNvPr id="21506" name="Content Placeholder 6"/>
+          <p:cNvSpPr>
+            <a:spLocks noGrp="1"/>
+          </p:cNvSpPr>
+          <p:nvPr>
+            <p:ph idx="1"/>
+          </p:nvPr>
+        </p:nvSpPr>
+        <p:spPr>
+          <a:xfrm>
+            <a:off x="152400" y="1185863"/>
+            <a:ext cx="8839200" cy="4979987"/>
+          </a:xfrm>
+        </p:spPr>
+        <p:txBody>
+          <a:bodyPr/>
+          <a:lstStyle/>
+          <a:p>
+            <a:r>
+              <a:rPr lang="en-US">
+                <a:latin typeface="Calibri" charset="0"/>
+                <a:ea typeface="ＭＳ Ｐゴシック" charset="0"/>
+              </a:rPr>
+              <a:t>All annotation files are obtained from the Illumina iGenomes project</a:t>
+            </a:r>
+          </a:p>
+          <a:p>
+            <a:pPr lvl="1"/>
+            <a:r>
+              <a:rPr lang="en-US">
+                <a:latin typeface="Calibri" charset="0"/>
+                <a:ea typeface="ＭＳ Ｐゴシック" charset="0"/>
+                <a:hlinkClick r:id="rId3"/>
+              </a:rPr>
+              <a:t>http://cufflinks.cbcb.umd.edu/igenomes.html</a:t>
             </a:r>
             <a:endParaRPr lang="en-US">
               <a:latin typeface="Calibri" charset="0"/>
               <a:ea typeface="ＭＳ Ｐゴシック" charset="0"/>
             </a:endParaRPr>
           </a:p>
+          <a:p>
+            <a:pPr>
+              <a:lnSpc>
+                <a:spcPct val="90000"/>
+              </a:lnSpc>
+            </a:pPr>
+            <a:r>
+              <a:rPr lang="en-US">
+                <a:latin typeface="Calibri" charset="0"/>
+                <a:ea typeface="ＭＳ Ｐゴシック" charset="0"/>
+              </a:rPr>
+              <a:t>There are many other ways to obtain gene annotation files. For example:</a:t>
+            </a:r>
+          </a:p>
+          <a:p>
+            <a:pPr lvl="1">
+              <a:lnSpc>
+                <a:spcPct val="90000"/>
+              </a:lnSpc>
+            </a:pPr>
+            <a:r>
+              <a:rPr lang="en-US">
+                <a:latin typeface="Calibri" charset="0"/>
+                <a:ea typeface="ＭＳ Ｐゴシック" charset="0"/>
+              </a:rPr>
+              <a:t>UCSC Genome Browser, Ensembl API, BioMart, Entrez, Galaxy, etc. could also be used</a:t>
+            </a:r>
+          </a:p>
+          <a:p>
+            <a:pPr>
+              <a:lnSpc>
+                <a:spcPct val="90000"/>
+              </a:lnSpc>
+            </a:pPr>
+            <a:r>
+              <a:rPr lang="en-US">
+                <a:latin typeface="Calibri" charset="0"/>
+                <a:ea typeface="ＭＳ Ｐゴシック" charset="0"/>
+              </a:rPr>
+              <a:t>You will download GTF files describing human transcripts (exon coordinates, gene ids, gene symbols, etc.)</a:t>
+            </a:r>
+          </a:p>
+          <a:p>
+            <a:pPr>
+              <a:lnSpc>
+                <a:spcPct val="90000"/>
+              </a:lnSpc>
+            </a:pPr>
+            <a:r>
+              <a:rPr lang="en-US">
+                <a:latin typeface="Calibri" charset="0"/>
+                <a:ea typeface="ＭＳ Ｐゴシック" charset="0"/>
+              </a:rPr>
+              <a:t>Descriptions of the GTF file format can be found here:</a:t>
+            </a:r>
+          </a:p>
+          <a:p>
+            <a:pPr lvl="1">
+              <a:lnSpc>
+                <a:spcPct val="90000"/>
+              </a:lnSpc>
+            </a:pPr>
+            <a:r>
+              <a:rPr lang="en-US">
+                <a:latin typeface="Calibri" charset="0"/>
+                <a:ea typeface="ＭＳ Ｐゴシック" charset="0"/>
+                <a:hlinkClick r:id="rId4"/>
+              </a:rPr>
+              <a:t>http://genome.ucsc.edu/FAQ/FAQformat.html#format4</a:t>
+            </a:r>
+            <a:endParaRPr lang="en-US">
+              <a:latin typeface="Calibri" charset="0"/>
+              <a:ea typeface="ＭＳ Ｐゴシック" charset="0"/>
+            </a:endParaRPr>
+          </a:p>
         </p:txBody>
       </p:sp>
-      <p:pic>
-        <p:nvPicPr>
-          <p:cNvPr id="21506" name="Content Placeholder 3" descr="Screen Shot 2013-06-01 at 11.20.52 PM.png"/>
-          <p:cNvPicPr>
-            <a:picLocks noGrp="1" noChangeAspect="1"/>
-          </p:cNvPicPr>
-          <p:nvPr>
-            <p:ph idx="1"/>
-          </p:nvPr>
-        </p:nvPicPr>
-        <p:blipFill>
-          <a:blip r:embed="rId2">
-            <a:extLst>
-              <a:ext uri="{28A0092B-C50C-407E-A947-70E740481C1C}">
-                <a14:useLocalDpi xmlns:a14="http://schemas.microsoft.com/office/drawing/2010/main" val="0"/>
-              </a:ext>
-            </a:extLst>
-          </a:blip>
-          <a:srcRect t="-339" b="-339"/>
-          <a:stretch>
-            <a:fillRect/>
-          </a:stretch>
-        </p:blipFill>
-        <p:spPr>
-          <a:xfrm>
-            <a:off x="152400" y="1341438"/>
-            <a:ext cx="8839200" cy="4724400"/>
-          </a:xfrm>
-        </p:spPr>
-      </p:pic>
     </p:spTree>
     <p:extLst>
       <p:ext uri="{BB962C8B-B14F-4D97-AF65-F5344CB8AC3E}">
-        <p14:creationId xmlns:p14="http://schemas.microsoft.com/office/powerpoint/2010/main" val="2772641768"/>
+        <p14:creationId xmlns:p14="http://schemas.microsoft.com/office/powerpoint/2010/main" val="1031751133"/>
       </p:ext>
     </p:extLst>
   </p:cSld>
   <p:clrMapOvr>
     <a:masterClrMapping/>
   </p:clrMapOvr>
+  <p:timing>
+    <p:tnLst>
+      <p:par>
+        <p:cTn xmlns:p14="http://schemas.microsoft.com/office/powerpoint/2010/main" id="1" dur="indefinite" restart="never" nodeType="tmRoot"/>
+      </p:par>
+    </p:tnLst>
+  </p:timing>
 </p:sld>
 </file>
 
@@ -6923,9 +9039,9 @@
       </p:grpSpPr>
       <p:sp>
         <p:nvSpPr>
-          <p:cNvPr id="22529" name="Rectangle 2"/>
+          <p:cNvPr id="23553" name="Title 1"/>
           <p:cNvSpPr>
-            <a:spLocks noGrp="1" noChangeArrowheads="1"/>
+            <a:spLocks noGrp="1"/>
           </p:cNvSpPr>
           <p:nvPr>
             <p:ph type="title"/>
@@ -6933,7 +9049,7 @@
         </p:nvSpPr>
         <p:spPr>
           <a:xfrm>
-            <a:off x="152400" y="44450"/>
+            <a:off x="152400" y="44624"/>
             <a:ext cx="8839200" cy="1143000"/>
           </a:xfrm>
         </p:spPr>
@@ -6941,21 +9057,26 @@
           <a:bodyPr/>
           <a:lstStyle/>
           <a:p>
-            <a:pPr eaLnBrk="1" hangingPunct="1"/>
-            <a:r>
-              <a:rPr lang="en-US" altLang="ko-KR">
-                <a:latin typeface="Calibri" charset="0"/>
-                <a:ea typeface="ＭＳ Ｐゴシック" charset="0"/>
-                <a:cs typeface="ＭＳ Ｐゴシック" charset="0"/>
-              </a:rPr>
-              <a:t>8. Post-alignment QC</a:t>
+            <a:r>
+              <a:rPr lang="en-US" dirty="0" smtClean="0">
+                <a:latin typeface="Calibri" charset="0"/>
+                <a:ea typeface="ＭＳ Ｐゴシック" charset="0"/>
+              </a:rPr>
+              <a:t>2-iv. Create </a:t>
+            </a:r>
+            <a:r>
+              <a:rPr lang="en-US" dirty="0">
+                <a:latin typeface="Calibri" charset="0"/>
+                <a:ea typeface="ＭＳ Ｐゴシック" charset="0"/>
+              </a:rPr>
+              <a:t>Indexed reference genome</a:t>
             </a:r>
           </a:p>
         </p:txBody>
       </p:sp>
       <p:sp>
         <p:nvSpPr>
-          <p:cNvPr id="22530" name="Content Placeholder 6"/>
+          <p:cNvPr id="23554" name="Content Placeholder 2"/>
           <p:cNvSpPr>
             <a:spLocks noGrp="1"/>
           </p:cNvSpPr>
@@ -6963,104 +9084,85 @@
             <p:ph idx="1"/>
           </p:nvPr>
         </p:nvSpPr>
-        <p:spPr>
-          <a:xfrm>
-            <a:off x="152400" y="1268413"/>
-            <a:ext cx="8839200" cy="4979987"/>
-          </a:xfrm>
-        </p:spPr>
+        <p:spPr/>
         <p:txBody>
           <a:bodyPr/>
           <a:lstStyle/>
           <a:p>
-            <a:pPr>
-              <a:lnSpc>
-                <a:spcPct val="80000"/>
-              </a:lnSpc>
-            </a:pPr>
-            <a:r>
-              <a:rPr lang="en-US" sz="2600">
-                <a:latin typeface="Calibri" charset="0"/>
-                <a:ea typeface="ＭＳ Ｐゴシック" charset="0"/>
-              </a:rPr>
-              <a:t>Use 'samtools view' to see the format of a SAM/BAM alignment file</a:t>
-            </a:r>
-          </a:p>
-          <a:p>
-            <a:pPr lvl="1">
-              <a:lnSpc>
-                <a:spcPct val="80000"/>
-              </a:lnSpc>
-            </a:pPr>
-            <a:r>
-              <a:rPr lang="en-US" sz="2200">
-                <a:latin typeface="Calibri" charset="0"/>
-                <a:ea typeface="ＭＳ Ｐゴシック" charset="0"/>
-              </a:rPr>
-              <a:t>Use ‘FLAGs’ to filter out certain kinds of alignments</a:t>
-            </a:r>
-          </a:p>
-          <a:p>
-            <a:pPr>
-              <a:lnSpc>
-                <a:spcPct val="80000"/>
-              </a:lnSpc>
-            </a:pPr>
-            <a:r>
-              <a:rPr lang="en-US" sz="2600">
-                <a:latin typeface="Calibri" charset="0"/>
-                <a:ea typeface="ＭＳ Ｐゴシック" charset="0"/>
-              </a:rPr>
-              <a:t>Use 'samtools flagstat' to get a basic summary of an alignment</a:t>
-            </a:r>
-          </a:p>
-          <a:p>
-            <a:pPr>
-              <a:lnSpc>
-                <a:spcPct val="80000"/>
-              </a:lnSpc>
-            </a:pPr>
-            <a:r>
-              <a:rPr lang="en-US" sz="2600">
-                <a:latin typeface="Calibri" charset="0"/>
-                <a:ea typeface="ＭＳ Ｐゴシック" charset="0"/>
-              </a:rPr>
-              <a:t>Run samstat on Tumor/Normal BAMs and review the resulting report in your browser</a:t>
-            </a:r>
-          </a:p>
-          <a:p>
-            <a:pPr>
-              <a:lnSpc>
-                <a:spcPct val="80000"/>
-              </a:lnSpc>
-            </a:pPr>
-            <a:r>
-              <a:rPr lang="en-US" sz="2600">
-                <a:latin typeface="Calibri" charset="0"/>
-                <a:ea typeface="ＭＳ Ｐゴシック" charset="0"/>
-              </a:rPr>
-              <a:t>Use FastQC to perform basic QC of your alignments</a:t>
-            </a:r>
+            <a:r>
+              <a:rPr lang="en-US">
+                <a:latin typeface="Calibri" charset="0"/>
+                <a:ea typeface="ＭＳ Ｐゴシック" charset="0"/>
+              </a:rPr>
+              <a:t>Before sequences can be mapped to the genome, it must be </a:t>
+            </a:r>
+            <a:r>
+              <a:rPr lang="ja-JP" altLang="en-US">
+                <a:latin typeface="Calibri" charset="0"/>
+                <a:ea typeface="ＭＳ Ｐゴシック" charset="0"/>
+              </a:rPr>
+              <a:t>‘</a:t>
+            </a:r>
+            <a:r>
+              <a:rPr lang="en-US" altLang="ja-JP">
+                <a:latin typeface="Calibri" charset="0"/>
+                <a:ea typeface="ＭＳ Ｐゴシック" charset="0"/>
+              </a:rPr>
+              <a:t>indexed</a:t>
+            </a:r>
+            <a:r>
+              <a:rPr lang="ja-JP" altLang="en-US">
+                <a:latin typeface="Calibri" charset="0"/>
+                <a:ea typeface="ＭＳ Ｐゴシック" charset="0"/>
+              </a:rPr>
+              <a:t>’</a:t>
+            </a:r>
+            <a:r>
+              <a:rPr lang="en-US" altLang="ja-JP">
+                <a:latin typeface="Calibri" charset="0"/>
+                <a:ea typeface="ＭＳ Ｐゴシック" charset="0"/>
+              </a:rPr>
+              <a:t> in a way that is compatible with the aligner being used</a:t>
+            </a:r>
+          </a:p>
+          <a:p>
+            <a:pPr lvl="1"/>
+            <a:r>
+              <a:rPr lang="en-US">
+                <a:latin typeface="Calibri" charset="0"/>
+                <a:ea typeface="ＭＳ Ｐゴシック" charset="0"/>
+              </a:rPr>
+              <a:t>Bowtie is used to index the genome for Tophat alignments</a:t>
+            </a:r>
+          </a:p>
+          <a:p>
+            <a:pPr lvl="1"/>
+            <a:r>
+              <a:rPr lang="en-US">
+                <a:latin typeface="Calibri" charset="0"/>
+                <a:ea typeface="ＭＳ Ｐゴシック" charset="0"/>
+              </a:rPr>
+              <a:t>We will also optionally try the STAR aligner which requires its own indexed version of the genome</a:t>
+            </a:r>
+          </a:p>
+          <a:p>
+            <a:endParaRPr lang="en-US">
+              <a:latin typeface="Calibri" charset="0"/>
+              <a:ea typeface="ＭＳ Ｐゴシック" charset="0"/>
+            </a:endParaRPr>
           </a:p>
         </p:txBody>
       </p:sp>
     </p:spTree>
     <p:extLst>
       <p:ext uri="{BB962C8B-B14F-4D97-AF65-F5344CB8AC3E}">
-        <p14:creationId xmlns:p14="http://schemas.microsoft.com/office/powerpoint/2010/main" val="387996559"/>
+        <p14:creationId xmlns:p14="http://schemas.microsoft.com/office/powerpoint/2010/main" val="831579869"/>
       </p:ext>
     </p:extLst>
   </p:cSld>
   <p:clrMapOvr>
     <a:masterClrMapping/>
   </p:clrMapOvr>
-  <p:timing>
-    <p:tnLst>
-      <p:par>
-        <p:cTn xmlns:p14="http://schemas.microsoft.com/office/powerpoint/2010/main" id="1" dur="indefinite" restart="never" nodeType="tmRoot"/>
-      </p:par>
-    </p:tnLst>
-  </p:timing>
 </p:sld>
 </file>
 

</xml_diff>

<commit_message>
minor updates to lecture materials
</commit_message>
<xml_diff>
--- a/lectures/cshl/2014/RNASeq_Module2_Tutorial.pptx
+++ b/lectures/cshl/2014/RNASeq_Module2_Tutorial.pptx
@@ -258,7 +258,7 @@
               <a:pPr>
                 <a:defRPr/>
               </a:pPr>
-              <a:t>11/16/14</a:t>
+              <a:t>11/18/14</a:t>
             </a:fld>
             <a:endParaRPr lang="en-US"/>
           </a:p>
@@ -465,7 +465,7 @@
               <a:pPr>
                 <a:defRPr/>
               </a:pPr>
-              <a:t>11/16/14</a:t>
+              <a:t>11/18/14</a:t>
             </a:fld>
             <a:endParaRPr lang="en-US"/>
           </a:p>
@@ -4679,7 +4679,7 @@
               <a:pPr>
                 <a:defRPr/>
               </a:pPr>
-              <a:t>11/16/14</a:t>
+              <a:t>11/18/14</a:t>
             </a:fld>
             <a:endParaRPr lang="en-US"/>
           </a:p>
@@ -5924,15 +5924,7 @@
                 <a:ea typeface="ＭＳ Ｐゴシック" charset="0"/>
                 <a:cs typeface="ＭＳ Ｐゴシック" charset="0"/>
               </a:rPr>
-              <a:t>2-v</a:t>
-            </a:r>
-            <a:r>
-              <a:rPr lang="en-US" altLang="ko-KR" dirty="0" smtClean="0">
-                <a:latin typeface="Calibri" charset="0"/>
-                <a:ea typeface="ＭＳ Ｐゴシック" charset="0"/>
-                <a:cs typeface="ＭＳ Ｐゴシック" charset="0"/>
-              </a:rPr>
-              <a:t>. </a:t>
+              <a:t>2-v. </a:t>
             </a:r>
             <a:r>
               <a:rPr lang="en-US" altLang="ko-KR" dirty="0">
@@ -7594,7 +7586,7 @@
               </a:lnSpc>
             </a:pPr>
             <a:r>
-              <a:rPr lang="en-US" sz="2600">
+              <a:rPr lang="en-US" sz="2600" dirty="0">
                 <a:latin typeface="Calibri" charset="0"/>
                 <a:ea typeface="ＭＳ Ｐゴシック" charset="0"/>
               </a:rPr>
@@ -7608,11 +7600,25 @@
               </a:lnSpc>
             </a:pPr>
             <a:r>
-              <a:rPr lang="en-US" sz="2600">
-                <a:latin typeface="Calibri" charset="0"/>
-                <a:ea typeface="ＭＳ Ｐゴシック" charset="0"/>
-              </a:rPr>
-              <a:t>The tutorial file contains more complete instructions</a:t>
+              <a:rPr lang="en-US" sz="2600" dirty="0">
+                <a:latin typeface="Calibri" charset="0"/>
+                <a:ea typeface="ＭＳ Ｐゴシック" charset="0"/>
+              </a:rPr>
+              <a:t>The </a:t>
+            </a:r>
+            <a:r>
+              <a:rPr lang="en-US" sz="2600" dirty="0" smtClean="0">
+                <a:latin typeface="Calibri" charset="0"/>
+                <a:ea typeface="ＭＳ Ｐゴシック" charset="0"/>
+              </a:rPr>
+              <a:t>wiki contains </a:t>
+            </a:r>
+            <a:r>
+              <a:rPr lang="en-US" sz="2600" dirty="0">
+                <a:latin typeface="Calibri" charset="0"/>
+                <a:ea typeface="ＭＳ Ｐゴシック" charset="0"/>
+              </a:rPr>
+              <a:t>more complete instructions</a:t>
             </a:r>
           </a:p>
           <a:p>
@@ -7622,35 +7628,49 @@
               </a:lnSpc>
             </a:pPr>
             <a:r>
-              <a:rPr lang="en-US" sz="2600">
-                <a:latin typeface="Calibri" charset="0"/>
-                <a:ea typeface="ＭＳ Ｐゴシック" charset="0"/>
-              </a:rPr>
-              <a:t>Lines in the tutorial file beginning with </a:t>
-            </a:r>
-            <a:r>
-              <a:rPr lang="ja-JP" altLang="en-US" sz="2600">
+              <a:rPr lang="en-US" sz="2600" dirty="0">
+                <a:latin typeface="Calibri" charset="0"/>
+                <a:ea typeface="ＭＳ Ｐゴシック" charset="0"/>
+              </a:rPr>
+              <a:t>Lines </a:t>
+            </a:r>
+            <a:r>
+              <a:rPr lang="en-US" sz="2600" dirty="0" smtClean="0">
+                <a:latin typeface="Calibri" charset="0"/>
+                <a:ea typeface="ＭＳ Ｐゴシック" charset="0"/>
+              </a:rPr>
+              <a:t>beginning </a:t>
+            </a:r>
+            <a:r>
+              <a:rPr lang="en-US" sz="2600" dirty="0">
+                <a:latin typeface="Calibri" charset="0"/>
+                <a:ea typeface="ＭＳ Ｐゴシック" charset="0"/>
+              </a:rPr>
+              <a:t>with </a:t>
+            </a:r>
+            <a:r>
+              <a:rPr lang="ja-JP" altLang="en-US" sz="2600" dirty="0">
                 <a:latin typeface="Calibri" charset="0"/>
                 <a:ea typeface="ＭＳ Ｐゴシック" charset="0"/>
               </a:rPr>
               <a:t>“</a:t>
             </a:r>
             <a:r>
-              <a:rPr lang="en-US" altLang="ja-JP" sz="2600">
+              <a:rPr lang="en-US" altLang="ja-JP" sz="2600" dirty="0">
                 <a:latin typeface="Calibri" charset="0"/>
                 <a:ea typeface="ＭＳ Ｐゴシック" charset="0"/>
               </a:rPr>
               <a:t>#</a:t>
             </a:r>
             <a:r>
-              <a:rPr lang="ja-JP" altLang="en-US" sz="2600">
+              <a:rPr lang="ja-JP" altLang="en-US" sz="2600" dirty="0">
                 <a:latin typeface="Calibri" charset="0"/>
                 <a:ea typeface="ＭＳ Ｐゴシック" charset="0"/>
               </a:rPr>
               <a:t>”</a:t>
             </a:r>
             <a:r>
-              <a:rPr lang="en-US" altLang="ja-JP" sz="2600">
+              <a:rPr lang="en-US" altLang="ja-JP" sz="2600" dirty="0">
                 <a:latin typeface="Calibri" charset="0"/>
                 <a:ea typeface="ＭＳ Ｐゴシック" charset="0"/>
               </a:rPr>
@@ -7664,11 +7684,25 @@
               </a:lnSpc>
             </a:pPr>
             <a:r>
-              <a:rPr lang="en-US" sz="2600">
-                <a:latin typeface="Calibri" charset="0"/>
-                <a:ea typeface="ＭＳ Ｐゴシック" charset="0"/>
-              </a:rPr>
-              <a:t>All other lines are commands that will be pasted and executed from a linux terminal or R tutorial</a:t>
+              <a:rPr lang="en-US" sz="2600" dirty="0">
+                <a:latin typeface="Calibri" charset="0"/>
+                <a:ea typeface="ＭＳ Ｐゴシック" charset="0"/>
+              </a:rPr>
+              <a:t>All other lines are commands that will be pasted and executed from a </a:t>
+            </a:r>
+            <a:r>
+              <a:rPr lang="en-US" sz="2600" dirty="0" err="1">
+                <a:latin typeface="Calibri" charset="0"/>
+                <a:ea typeface="ＭＳ Ｐゴシック" charset="0"/>
+              </a:rPr>
+              <a:t>linux</a:t>
+            </a:r>
+            <a:r>
+              <a:rPr lang="en-US" sz="2600" dirty="0">
+                <a:latin typeface="Calibri" charset="0"/>
+                <a:ea typeface="ＭＳ Ｐゴシック" charset="0"/>
+              </a:rPr>
+              <a:t> terminal or R tutorial</a:t>
             </a:r>
           </a:p>
           <a:p>
@@ -7678,11 +7712,25 @@
               </a:lnSpc>
             </a:pPr>
             <a:r>
-              <a:rPr lang="en-US" sz="2600">
-                <a:latin typeface="Calibri" charset="0"/>
-                <a:ea typeface="ＭＳ Ｐゴシック" charset="0"/>
-              </a:rPr>
-              <a:t>Each command is annotated with comments except that basic familiarity with linux is assumed</a:t>
+              <a:rPr lang="en-US" sz="2600" dirty="0">
+                <a:latin typeface="Calibri" charset="0"/>
+                <a:ea typeface="ＭＳ Ｐゴシック" charset="0"/>
+              </a:rPr>
+              <a:t>Each command is annotated with comments except that basic familiarity with </a:t>
+            </a:r>
+            <a:r>
+              <a:rPr lang="en-US" sz="2600" dirty="0" err="1">
+                <a:latin typeface="Calibri" charset="0"/>
+                <a:ea typeface="ＭＳ Ｐゴシック" charset="0"/>
+              </a:rPr>
+              <a:t>linux</a:t>
+            </a:r>
+            <a:r>
+              <a:rPr lang="en-US" sz="2600" dirty="0">
+                <a:latin typeface="Calibri" charset="0"/>
+                <a:ea typeface="ＭＳ Ｐゴシック" charset="0"/>
+              </a:rPr>
+              <a:t> is assumed</a:t>
             </a:r>
           </a:p>
           <a:p>
@@ -7692,105 +7740,105 @@
               </a:lnSpc>
             </a:pPr>
             <a:r>
-              <a:rPr lang="en-US" sz="2200">
+              <a:rPr lang="en-US" sz="2200" dirty="0">
                 <a:latin typeface="Calibri" charset="0"/>
                 <a:ea typeface="ＭＳ Ｐゴシック" charset="0"/>
               </a:rPr>
               <a:t>e.g.  You should know that </a:t>
             </a:r>
             <a:r>
-              <a:rPr lang="ja-JP" altLang="en-US" sz="2200">
+              <a:rPr lang="ja-JP" altLang="en-US" sz="2200" dirty="0">
                 <a:latin typeface="Calibri" charset="0"/>
                 <a:ea typeface="ＭＳ Ｐゴシック" charset="0"/>
               </a:rPr>
               <a:t>‘</a:t>
             </a:r>
             <a:r>
-              <a:rPr lang="en-US" altLang="ja-JP" sz="2200">
+              <a:rPr lang="en-US" altLang="ja-JP" sz="2200" dirty="0" err="1">
                 <a:latin typeface="Calibri" charset="0"/>
                 <a:ea typeface="ＭＳ Ｐゴシック" charset="0"/>
               </a:rPr>
               <a:t>mkdir</a:t>
             </a:r>
             <a:r>
-              <a:rPr lang="ja-JP" altLang="en-US" sz="2200">
+              <a:rPr lang="ja-JP" altLang="en-US" sz="2200" dirty="0">
                 <a:latin typeface="Calibri" charset="0"/>
                 <a:ea typeface="ＭＳ Ｐゴシック" charset="0"/>
               </a:rPr>
               <a:t>’</a:t>
             </a:r>
             <a:r>
-              <a:rPr lang="en-US" altLang="ja-JP" sz="2200">
+              <a:rPr lang="en-US" altLang="ja-JP" sz="2200" dirty="0">
                 <a:latin typeface="Calibri" charset="0"/>
                 <a:ea typeface="ＭＳ Ｐゴシック" charset="0"/>
               </a:rPr>
               <a:t> means to </a:t>
             </a:r>
             <a:r>
-              <a:rPr lang="ja-JP" altLang="en-US" sz="2200">
+              <a:rPr lang="ja-JP" altLang="en-US" sz="2200" dirty="0">
                 <a:latin typeface="Calibri" charset="0"/>
                 <a:ea typeface="ＭＳ Ｐゴシック" charset="0"/>
               </a:rPr>
               <a:t>‘</a:t>
             </a:r>
             <a:r>
-              <a:rPr lang="en-US" altLang="ja-JP" sz="2200">
+              <a:rPr lang="en-US" altLang="ja-JP" sz="2200" dirty="0">
                 <a:latin typeface="Calibri" charset="0"/>
                 <a:ea typeface="ＭＳ Ｐゴシック" charset="0"/>
               </a:rPr>
               <a:t>make a directory, </a:t>
             </a:r>
             <a:r>
-              <a:rPr lang="ja-JP" altLang="en-US" sz="2200">
+              <a:rPr lang="ja-JP" altLang="en-US" sz="2200" dirty="0">
                 <a:latin typeface="Calibri" charset="0"/>
                 <a:ea typeface="ＭＳ Ｐゴシック" charset="0"/>
               </a:rPr>
               <a:t>‘</a:t>
             </a:r>
             <a:r>
-              <a:rPr lang="en-US" altLang="ja-JP" sz="2200">
+              <a:rPr lang="en-US" altLang="ja-JP" sz="2200" dirty="0">
                 <a:latin typeface="Calibri" charset="0"/>
                 <a:ea typeface="ＭＳ Ｐゴシック" charset="0"/>
               </a:rPr>
               <a:t>cd</a:t>
             </a:r>
             <a:r>
-              <a:rPr lang="ja-JP" altLang="en-US" sz="2200">
+              <a:rPr lang="ja-JP" altLang="en-US" sz="2200" dirty="0">
                 <a:latin typeface="Calibri" charset="0"/>
                 <a:ea typeface="ＭＳ Ｐゴシック" charset="0"/>
               </a:rPr>
               <a:t>’</a:t>
             </a:r>
             <a:r>
-              <a:rPr lang="en-US" altLang="ja-JP" sz="2200">
+              <a:rPr lang="en-US" altLang="ja-JP" sz="2200" dirty="0">
                 <a:latin typeface="Calibri" charset="0"/>
                 <a:ea typeface="ＭＳ Ｐゴシック" charset="0"/>
               </a:rPr>
               <a:t> means to </a:t>
             </a:r>
             <a:r>
-              <a:rPr lang="ja-JP" altLang="en-US" sz="2200">
+              <a:rPr lang="ja-JP" altLang="en-US" sz="2200" dirty="0">
                 <a:latin typeface="Calibri" charset="0"/>
                 <a:ea typeface="ＭＳ Ｐゴシック" charset="0"/>
               </a:rPr>
               <a:t>‘</a:t>
             </a:r>
             <a:r>
-              <a:rPr lang="en-US" altLang="ja-JP" sz="2200">
+              <a:rPr lang="en-US" altLang="ja-JP" sz="2200" dirty="0">
                 <a:latin typeface="Calibri" charset="0"/>
                 <a:ea typeface="ＭＳ Ｐゴシック" charset="0"/>
               </a:rPr>
               <a:t>change directory</a:t>
             </a:r>
             <a:r>
-              <a:rPr lang="ja-JP" altLang="en-US" sz="2200">
+              <a:rPr lang="ja-JP" altLang="en-US" sz="2200" dirty="0">
                 <a:latin typeface="Calibri" charset="0"/>
                 <a:ea typeface="ＭＳ Ｐゴシック" charset="0"/>
               </a:rPr>
               <a:t>’</a:t>
             </a:r>
             <a:r>
-              <a:rPr lang="en-US" altLang="ja-JP" sz="2200">
+              <a:rPr lang="en-US" altLang="ja-JP" sz="2200" dirty="0">
                 <a:latin typeface="Calibri" charset="0"/>
                 <a:ea typeface="ＭＳ Ｐゴシック" charset="0"/>
               </a:rPr>
@@ -7804,11 +7852,25 @@
               </a:lnSpc>
             </a:pPr>
             <a:r>
-              <a:rPr lang="en-US" sz="2600">
-                <a:latin typeface="Calibri" charset="0"/>
-                <a:ea typeface="ＭＳ Ｐゴシック" charset="0"/>
-              </a:rPr>
-              <a:t>Some reference materials for linux can be found here:</a:t>
+              <a:rPr lang="en-US" sz="2600" dirty="0">
+                <a:latin typeface="Calibri" charset="0"/>
+                <a:ea typeface="ＭＳ Ｐゴシック" charset="0"/>
+              </a:rPr>
+              <a:t>Some reference materials for </a:t>
+            </a:r>
+            <a:r>
+              <a:rPr lang="en-US" sz="2600" dirty="0" err="1">
+                <a:latin typeface="Calibri" charset="0"/>
+                <a:ea typeface="ＭＳ Ｐゴシック" charset="0"/>
+              </a:rPr>
+              <a:t>linux</a:t>
+            </a:r>
+            <a:r>
+              <a:rPr lang="en-US" sz="2600" dirty="0">
+                <a:latin typeface="Calibri" charset="0"/>
+                <a:ea typeface="ＭＳ Ｐゴシック" charset="0"/>
+              </a:rPr>
+              <a:t> can be found here:</a:t>
             </a:r>
           </a:p>
           <a:p>
@@ -7818,7 +7880,7 @@
               </a:lnSpc>
             </a:pPr>
             <a:r>
-              <a:rPr lang="en-US" sz="2200" i="1">
+              <a:rPr lang="en-US" sz="2200" i="1" dirty="0">
                 <a:latin typeface="Calibri" charset="0"/>
                 <a:ea typeface="ＭＳ Ｐゴシック" charset="0"/>
                 <a:hlinkClick r:id="rId2"/>
@@ -7826,7 +7888,7 @@
               <a:t>http://files.fosswire.com/2007/08/fwunixref.pdf</a:t>
             </a:r>
             <a:r>
-              <a:rPr lang="en-US" sz="2200" i="1">
+              <a:rPr lang="en-US" sz="2200" i="1" dirty="0">
                 <a:latin typeface="Calibri" charset="0"/>
                 <a:ea typeface="ＭＳ Ｐゴシック" charset="0"/>
               </a:rPr>
@@ -7840,14 +7902,14 @@
               </a:lnSpc>
             </a:pPr>
             <a:r>
-              <a:rPr lang="en-US" sz="2200" i="1">
+              <a:rPr lang="en-US" sz="2200" i="1" dirty="0">
                 <a:latin typeface="Calibri" charset="0"/>
                 <a:ea typeface="ＭＳ Ｐゴシック" charset="0"/>
                 <a:hlinkClick r:id="rId3"/>
               </a:rPr>
               <a:t>http://vic.gedris.org/Manual-ShellIntro/1.2/ShellIntro.pdf</a:t>
             </a:r>
-            <a:endParaRPr lang="en-US" sz="2200" i="1">
+            <a:endParaRPr lang="en-US" sz="2200" i="1" dirty="0">
               <a:latin typeface="Calibri" charset="0"/>
               <a:ea typeface="ＭＳ Ｐゴシック" charset="0"/>
             </a:endParaRPr>
@@ -7859,7 +7921,7 @@
               </a:lnSpc>
             </a:pPr>
             <a:r>
-              <a:rPr lang="en-US" sz="2200" i="1">
+              <a:rPr lang="en-US" sz="2200" i="1" dirty="0">
                 <a:latin typeface="Calibri" charset="0"/>
                 <a:ea typeface="ＭＳ Ｐゴシック" charset="0"/>
                 <a:hlinkClick r:id="rId4"/>
@@ -7867,13 +7929,13 @@
               <a:t>www.nettech.in/course/Basic%20Commands.pdf</a:t>
             </a:r>
             <a:r>
-              <a:rPr lang="en-US" sz="2200" i="1">
+              <a:rPr lang="en-US" sz="2200" i="1" dirty="0">
                 <a:latin typeface="Calibri" charset="0"/>
                 <a:ea typeface="ＭＳ Ｐゴシック" charset="0"/>
               </a:rPr>
               <a:t> </a:t>
             </a:r>
-            <a:endParaRPr lang="en-US" sz="2200">
+            <a:endParaRPr lang="en-US" sz="2200" dirty="0">
               <a:latin typeface="Calibri" charset="0"/>
               <a:ea typeface="ＭＳ Ｐゴシック" charset="0"/>
             </a:endParaRPr>
@@ -7884,7 +7946,7 @@
                 <a:spcPct val="80000"/>
               </a:lnSpc>
             </a:pPr>
-            <a:endParaRPr lang="en-US" sz="2200">
+            <a:endParaRPr lang="en-US" sz="2200" dirty="0">
               <a:latin typeface="Calibri" charset="0"/>
               <a:ea typeface="ＭＳ Ｐゴシック" charset="0"/>
             </a:endParaRPr>

</xml_diff>